<commit_message>
added intensity field generation and field ii validation slides to 2015.4.23 lab meeting presentation
</commit_message>
<xml_diff>
--- a/presentations/lab_meeting/lab_meeting_2015.04.24_kzk_sws.pptx
+++ b/presentations/lab_meeting/lab_meeting_2015.04.24_kzk_sws.pptx
@@ -7,6 +7,11 @@
   <p:sldIdLst>
     <p:sldId id="256" r:id="rId2"/>
     <p:sldId id="257" r:id="rId3"/>
+    <p:sldId id="263" r:id="rId4"/>
+    <p:sldId id="260" r:id="rId5"/>
+    <p:sldId id="261" r:id="rId6"/>
+    <p:sldId id="262" r:id="rId7"/>
+    <p:sldId id="259" r:id="rId8"/>
   </p:sldIdLst>
   <p:sldSz cx="12192000" cy="6858000"/>
   <p:notesSz cx="6858000" cy="9144000"/>
@@ -105,6 +110,11 @@
       </a:defRPr>
     </a:lvl9pPr>
   </p:defaultTextStyle>
+  <p:extLst>
+    <p:ext uri="{EFAFB233-063F-42B5-8137-9DF3F51BA10A}">
+      <p15:sldGuideLst xmlns:p15="http://schemas.microsoft.com/office/powerpoint/2012/main"/>
+    </p:ext>
+  </p:extLst>
 </p:presentation>
 </file>
 
@@ -239,7 +249,7 @@
           <a:p>
             <a:fld id="{AB371D2A-FE86-480D-93E3-9F79DC3EBBA7}" type="datetimeFigureOut">
               <a:rPr lang="en-US" smtClean="0"/>
-              <a:t>4/22/2015</a:t>
+              <a:t>4/23/2015</a:t>
             </a:fld>
             <a:endParaRPr lang="en-US"/>
           </a:p>
@@ -409,7 +419,7 @@
           <a:p>
             <a:fld id="{AB371D2A-FE86-480D-93E3-9F79DC3EBBA7}" type="datetimeFigureOut">
               <a:rPr lang="en-US" smtClean="0"/>
-              <a:t>4/22/2015</a:t>
+              <a:t>4/23/2015</a:t>
             </a:fld>
             <a:endParaRPr lang="en-US"/>
           </a:p>
@@ -589,7 +599,7 @@
           <a:p>
             <a:fld id="{AB371D2A-FE86-480D-93E3-9F79DC3EBBA7}" type="datetimeFigureOut">
               <a:rPr lang="en-US" smtClean="0"/>
-              <a:t>4/22/2015</a:t>
+              <a:t>4/23/2015</a:t>
             </a:fld>
             <a:endParaRPr lang="en-US"/>
           </a:p>
@@ -759,7 +769,7 @@
           <a:p>
             <a:fld id="{AB371D2A-FE86-480D-93E3-9F79DC3EBBA7}" type="datetimeFigureOut">
               <a:rPr lang="en-US" smtClean="0"/>
-              <a:t>4/22/2015</a:t>
+              <a:t>4/23/2015</a:t>
             </a:fld>
             <a:endParaRPr lang="en-US"/>
           </a:p>
@@ -1005,7 +1015,7 @@
           <a:p>
             <a:fld id="{AB371D2A-FE86-480D-93E3-9F79DC3EBBA7}" type="datetimeFigureOut">
               <a:rPr lang="en-US" smtClean="0"/>
-              <a:t>4/22/2015</a:t>
+              <a:t>4/23/2015</a:t>
             </a:fld>
             <a:endParaRPr lang="en-US"/>
           </a:p>
@@ -1237,7 +1247,7 @@
           <a:p>
             <a:fld id="{AB371D2A-FE86-480D-93E3-9F79DC3EBBA7}" type="datetimeFigureOut">
               <a:rPr lang="en-US" smtClean="0"/>
-              <a:t>4/22/2015</a:t>
+              <a:t>4/23/2015</a:t>
             </a:fld>
             <a:endParaRPr lang="en-US"/>
           </a:p>
@@ -1604,7 +1614,7 @@
           <a:p>
             <a:fld id="{AB371D2A-FE86-480D-93E3-9F79DC3EBBA7}" type="datetimeFigureOut">
               <a:rPr lang="en-US" smtClean="0"/>
-              <a:t>4/22/2015</a:t>
+              <a:t>4/23/2015</a:t>
             </a:fld>
             <a:endParaRPr lang="en-US"/>
           </a:p>
@@ -1722,7 +1732,7 @@
           <a:p>
             <a:fld id="{AB371D2A-FE86-480D-93E3-9F79DC3EBBA7}" type="datetimeFigureOut">
               <a:rPr lang="en-US" smtClean="0"/>
-              <a:t>4/22/2015</a:t>
+              <a:t>4/23/2015</a:t>
             </a:fld>
             <a:endParaRPr lang="en-US"/>
           </a:p>
@@ -1817,7 +1827,7 @@
           <a:p>
             <a:fld id="{AB371D2A-FE86-480D-93E3-9F79DC3EBBA7}" type="datetimeFigureOut">
               <a:rPr lang="en-US" smtClean="0"/>
-              <a:t>4/22/2015</a:t>
+              <a:t>4/23/2015</a:t>
             </a:fld>
             <a:endParaRPr lang="en-US"/>
           </a:p>
@@ -2094,7 +2104,7 @@
           <a:p>
             <a:fld id="{AB371D2A-FE86-480D-93E3-9F79DC3EBBA7}" type="datetimeFigureOut">
               <a:rPr lang="en-US" smtClean="0"/>
-              <a:t>4/22/2015</a:t>
+              <a:t>4/23/2015</a:t>
             </a:fld>
             <a:endParaRPr lang="en-US"/>
           </a:p>
@@ -2347,7 +2357,7 @@
           <a:p>
             <a:fld id="{AB371D2A-FE86-480D-93E3-9F79DC3EBBA7}" type="datetimeFigureOut">
               <a:rPr lang="en-US" smtClean="0"/>
-              <a:t>4/22/2015</a:t>
+              <a:t>4/23/2015</a:t>
             </a:fld>
             <a:endParaRPr lang="en-US"/>
           </a:p>
@@ -2560,7 +2570,7 @@
           <a:p>
             <a:fld id="{AB371D2A-FE86-480D-93E3-9F79DC3EBBA7}" type="datetimeFigureOut">
               <a:rPr lang="en-US" smtClean="0"/>
-              <a:t>4/22/2015</a:t>
+              <a:t>4/23/2015</a:t>
             </a:fld>
             <a:endParaRPr lang="en-US"/>
           </a:p>
@@ -3092,30 +3102,9 @@
           <a:lstStyle/>
           <a:p>
             <a:r>
-              <a:rPr lang="en-US" dirty="0" smtClean="0">
-                <a:latin typeface="Arial"/>
-              </a:rPr>
-              <a:t>Generate intensity fields using 3D KZK simulation with various attenuation and nonlinearity coefficients.</a:t>
-            </a:r>
-          </a:p>
-          <a:p>
-            <a:r>
-              <a:rPr lang="en-US" strike="noStrike" dirty="0" smtClean="0">
-                <a:latin typeface="Arial"/>
-              </a:rPr>
-              <a:t>Use the intensity field output from the KZK simulation with to calculate the corresponding nodal loads using FEM tools.</a:t>
-            </a:r>
-          </a:p>
-          <a:p>
-            <a:r>
-              <a:rPr lang="en-US" strike="noStrike" dirty="0" smtClean="0">
-                <a:latin typeface="Arial"/>
-              </a:rPr>
-              <a:t>Simulate stresses and corresponding axial displacements using LS-DYNA and FEM post-processing tools.</a:t>
-            </a:r>
-            <a:endParaRPr lang="en-US" dirty="0" smtClean="0"/>
-          </a:p>
-          <a:p>
+              <a:rPr lang="en-US" dirty="0" smtClean="0"/>
+              <a:t>Determine if varying the degree of nonlinearity in acoustic propagation causes changes in shear wave speed estimates at different focal depths.</a:t>
+            </a:r>
             <a:endParaRPr lang="en-US" dirty="0"/>
           </a:p>
         </p:txBody>
@@ -3130,6 +3119,1058 @@
   <p:clrMapOvr>
     <a:masterClrMapping/>
   </p:clrMapOvr>
+  <p:timing>
+    <p:tnLst>
+      <p:par>
+        <p:cTn id="1" dur="indefinite" restart="never" nodeType="tmRoot"/>
+      </p:par>
+    </p:tnLst>
+  </p:timing>
+</p:sld>
+</file>
+
+<file path=ppt/slides/slide3.xml><?xml version="1.0" encoding="utf-8"?>
+<p:sld xmlns:a="http://schemas.openxmlformats.org/drawingml/2006/main" xmlns:r="http://schemas.openxmlformats.org/officeDocument/2006/relationships" xmlns:p="http://schemas.openxmlformats.org/presentationml/2006/main">
+  <p:cSld>
+    <p:spTree>
+      <p:nvGrpSpPr>
+        <p:cNvPr id="1" name=""/>
+        <p:cNvGrpSpPr/>
+        <p:nvPr/>
+      </p:nvGrpSpPr>
+      <p:grpSpPr>
+        <a:xfrm>
+          <a:off x="0" y="0"/>
+          <a:ext cx="0" cy="0"/>
+          <a:chOff x="0" y="0"/>
+          <a:chExt cx="0" cy="0"/>
+        </a:xfrm>
+      </p:grpSpPr>
+      <p:sp>
+        <p:nvSpPr>
+          <p:cNvPr id="2" name="Title 1"/>
+          <p:cNvSpPr>
+            <a:spLocks noGrp="1"/>
+          </p:cNvSpPr>
+          <p:nvPr>
+            <p:ph type="title"/>
+          </p:nvPr>
+        </p:nvSpPr>
+        <p:spPr/>
+        <p:txBody>
+          <a:bodyPr/>
+          <a:lstStyle/>
+          <a:p>
+            <a:r>
+              <a:rPr lang="en-US" dirty="0" smtClean="0"/>
+              <a:t>Methods</a:t>
+            </a:r>
+            <a:endParaRPr lang="en-US" dirty="0"/>
+          </a:p>
+        </p:txBody>
+      </p:sp>
+      <p:sp>
+        <p:nvSpPr>
+          <p:cNvPr id="3" name="Content Placeholder 2"/>
+          <p:cNvSpPr>
+            <a:spLocks noGrp="1"/>
+          </p:cNvSpPr>
+          <p:nvPr>
+            <p:ph idx="1"/>
+          </p:nvPr>
+        </p:nvSpPr>
+        <p:spPr/>
+        <p:txBody>
+          <a:bodyPr/>
+          <a:lstStyle/>
+          <a:p>
+            <a:r>
+              <a:rPr lang="en-US" dirty="0">
+                <a:latin typeface="Arial"/>
+              </a:rPr>
+              <a:t>Generate intensity fields using 3D KZK simulation with various attenuation and nonlinearity coefficients</a:t>
+            </a:r>
+            <a:r>
+              <a:rPr lang="en-US" dirty="0" smtClean="0">
+                <a:latin typeface="Arial"/>
+              </a:rPr>
+              <a:t>.</a:t>
+            </a:r>
+          </a:p>
+          <a:p>
+            <a:endParaRPr lang="en-US" dirty="0">
+              <a:latin typeface="Arial"/>
+            </a:endParaRPr>
+          </a:p>
+          <a:p>
+            <a:r>
+              <a:rPr lang="en-US" dirty="0">
+                <a:latin typeface="Arial"/>
+              </a:rPr>
+              <a:t>Simulate stresses and corresponding axial </a:t>
+            </a:r>
+            <a:r>
+              <a:rPr lang="en-US" dirty="0" smtClean="0">
+                <a:latin typeface="Arial"/>
+              </a:rPr>
+              <a:t>displacements using </a:t>
+            </a:r>
+            <a:r>
+              <a:rPr lang="en-US" dirty="0">
+                <a:latin typeface="Arial"/>
+              </a:rPr>
+              <a:t>LS-DYNA and FEM post-processing tools.</a:t>
+            </a:r>
+            <a:endParaRPr lang="en-US" dirty="0"/>
+          </a:p>
+          <a:p>
+            <a:endParaRPr lang="en-US" dirty="0"/>
+          </a:p>
+        </p:txBody>
+      </p:sp>
+    </p:spTree>
+    <p:extLst>
+      <p:ext uri="{BB962C8B-B14F-4D97-AF65-F5344CB8AC3E}">
+        <p14:creationId xmlns:p14="http://schemas.microsoft.com/office/powerpoint/2010/main" val="1627146514"/>
+      </p:ext>
+    </p:extLst>
+  </p:cSld>
+  <p:clrMapOvr>
+    <a:masterClrMapping/>
+  </p:clrMapOvr>
+  <p:timing>
+    <p:tnLst>
+      <p:par>
+        <p:cTn id="1" dur="indefinite" restart="never" nodeType="tmRoot"/>
+      </p:par>
+    </p:tnLst>
+  </p:timing>
+</p:sld>
+</file>
+
+<file path=ppt/slides/slide4.xml><?xml version="1.0" encoding="utf-8"?>
+<p:sld xmlns:a="http://schemas.openxmlformats.org/drawingml/2006/main" xmlns:r="http://schemas.openxmlformats.org/officeDocument/2006/relationships" xmlns:p="http://schemas.openxmlformats.org/presentationml/2006/main">
+  <p:cSld>
+    <p:spTree>
+      <p:nvGrpSpPr>
+        <p:cNvPr id="1" name=""/>
+        <p:cNvGrpSpPr/>
+        <p:nvPr/>
+      </p:nvGrpSpPr>
+      <p:grpSpPr>
+        <a:xfrm>
+          <a:off x="0" y="0"/>
+          <a:ext cx="0" cy="0"/>
+          <a:chOff x="0" y="0"/>
+          <a:chExt cx="0" cy="0"/>
+        </a:xfrm>
+      </p:grpSpPr>
+      <p:sp>
+        <p:nvSpPr>
+          <p:cNvPr id="2" name="Title 1"/>
+          <p:cNvSpPr>
+            <a:spLocks noGrp="1"/>
+          </p:cNvSpPr>
+          <p:nvPr>
+            <p:ph type="title"/>
+          </p:nvPr>
+        </p:nvSpPr>
+        <p:spPr/>
+        <p:txBody>
+          <a:bodyPr/>
+          <a:lstStyle/>
+          <a:p>
+            <a:r>
+              <a:rPr lang="en-US" dirty="0" smtClean="0"/>
+              <a:t>Methods – Generating Intensity Fields</a:t>
+            </a:r>
+            <a:endParaRPr lang="en-US" dirty="0"/>
+          </a:p>
+        </p:txBody>
+      </p:sp>
+      <mc:AlternateContent xmlns:mc="http://schemas.openxmlformats.org/markup-compatibility/2006">
+        <mc:Choice xmlns:a14="http://schemas.microsoft.com/office/drawing/2010/main" Requires="a14">
+          <p:sp>
+            <p:nvSpPr>
+              <p:cNvPr id="3" name="Content Placeholder 2"/>
+              <p:cNvSpPr>
+                <a:spLocks noGrp="1"/>
+              </p:cNvSpPr>
+              <p:nvPr>
+                <p:ph idx="1"/>
+              </p:nvPr>
+            </p:nvSpPr>
+            <p:spPr/>
+            <p:txBody>
+              <a:bodyPr/>
+              <a:lstStyle/>
+              <a:p>
+                <a:r>
+                  <a:rPr lang="en-US" sz="2400" dirty="0" smtClean="0"/>
+                  <a:t>Simulated C5-2 using Field II</a:t>
+                </a:r>
+              </a:p>
+              <a:p>
+                <a:pPr lvl="1"/>
+                <a:r>
+                  <a:rPr lang="en-US" sz="2000" dirty="0" smtClean="0"/>
+                  <a:t>2.36 MHz, 7 cycles</a:t>
+                </a:r>
+                <a:r>
+                  <a:rPr lang="en-US" sz="2000" dirty="0"/>
+                  <a:t>,</a:t>
+                </a:r>
+                <a:r>
+                  <a:rPr lang="en-US" sz="2000" dirty="0" smtClean="0"/>
+                  <a:t> </a:t>
+                </a:r>
+                <a14:m>
+                  <m:oMath xmlns:m="http://schemas.openxmlformats.org/officeDocument/2006/math">
+                    <m:r>
+                      <a:rPr lang="en-US" sz="2000" b="0" i="1" smtClean="0">
+                        <a:latin typeface="Cambria Math" panose="02040503050406030204" pitchFamily="18" charset="0"/>
+                      </a:rPr>
+                      <m:t>~4×</m:t>
+                    </m:r>
+                    <m:sSup>
+                      <m:sSupPr>
+                        <m:ctrlPr>
+                          <a:rPr lang="en-US" sz="2000" b="0" i="1" smtClean="0">
+                            <a:latin typeface="Cambria Math" panose="02040503050406030204" pitchFamily="18" charset="0"/>
+                          </a:rPr>
+                        </m:ctrlPr>
+                      </m:sSupPr>
+                      <m:e>
+                        <m:r>
+                          <a:rPr lang="en-US" sz="2000" b="0" i="1" smtClean="0">
+                            <a:latin typeface="Cambria Math" panose="02040503050406030204" pitchFamily="18" charset="0"/>
+                          </a:rPr>
+                          <m:t>10</m:t>
+                        </m:r>
+                      </m:e>
+                      <m:sup>
+                        <m:r>
+                          <a:rPr lang="en-US" sz="2000" b="0" i="1" smtClean="0">
+                            <a:latin typeface="Cambria Math" panose="02040503050406030204" pitchFamily="18" charset="0"/>
+                          </a:rPr>
+                          <m:t>5</m:t>
+                        </m:r>
+                      </m:sup>
+                    </m:sSup>
+                    <m:r>
+                      <a:rPr lang="en-US" sz="2000" b="0" i="1" smtClean="0">
+                        <a:latin typeface="Cambria Math" panose="02040503050406030204" pitchFamily="18" charset="0"/>
+                      </a:rPr>
+                      <m:t> </m:t>
+                    </m:r>
+                    <m:r>
+                      <m:rPr>
+                        <m:nor/>
+                      </m:rPr>
+                      <a:rPr lang="en-US" sz="2000" b="0" i="0" smtClean="0">
+                        <a:latin typeface="Cambria Math" panose="02040503050406030204" pitchFamily="18" charset="0"/>
+                      </a:rPr>
+                      <m:t>Pa</m:t>
+                    </m:r>
+                  </m:oMath>
+                </a14:m>
+                <a:r>
+                  <a:rPr lang="en-US" sz="2000" dirty="0" smtClean="0"/>
+                  <a:t> amplitude</a:t>
+                </a:r>
+              </a:p>
+              <a:p>
+                <a:pPr lvl="1"/>
+                <a:r>
+                  <a:rPr lang="en-US" sz="2000" dirty="0" smtClean="0"/>
+                  <a:t>30 mm and 70 mm focal depths</a:t>
+                </a:r>
+              </a:p>
+              <a:p>
+                <a:endParaRPr lang="en-US" sz="2400" dirty="0" smtClean="0"/>
+              </a:p>
+              <a:p>
+                <a:r>
+                  <a:rPr lang="el-GR" sz="2400" dirty="0" smtClean="0"/>
+                  <a:t>α</a:t>
+                </a:r>
+                <a:r>
+                  <a:rPr lang="en-US" sz="2400" dirty="0" smtClean="0"/>
+                  <a:t> </a:t>
+                </a:r>
+                <a:r>
+                  <a:rPr lang="en-US" sz="2400" dirty="0"/>
+                  <a:t>= </a:t>
+                </a:r>
+                <a:r>
+                  <a:rPr lang="en-US" sz="2400" dirty="0" smtClean="0"/>
+                  <a:t>[0.005, 0.3, 0.45, 1.0, 1.5] dB/cm/MHz</a:t>
+                </a:r>
+              </a:p>
+              <a:p>
+                <a:endParaRPr lang="en-US" sz="2400" dirty="0" smtClean="0"/>
+              </a:p>
+              <a:p>
+                <a:r>
+                  <a:rPr lang="el-GR" sz="2400" dirty="0" smtClean="0"/>
+                  <a:t>β </a:t>
+                </a:r>
+                <a:r>
+                  <a:rPr lang="en-US" sz="2400" dirty="0" smtClean="0"/>
+                  <a:t>= [0.0, 3.5, 7.0]</a:t>
+                </a:r>
+              </a:p>
+              <a:p>
+                <a:endParaRPr lang="en-US" sz="2400" dirty="0"/>
+              </a:p>
+              <a:p>
+                <a:endParaRPr lang="en-US" dirty="0" smtClean="0"/>
+              </a:p>
+              <a:p>
+                <a:endParaRPr lang="en-US" dirty="0" smtClean="0"/>
+              </a:p>
+              <a:p>
+                <a:pPr lvl="1"/>
+                <a:endParaRPr lang="en-US" dirty="0" smtClean="0"/>
+              </a:p>
+            </p:txBody>
+          </p:sp>
+        </mc:Choice>
+        <mc:Fallback>
+          <p:sp>
+            <p:nvSpPr>
+              <p:cNvPr id="3" name="Content Placeholder 2"/>
+              <p:cNvSpPr>
+                <a:spLocks noGrp="1" noRot="1" noChangeAspect="1" noMove="1" noResize="1" noEditPoints="1" noAdjustHandles="1" noChangeArrowheads="1" noChangeShapeType="1" noTextEdit="1"/>
+              </p:cNvSpPr>
+              <p:nvPr>
+                <p:ph idx="1"/>
+              </p:nvPr>
+            </p:nvSpPr>
+            <p:spPr>
+              <a:blipFill rotWithShape="0">
+                <a:blip r:embed="rId2"/>
+                <a:stretch>
+                  <a:fillRect l="-812" t="-1961"/>
+                </a:stretch>
+              </a:blipFill>
+            </p:spPr>
+            <p:txBody>
+              <a:bodyPr/>
+              <a:lstStyle/>
+              <a:p>
+                <a:r>
+                  <a:rPr lang="en-US">
+                    <a:noFill/>
+                  </a:rPr>
+                  <a:t> </a:t>
+                </a:r>
+              </a:p>
+            </p:txBody>
+          </p:sp>
+        </mc:Fallback>
+      </mc:AlternateContent>
+      <p:pic>
+        <p:nvPicPr>
+          <p:cNvPr id="1026" name="Picture 2" descr="https://github.com/Ningrui-Li/nonlinear_acoustic/blob/master/presentations/nc_bmes_sympo/nonlinear_wave_through_time.png?raw=true"/>
+          <p:cNvPicPr>
+            <a:picLocks noChangeAspect="1" noChangeArrowheads="1"/>
+          </p:cNvPicPr>
+          <p:nvPr/>
+        </p:nvPicPr>
+        <p:blipFill rotWithShape="1">
+          <a:blip r:embed="rId3">
+            <a:extLst>
+              <a:ext uri="{28A0092B-C50C-407E-A947-70E740481C1C}">
+                <a14:useLocalDpi xmlns:a14="http://schemas.microsoft.com/office/drawing/2010/main" val="0"/>
+              </a:ext>
+            </a:extLst>
+          </a:blip>
+          <a:srcRect l="6595" r="8210" b="1482"/>
+          <a:stretch/>
+        </p:blipFill>
+        <p:spPr bwMode="auto">
+          <a:xfrm>
+            <a:off x="6458990" y="1825625"/>
+            <a:ext cx="5261956" cy="4550237"/>
+          </a:xfrm>
+          <a:prstGeom prst="rect">
+            <a:avLst/>
+          </a:prstGeom>
+          <a:noFill/>
+          <a:extLst>
+            <a:ext uri="{909E8E84-426E-40DD-AFC4-6F175D3DCCD1}">
+              <a14:hiddenFill xmlns:a14="http://schemas.microsoft.com/office/drawing/2010/main">
+                <a:solidFill>
+                  <a:srgbClr val="FFFFFF"/>
+                </a:solidFill>
+              </a14:hiddenFill>
+            </a:ext>
+          </a:extLst>
+        </p:spPr>
+      </p:pic>
+    </p:spTree>
+    <p:extLst>
+      <p:ext uri="{BB962C8B-B14F-4D97-AF65-F5344CB8AC3E}">
+        <p14:creationId xmlns:p14="http://schemas.microsoft.com/office/powerpoint/2010/main" val="2317783320"/>
+      </p:ext>
+    </p:extLst>
+  </p:cSld>
+  <p:clrMapOvr>
+    <a:masterClrMapping/>
+  </p:clrMapOvr>
+  <p:timing>
+    <p:tnLst>
+      <p:par>
+        <p:cTn id="1" dur="indefinite" restart="never" nodeType="tmRoot"/>
+      </p:par>
+    </p:tnLst>
+  </p:timing>
+</p:sld>
+</file>
+
+<file path=ppt/slides/slide5.xml><?xml version="1.0" encoding="utf-8"?>
+<p:sld xmlns:a="http://schemas.openxmlformats.org/drawingml/2006/main" xmlns:r="http://schemas.openxmlformats.org/officeDocument/2006/relationships" xmlns:p="http://schemas.openxmlformats.org/presentationml/2006/main">
+  <p:cSld>
+    <p:spTree>
+      <p:nvGrpSpPr>
+        <p:cNvPr id="1" name=""/>
+        <p:cNvGrpSpPr/>
+        <p:nvPr/>
+      </p:nvGrpSpPr>
+      <p:grpSpPr>
+        <a:xfrm>
+          <a:off x="0" y="0"/>
+          <a:ext cx="0" cy="0"/>
+          <a:chOff x="0" y="0"/>
+          <a:chExt cx="0" cy="0"/>
+        </a:xfrm>
+      </p:grpSpPr>
+      <p:sp>
+        <p:nvSpPr>
+          <p:cNvPr id="2" name="Title 1"/>
+          <p:cNvSpPr>
+            <a:spLocks noGrp="1"/>
+          </p:cNvSpPr>
+          <p:nvPr>
+            <p:ph type="title"/>
+          </p:nvPr>
+        </p:nvSpPr>
+        <p:spPr/>
+        <p:txBody>
+          <a:bodyPr/>
+          <a:lstStyle/>
+          <a:p>
+            <a:r>
+              <a:rPr lang="en-US" dirty="0" smtClean="0"/>
+              <a:t>Validation with Field II – 30 mm Focus</a:t>
+            </a:r>
+            <a:endParaRPr lang="en-US" dirty="0"/>
+          </a:p>
+        </p:txBody>
+      </p:sp>
+      <p:pic>
+        <p:nvPicPr>
+          <p:cNvPr id="2050" name="Picture 2" descr="https://raw.githubusercontent.com/Ningrui-Li/nonlinear_acoustic/master/comparisons/focus30mm/linear_compare/field_kzk_centertrace_c52_30mm.png"/>
+          <p:cNvPicPr>
+            <a:picLocks noGrp="1" noChangeAspect="1" noChangeArrowheads="1"/>
+          </p:cNvPicPr>
+          <p:nvPr>
+            <p:ph idx="1"/>
+          </p:nvPr>
+        </p:nvPicPr>
+        <p:blipFill>
+          <a:blip r:embed="rId2">
+            <a:extLst>
+              <a:ext uri="{28A0092B-C50C-407E-A947-70E740481C1C}">
+                <a14:useLocalDpi xmlns:a14="http://schemas.microsoft.com/office/drawing/2010/main" val="0"/>
+              </a:ext>
+            </a:extLst>
+          </a:blip>
+          <a:srcRect/>
+          <a:stretch>
+            <a:fillRect/>
+          </a:stretch>
+        </p:blipFill>
+        <p:spPr bwMode="auto">
+          <a:xfrm>
+            <a:off x="4396172" y="1509743"/>
+            <a:ext cx="6957628" cy="5218221"/>
+          </a:xfrm>
+          <a:prstGeom prst="rect">
+            <a:avLst/>
+          </a:prstGeom>
+          <a:noFill/>
+          <a:extLst>
+            <a:ext uri="{909E8E84-426E-40DD-AFC4-6F175D3DCCD1}">
+              <a14:hiddenFill xmlns:a14="http://schemas.microsoft.com/office/drawing/2010/main">
+                <a:solidFill>
+                  <a:srgbClr val="FFFFFF"/>
+                </a:solidFill>
+              </a14:hiddenFill>
+            </a:ext>
+          </a:extLst>
+        </p:spPr>
+      </p:pic>
+      <p:sp>
+        <p:nvSpPr>
+          <p:cNvPr id="5" name="TextBox 4"/>
+          <p:cNvSpPr txBox="1"/>
+          <p:nvPr/>
+        </p:nvSpPr>
+        <p:spPr>
+          <a:xfrm>
+            <a:off x="515389" y="1878676"/>
+            <a:ext cx="4314307" cy="1569660"/>
+          </a:xfrm>
+          <a:prstGeom prst="rect">
+            <a:avLst/>
+          </a:prstGeom>
+          <a:noFill/>
+        </p:spPr>
+        <p:txBody>
+          <a:bodyPr wrap="square" rtlCol="0">
+            <a:spAutoFit/>
+          </a:bodyPr>
+          <a:lstStyle/>
+          <a:p>
+            <a:pPr marL="285750" indent="-285750">
+              <a:buFont typeface="Arial" panose="020B0604020202020204" pitchFamily="34" charset="0"/>
+              <a:buChar char="•"/>
+            </a:pPr>
+            <a:r>
+              <a:rPr lang="en-US" sz="2400" dirty="0" smtClean="0"/>
+              <a:t>Axial intensities down the center (</a:t>
+            </a:r>
+            <a:r>
+              <a:rPr lang="en-US" sz="2400" dirty="0" err="1" smtClean="0"/>
+              <a:t>lat</a:t>
+            </a:r>
+            <a:r>
+              <a:rPr lang="en-US" sz="2400" dirty="0" smtClean="0"/>
+              <a:t> = 0mm, </a:t>
+            </a:r>
+            <a:r>
+              <a:rPr lang="en-US" sz="2400" dirty="0" err="1" smtClean="0"/>
+              <a:t>ele</a:t>
+            </a:r>
+            <a:r>
+              <a:rPr lang="en-US" sz="2400" dirty="0" smtClean="0"/>
+              <a:t> = 0mm)</a:t>
+            </a:r>
+          </a:p>
+          <a:p>
+            <a:pPr marL="285750" indent="-285750">
+              <a:buFont typeface="Arial" panose="020B0604020202020204" pitchFamily="34" charset="0"/>
+              <a:buChar char="•"/>
+            </a:pPr>
+            <a:r>
+              <a:rPr lang="el-GR" sz="2400" dirty="0" smtClean="0"/>
+              <a:t>α</a:t>
+            </a:r>
+            <a:r>
+              <a:rPr lang="en-US" sz="2400" dirty="0" smtClean="0"/>
+              <a:t> </a:t>
+            </a:r>
+            <a:r>
+              <a:rPr lang="en-US" sz="2400" dirty="0"/>
+              <a:t>= </a:t>
+            </a:r>
+            <a:r>
+              <a:rPr lang="en-US" sz="2400" dirty="0" smtClean="0"/>
+              <a:t>0.005 dB/cm/MHz</a:t>
+            </a:r>
+            <a:endParaRPr lang="en-US" sz="2400" dirty="0"/>
+          </a:p>
+          <a:p>
+            <a:pPr marL="285750" indent="-285750">
+              <a:buFont typeface="Arial" panose="020B0604020202020204" pitchFamily="34" charset="0"/>
+              <a:buChar char="•"/>
+            </a:pPr>
+            <a:r>
+              <a:rPr lang="el-GR" sz="2400" dirty="0"/>
+              <a:t>β </a:t>
+            </a:r>
+            <a:r>
+              <a:rPr lang="en-US" sz="2400" dirty="0"/>
+              <a:t>= 0</a:t>
+            </a:r>
+            <a:endParaRPr lang="en-US" sz="2400" dirty="0"/>
+          </a:p>
+        </p:txBody>
+      </p:sp>
+    </p:spTree>
+    <p:extLst>
+      <p:ext uri="{BB962C8B-B14F-4D97-AF65-F5344CB8AC3E}">
+        <p14:creationId xmlns:p14="http://schemas.microsoft.com/office/powerpoint/2010/main" val="3498071076"/>
+      </p:ext>
+    </p:extLst>
+  </p:cSld>
+  <p:clrMapOvr>
+    <a:masterClrMapping/>
+  </p:clrMapOvr>
+  <p:timing>
+    <p:tnLst>
+      <p:par>
+        <p:cTn id="1" dur="indefinite" restart="never" nodeType="tmRoot"/>
+      </p:par>
+    </p:tnLst>
+  </p:timing>
+</p:sld>
+</file>
+
+<file path=ppt/slides/slide6.xml><?xml version="1.0" encoding="utf-8"?>
+<p:sld xmlns:a="http://schemas.openxmlformats.org/drawingml/2006/main" xmlns:r="http://schemas.openxmlformats.org/officeDocument/2006/relationships" xmlns:p="http://schemas.openxmlformats.org/presentationml/2006/main">
+  <p:cSld>
+    <p:spTree>
+      <p:nvGrpSpPr>
+        <p:cNvPr id="1" name=""/>
+        <p:cNvGrpSpPr/>
+        <p:nvPr/>
+      </p:nvGrpSpPr>
+      <p:grpSpPr>
+        <a:xfrm>
+          <a:off x="0" y="0"/>
+          <a:ext cx="0" cy="0"/>
+          <a:chOff x="0" y="0"/>
+          <a:chExt cx="0" cy="0"/>
+        </a:xfrm>
+      </p:grpSpPr>
+      <p:sp>
+        <p:nvSpPr>
+          <p:cNvPr id="2" name="Title 1"/>
+          <p:cNvSpPr>
+            <a:spLocks noGrp="1"/>
+          </p:cNvSpPr>
+          <p:nvPr>
+            <p:ph type="title"/>
+          </p:nvPr>
+        </p:nvSpPr>
+        <p:spPr/>
+        <p:txBody>
+          <a:bodyPr/>
+          <a:lstStyle/>
+          <a:p>
+            <a:r>
+              <a:rPr lang="en-US" dirty="0" smtClean="0"/>
+              <a:t>Validation with Field II – 70 mm Focus</a:t>
+            </a:r>
+            <a:endParaRPr lang="en-US" dirty="0"/>
+          </a:p>
+        </p:txBody>
+      </p:sp>
+      <p:pic>
+        <p:nvPicPr>
+          <p:cNvPr id="4" name="Picture 2" descr="https://github.com/Ningrui-Li/nonlinear_acoustic/blob/master/comparisons/focus70mm/linear_compare/a_0/field_kzk_centertrace_c52_70mm.png?raw=true"/>
+          <p:cNvPicPr>
+            <a:picLocks noChangeAspect="1" noChangeArrowheads="1"/>
+          </p:cNvPicPr>
+          <p:nvPr/>
+        </p:nvPicPr>
+        <p:blipFill>
+          <a:blip r:embed="rId2">
+            <a:extLst>
+              <a:ext uri="{28A0092B-C50C-407E-A947-70E740481C1C}">
+                <a14:useLocalDpi xmlns:a14="http://schemas.microsoft.com/office/drawing/2010/main" val="0"/>
+              </a:ext>
+            </a:extLst>
+          </a:blip>
+          <a:srcRect/>
+          <a:stretch>
+            <a:fillRect/>
+          </a:stretch>
+        </p:blipFill>
+        <p:spPr bwMode="auto">
+          <a:xfrm>
+            <a:off x="335423" y="1690688"/>
+            <a:ext cx="5367539" cy="4025654"/>
+          </a:xfrm>
+          <a:prstGeom prst="rect">
+            <a:avLst/>
+          </a:prstGeom>
+          <a:noFill/>
+          <a:extLst>
+            <a:ext uri="{909E8E84-426E-40DD-AFC4-6F175D3DCCD1}">
+              <a14:hiddenFill xmlns:a14="http://schemas.microsoft.com/office/drawing/2010/main">
+                <a:solidFill>
+                  <a:srgbClr val="FFFFFF"/>
+                </a:solidFill>
+              </a14:hiddenFill>
+            </a:ext>
+          </a:extLst>
+        </p:spPr>
+      </p:pic>
+      <p:pic>
+        <p:nvPicPr>
+          <p:cNvPr id="4098" name="Picture 2" descr="https://github.com/Ningrui-Li/nonlinear_acoustic/blob/master/comparisons/focus70mm/linear_compare/a_0.45/field_kzk_centertrace_c52_70mm.png?raw=true"/>
+          <p:cNvPicPr>
+            <a:picLocks noChangeAspect="1" noChangeArrowheads="1"/>
+          </p:cNvPicPr>
+          <p:nvPr/>
+        </p:nvPicPr>
+        <p:blipFill>
+          <a:blip r:embed="rId3">
+            <a:extLst>
+              <a:ext uri="{28A0092B-C50C-407E-A947-70E740481C1C}">
+                <a14:useLocalDpi xmlns:a14="http://schemas.microsoft.com/office/drawing/2010/main" val="0"/>
+              </a:ext>
+            </a:extLst>
+          </a:blip>
+          <a:srcRect/>
+          <a:stretch>
+            <a:fillRect/>
+          </a:stretch>
+        </p:blipFill>
+        <p:spPr bwMode="auto">
+          <a:xfrm>
+            <a:off x="6205739" y="1690688"/>
+            <a:ext cx="5231073" cy="4025654"/>
+          </a:xfrm>
+          <a:prstGeom prst="rect">
+            <a:avLst/>
+          </a:prstGeom>
+          <a:noFill/>
+          <a:extLst>
+            <a:ext uri="{909E8E84-426E-40DD-AFC4-6F175D3DCCD1}">
+              <a14:hiddenFill xmlns:a14="http://schemas.microsoft.com/office/drawing/2010/main">
+                <a:solidFill>
+                  <a:srgbClr val="FFFFFF"/>
+                </a:solidFill>
+              </a14:hiddenFill>
+            </a:ext>
+          </a:extLst>
+        </p:spPr>
+      </p:pic>
+      <p:sp>
+        <p:nvSpPr>
+          <p:cNvPr id="6" name="Content Placeholder 2"/>
+          <p:cNvSpPr>
+            <a:spLocks noGrp="1"/>
+          </p:cNvSpPr>
+          <p:nvPr>
+            <p:ph idx="1"/>
+          </p:nvPr>
+        </p:nvSpPr>
+        <p:spPr>
+          <a:xfrm>
+            <a:off x="7199600" y="5912194"/>
+            <a:ext cx="3243350" cy="446650"/>
+          </a:xfrm>
+        </p:spPr>
+        <p:txBody>
+          <a:bodyPr>
+            <a:normAutofit lnSpcReduction="10000"/>
+          </a:bodyPr>
+          <a:lstStyle/>
+          <a:p>
+            <a:pPr marL="0" indent="0">
+              <a:buNone/>
+            </a:pPr>
+            <a:r>
+              <a:rPr lang="el-GR" dirty="0" smtClean="0"/>
+              <a:t>α</a:t>
+            </a:r>
+            <a:r>
+              <a:rPr lang="en-US" dirty="0" smtClean="0"/>
+              <a:t> = 0.45 dB/cm/MHz</a:t>
+            </a:r>
+            <a:endParaRPr lang="en-US" dirty="0"/>
+          </a:p>
+        </p:txBody>
+      </p:sp>
+      <p:sp>
+        <p:nvSpPr>
+          <p:cNvPr id="7" name="Content Placeholder 2"/>
+          <p:cNvSpPr txBox="1">
+            <a:spLocks/>
+          </p:cNvSpPr>
+          <p:nvPr/>
+        </p:nvSpPr>
+        <p:spPr>
+          <a:xfrm>
+            <a:off x="1436310" y="5915428"/>
+            <a:ext cx="3165764" cy="446650"/>
+          </a:xfrm>
+          <a:prstGeom prst="rect">
+            <a:avLst/>
+          </a:prstGeom>
+        </p:spPr>
+        <p:txBody>
+          <a:bodyPr vert="horz" lIns="91440" tIns="45720" rIns="91440" bIns="45720" rtlCol="0">
+            <a:normAutofit fontScale="92500" lnSpcReduction="10000"/>
+          </a:bodyPr>
+          <a:lstStyle>
+            <a:lvl1pPr marL="228600" indent="-228600" algn="l" defTabSz="914400" rtl="0" eaLnBrk="1" latinLnBrk="0" hangingPunct="1">
+              <a:lnSpc>
+                <a:spcPct val="90000"/>
+              </a:lnSpc>
+              <a:spcBef>
+                <a:spcPts val="1000"/>
+              </a:spcBef>
+              <a:buFont typeface="Arial" panose="020B0604020202020204" pitchFamily="34" charset="0"/>
+              <a:buChar char="•"/>
+              <a:defRPr sz="2800" kern="1200">
+                <a:solidFill>
+                  <a:schemeClr val="tx1"/>
+                </a:solidFill>
+                <a:latin typeface="+mn-lt"/>
+                <a:ea typeface="+mn-ea"/>
+                <a:cs typeface="+mn-cs"/>
+              </a:defRPr>
+            </a:lvl1pPr>
+            <a:lvl2pPr marL="685800" indent="-228600" algn="l" defTabSz="914400" rtl="0" eaLnBrk="1" latinLnBrk="0" hangingPunct="1">
+              <a:lnSpc>
+                <a:spcPct val="90000"/>
+              </a:lnSpc>
+              <a:spcBef>
+                <a:spcPts val="500"/>
+              </a:spcBef>
+              <a:buFont typeface="Arial" panose="020B0604020202020204" pitchFamily="34" charset="0"/>
+              <a:buChar char="•"/>
+              <a:defRPr sz="2400" kern="1200">
+                <a:solidFill>
+                  <a:schemeClr val="tx1"/>
+                </a:solidFill>
+                <a:latin typeface="+mn-lt"/>
+                <a:ea typeface="+mn-ea"/>
+                <a:cs typeface="+mn-cs"/>
+              </a:defRPr>
+            </a:lvl2pPr>
+            <a:lvl3pPr marL="1143000" indent="-228600" algn="l" defTabSz="914400" rtl="0" eaLnBrk="1" latinLnBrk="0" hangingPunct="1">
+              <a:lnSpc>
+                <a:spcPct val="90000"/>
+              </a:lnSpc>
+              <a:spcBef>
+                <a:spcPts val="500"/>
+              </a:spcBef>
+              <a:buFont typeface="Arial" panose="020B0604020202020204" pitchFamily="34" charset="0"/>
+              <a:buChar char="•"/>
+              <a:defRPr sz="2000" kern="1200">
+                <a:solidFill>
+                  <a:schemeClr val="tx1"/>
+                </a:solidFill>
+                <a:latin typeface="+mn-lt"/>
+                <a:ea typeface="+mn-ea"/>
+                <a:cs typeface="+mn-cs"/>
+              </a:defRPr>
+            </a:lvl3pPr>
+            <a:lvl4pPr marL="1600200" indent="-228600" algn="l" defTabSz="914400" rtl="0" eaLnBrk="1" latinLnBrk="0" hangingPunct="1">
+              <a:lnSpc>
+                <a:spcPct val="90000"/>
+              </a:lnSpc>
+              <a:spcBef>
+                <a:spcPts val="500"/>
+              </a:spcBef>
+              <a:buFont typeface="Arial" panose="020B0604020202020204" pitchFamily="34" charset="0"/>
+              <a:buChar char="•"/>
+              <a:defRPr sz="1800" kern="1200">
+                <a:solidFill>
+                  <a:schemeClr val="tx1"/>
+                </a:solidFill>
+                <a:latin typeface="+mn-lt"/>
+                <a:ea typeface="+mn-ea"/>
+                <a:cs typeface="+mn-cs"/>
+              </a:defRPr>
+            </a:lvl4pPr>
+            <a:lvl5pPr marL="2057400" indent="-228600" algn="l" defTabSz="914400" rtl="0" eaLnBrk="1" latinLnBrk="0" hangingPunct="1">
+              <a:lnSpc>
+                <a:spcPct val="90000"/>
+              </a:lnSpc>
+              <a:spcBef>
+                <a:spcPts val="500"/>
+              </a:spcBef>
+              <a:buFont typeface="Arial" panose="020B0604020202020204" pitchFamily="34" charset="0"/>
+              <a:buChar char="•"/>
+              <a:defRPr sz="1800" kern="1200">
+                <a:solidFill>
+                  <a:schemeClr val="tx1"/>
+                </a:solidFill>
+                <a:latin typeface="+mn-lt"/>
+                <a:ea typeface="+mn-ea"/>
+                <a:cs typeface="+mn-cs"/>
+              </a:defRPr>
+            </a:lvl5pPr>
+            <a:lvl6pPr marL="2514600" indent="-228600" algn="l" defTabSz="914400" rtl="0" eaLnBrk="1" latinLnBrk="0" hangingPunct="1">
+              <a:lnSpc>
+                <a:spcPct val="90000"/>
+              </a:lnSpc>
+              <a:spcBef>
+                <a:spcPts val="500"/>
+              </a:spcBef>
+              <a:buFont typeface="Arial" panose="020B0604020202020204" pitchFamily="34" charset="0"/>
+              <a:buChar char="•"/>
+              <a:defRPr sz="1800" kern="1200">
+                <a:solidFill>
+                  <a:schemeClr val="tx1"/>
+                </a:solidFill>
+                <a:latin typeface="+mn-lt"/>
+                <a:ea typeface="+mn-ea"/>
+                <a:cs typeface="+mn-cs"/>
+              </a:defRPr>
+            </a:lvl6pPr>
+            <a:lvl7pPr marL="2971800" indent="-228600" algn="l" defTabSz="914400" rtl="0" eaLnBrk="1" latinLnBrk="0" hangingPunct="1">
+              <a:lnSpc>
+                <a:spcPct val="90000"/>
+              </a:lnSpc>
+              <a:spcBef>
+                <a:spcPts val="500"/>
+              </a:spcBef>
+              <a:buFont typeface="Arial" panose="020B0604020202020204" pitchFamily="34" charset="0"/>
+              <a:buChar char="•"/>
+              <a:defRPr sz="1800" kern="1200">
+                <a:solidFill>
+                  <a:schemeClr val="tx1"/>
+                </a:solidFill>
+                <a:latin typeface="+mn-lt"/>
+                <a:ea typeface="+mn-ea"/>
+                <a:cs typeface="+mn-cs"/>
+              </a:defRPr>
+            </a:lvl7pPr>
+            <a:lvl8pPr marL="3429000" indent="-228600" algn="l" defTabSz="914400" rtl="0" eaLnBrk="1" latinLnBrk="0" hangingPunct="1">
+              <a:lnSpc>
+                <a:spcPct val="90000"/>
+              </a:lnSpc>
+              <a:spcBef>
+                <a:spcPts val="500"/>
+              </a:spcBef>
+              <a:buFont typeface="Arial" panose="020B0604020202020204" pitchFamily="34" charset="0"/>
+              <a:buChar char="•"/>
+              <a:defRPr sz="1800" kern="1200">
+                <a:solidFill>
+                  <a:schemeClr val="tx1"/>
+                </a:solidFill>
+                <a:latin typeface="+mn-lt"/>
+                <a:ea typeface="+mn-ea"/>
+                <a:cs typeface="+mn-cs"/>
+              </a:defRPr>
+            </a:lvl8pPr>
+            <a:lvl9pPr marL="3886200" indent="-228600" algn="l" defTabSz="914400" rtl="0" eaLnBrk="1" latinLnBrk="0" hangingPunct="1">
+              <a:lnSpc>
+                <a:spcPct val="90000"/>
+              </a:lnSpc>
+              <a:spcBef>
+                <a:spcPts val="500"/>
+              </a:spcBef>
+              <a:buFont typeface="Arial" panose="020B0604020202020204" pitchFamily="34" charset="0"/>
+              <a:buChar char="•"/>
+              <a:defRPr sz="1800" kern="1200">
+                <a:solidFill>
+                  <a:schemeClr val="tx1"/>
+                </a:solidFill>
+                <a:latin typeface="+mn-lt"/>
+                <a:ea typeface="+mn-ea"/>
+                <a:cs typeface="+mn-cs"/>
+              </a:defRPr>
+            </a:lvl9pPr>
+          </a:lstStyle>
+          <a:p>
+            <a:pPr marL="0" indent="0">
+              <a:buNone/>
+            </a:pPr>
+            <a:r>
+              <a:rPr lang="el-GR" dirty="0" smtClean="0"/>
+              <a:t>α</a:t>
+            </a:r>
+            <a:r>
+              <a:rPr lang="en-US" dirty="0" smtClean="0"/>
+              <a:t> = 0.005 dB/cm/MHz</a:t>
+            </a:r>
+            <a:endParaRPr lang="en-US" dirty="0"/>
+          </a:p>
+        </p:txBody>
+      </p:sp>
+    </p:spTree>
+    <p:extLst>
+      <p:ext uri="{BB962C8B-B14F-4D97-AF65-F5344CB8AC3E}">
+        <p14:creationId xmlns:p14="http://schemas.microsoft.com/office/powerpoint/2010/main" val="3060387823"/>
+      </p:ext>
+    </p:extLst>
+  </p:cSld>
+  <p:clrMapOvr>
+    <a:masterClrMapping/>
+  </p:clrMapOvr>
+  <p:timing>
+    <p:tnLst>
+      <p:par>
+        <p:cTn id="1" dur="indefinite" restart="never" nodeType="tmRoot"/>
+      </p:par>
+    </p:tnLst>
+  </p:timing>
+</p:sld>
+</file>
+
+<file path=ppt/slides/slide7.xml><?xml version="1.0" encoding="utf-8"?>
+<p:sld xmlns:a="http://schemas.openxmlformats.org/drawingml/2006/main" xmlns:r="http://schemas.openxmlformats.org/officeDocument/2006/relationships" xmlns:p="http://schemas.openxmlformats.org/presentationml/2006/main">
+  <p:cSld>
+    <p:spTree>
+      <p:nvGrpSpPr>
+        <p:cNvPr id="1" name=""/>
+        <p:cNvGrpSpPr/>
+        <p:nvPr/>
+      </p:nvGrpSpPr>
+      <p:grpSpPr>
+        <a:xfrm>
+          <a:off x="0" y="0"/>
+          <a:ext cx="0" cy="0"/>
+          <a:chOff x="0" y="0"/>
+          <a:chExt cx="0" cy="0"/>
+        </a:xfrm>
+      </p:grpSpPr>
+      <p:sp>
+        <p:nvSpPr>
+          <p:cNvPr id="2" name="Title 1"/>
+          <p:cNvSpPr>
+            <a:spLocks noGrp="1"/>
+          </p:cNvSpPr>
+          <p:nvPr>
+            <p:ph type="title"/>
+          </p:nvPr>
+        </p:nvSpPr>
+        <p:spPr/>
+        <p:txBody>
+          <a:bodyPr/>
+          <a:lstStyle/>
+          <a:p>
+            <a:endParaRPr lang="en-US"/>
+          </a:p>
+        </p:txBody>
+      </p:sp>
+      <p:sp>
+        <p:nvSpPr>
+          <p:cNvPr id="3" name="Content Placeholder 2"/>
+          <p:cNvSpPr>
+            <a:spLocks noGrp="1"/>
+          </p:cNvSpPr>
+          <p:nvPr>
+            <p:ph idx="1"/>
+          </p:nvPr>
+        </p:nvSpPr>
+        <p:spPr/>
+        <p:txBody>
+          <a:bodyPr/>
+          <a:lstStyle/>
+          <a:p>
+            <a:endParaRPr lang="en-US" dirty="0"/>
+          </a:p>
+        </p:txBody>
+      </p:sp>
+    </p:spTree>
+    <p:extLst>
+      <p:ext uri="{BB962C8B-B14F-4D97-AF65-F5344CB8AC3E}">
+        <p14:creationId xmlns:p14="http://schemas.microsoft.com/office/powerpoint/2010/main" val="454608012"/>
+      </p:ext>
+    </p:extLst>
+  </p:cSld>
+  <p:clrMapOvr>
+    <a:masterClrMapping/>
+  </p:clrMapOvr>
+  <p:timing>
+    <p:tnLst>
+      <p:par>
+        <p:cTn id="1" dur="indefinite" restart="never" nodeType="tmRoot"/>
+      </p:par>
+    </p:tnLst>
+  </p:timing>
 </p:sld>
 </file>
 

</xml_diff>

<commit_message>
added paraview plots + started dyna explanation on lab meeting presentation slides
</commit_message>
<xml_diff>
--- a/presentations/lab_meeting/lab_meeting_2015.04.24_kzk_sws.pptx
+++ b/presentations/lab_meeting/lab_meeting_2015.04.24_kzk_sws.pptx
@@ -4,6 +4,9 @@
   <p:sldMasterIdLst>
     <p:sldMasterId id="2147483648" r:id="rId1"/>
   </p:sldMasterIdLst>
+  <p:notesMasterIdLst>
+    <p:notesMasterId r:id="rId13"/>
+  </p:notesMasterIdLst>
   <p:sldIdLst>
     <p:sldId id="256" r:id="rId2"/>
     <p:sldId id="257" r:id="rId3"/>
@@ -12,6 +15,10 @@
     <p:sldId id="261" r:id="rId6"/>
     <p:sldId id="262" r:id="rId7"/>
     <p:sldId id="259" r:id="rId8"/>
+    <p:sldId id="264" r:id="rId9"/>
+    <p:sldId id="266" r:id="rId10"/>
+    <p:sldId id="265" r:id="rId11"/>
+    <p:sldId id="267" r:id="rId12"/>
   </p:sldIdLst>
   <p:sldSz cx="12192000" cy="6858000"/>
   <p:notesSz cx="6858000" cy="9144000"/>
@@ -116,6 +123,808 @@
     </p:ext>
   </p:extLst>
 </p:presentation>
+</file>
+
+<file path=ppt/notesMasters/notesMaster1.xml><?xml version="1.0" encoding="utf-8"?>
+<p:notesMaster xmlns:a="http://schemas.openxmlformats.org/drawingml/2006/main" xmlns:r="http://schemas.openxmlformats.org/officeDocument/2006/relationships" xmlns:p="http://schemas.openxmlformats.org/presentationml/2006/main">
+  <p:cSld>
+    <p:bg>
+      <p:bgRef idx="1001">
+        <a:schemeClr val="bg1"/>
+      </p:bgRef>
+    </p:bg>
+    <p:spTree>
+      <p:nvGrpSpPr>
+        <p:cNvPr id="1" name=""/>
+        <p:cNvGrpSpPr/>
+        <p:nvPr/>
+      </p:nvGrpSpPr>
+      <p:grpSpPr>
+        <a:xfrm>
+          <a:off x="0" y="0"/>
+          <a:ext cx="0" cy="0"/>
+          <a:chOff x="0" y="0"/>
+          <a:chExt cx="0" cy="0"/>
+        </a:xfrm>
+      </p:grpSpPr>
+      <p:sp>
+        <p:nvSpPr>
+          <p:cNvPr id="2" name="Header Placeholder 1"/>
+          <p:cNvSpPr>
+            <a:spLocks noGrp="1"/>
+          </p:cNvSpPr>
+          <p:nvPr>
+            <p:ph type="hdr" sz="quarter"/>
+          </p:nvPr>
+        </p:nvSpPr>
+        <p:spPr>
+          <a:xfrm>
+            <a:off x="0" y="0"/>
+            <a:ext cx="2971800" cy="458788"/>
+          </a:xfrm>
+          <a:prstGeom prst="rect">
+            <a:avLst/>
+          </a:prstGeom>
+        </p:spPr>
+        <p:txBody>
+          <a:bodyPr vert="horz" lIns="91440" tIns="45720" rIns="91440" bIns="45720" rtlCol="0"/>
+          <a:lstStyle>
+            <a:lvl1pPr algn="l">
+              <a:defRPr sz="1200"/>
+            </a:lvl1pPr>
+          </a:lstStyle>
+          <a:p>
+            <a:endParaRPr lang="en-US"/>
+          </a:p>
+        </p:txBody>
+      </p:sp>
+      <p:sp>
+        <p:nvSpPr>
+          <p:cNvPr id="3" name="Date Placeholder 2"/>
+          <p:cNvSpPr>
+            <a:spLocks noGrp="1"/>
+          </p:cNvSpPr>
+          <p:nvPr>
+            <p:ph type="dt" idx="1"/>
+          </p:nvPr>
+        </p:nvSpPr>
+        <p:spPr>
+          <a:xfrm>
+            <a:off x="3884613" y="0"/>
+            <a:ext cx="2971800" cy="458788"/>
+          </a:xfrm>
+          <a:prstGeom prst="rect">
+            <a:avLst/>
+          </a:prstGeom>
+        </p:spPr>
+        <p:txBody>
+          <a:bodyPr vert="horz" lIns="91440" tIns="45720" rIns="91440" bIns="45720" rtlCol="0"/>
+          <a:lstStyle>
+            <a:lvl1pPr algn="r">
+              <a:defRPr sz="1200"/>
+            </a:lvl1pPr>
+          </a:lstStyle>
+          <a:p>
+            <a:fld id="{563C771D-92A0-47B1-8588-1C7AA0C1BA03}" type="datetimeFigureOut">
+              <a:rPr lang="en-US" smtClean="0"/>
+              <a:t>4/23/2015</a:t>
+            </a:fld>
+            <a:endParaRPr lang="en-US"/>
+          </a:p>
+        </p:txBody>
+      </p:sp>
+      <p:sp>
+        <p:nvSpPr>
+          <p:cNvPr id="4" name="Slide Image Placeholder 3"/>
+          <p:cNvSpPr>
+            <a:spLocks noGrp="1" noRot="1" noChangeAspect="1"/>
+          </p:cNvSpPr>
+          <p:nvPr>
+            <p:ph type="sldImg" idx="2"/>
+          </p:nvPr>
+        </p:nvSpPr>
+        <p:spPr>
+          <a:xfrm>
+            <a:off x="685800" y="1143000"/>
+            <a:ext cx="5486400" cy="3086100"/>
+          </a:xfrm>
+          <a:prstGeom prst="rect">
+            <a:avLst/>
+          </a:prstGeom>
+          <a:noFill/>
+          <a:ln w="12700">
+            <a:solidFill>
+              <a:prstClr val="black"/>
+            </a:solidFill>
+          </a:ln>
+        </p:spPr>
+        <p:txBody>
+          <a:bodyPr vert="horz" lIns="91440" tIns="45720" rIns="91440" bIns="45720" rtlCol="0" anchor="ctr"/>
+          <a:lstStyle/>
+          <a:p>
+            <a:endParaRPr lang="en-US"/>
+          </a:p>
+        </p:txBody>
+      </p:sp>
+      <p:sp>
+        <p:nvSpPr>
+          <p:cNvPr id="5" name="Notes Placeholder 4"/>
+          <p:cNvSpPr>
+            <a:spLocks noGrp="1"/>
+          </p:cNvSpPr>
+          <p:nvPr>
+            <p:ph type="body" sz="quarter" idx="3"/>
+          </p:nvPr>
+        </p:nvSpPr>
+        <p:spPr>
+          <a:xfrm>
+            <a:off x="685800" y="4400550"/>
+            <a:ext cx="5486400" cy="3600450"/>
+          </a:xfrm>
+          <a:prstGeom prst="rect">
+            <a:avLst/>
+          </a:prstGeom>
+        </p:spPr>
+        <p:txBody>
+          <a:bodyPr vert="horz" lIns="91440" tIns="45720" rIns="91440" bIns="45720" rtlCol="0"/>
+          <a:lstStyle/>
+          <a:p>
+            <a:pPr lvl="0"/>
+            <a:r>
+              <a:rPr lang="en-US" smtClean="0"/>
+              <a:t>Click to edit Master text styles</a:t>
+            </a:r>
+          </a:p>
+          <a:p>
+            <a:pPr lvl="1"/>
+            <a:r>
+              <a:rPr lang="en-US" smtClean="0"/>
+              <a:t>Second level</a:t>
+            </a:r>
+          </a:p>
+          <a:p>
+            <a:pPr lvl="2"/>
+            <a:r>
+              <a:rPr lang="en-US" smtClean="0"/>
+              <a:t>Third level</a:t>
+            </a:r>
+          </a:p>
+          <a:p>
+            <a:pPr lvl="3"/>
+            <a:r>
+              <a:rPr lang="en-US" smtClean="0"/>
+              <a:t>Fourth level</a:t>
+            </a:r>
+          </a:p>
+          <a:p>
+            <a:pPr lvl="4"/>
+            <a:r>
+              <a:rPr lang="en-US" smtClean="0"/>
+              <a:t>Fifth level</a:t>
+            </a:r>
+            <a:endParaRPr lang="en-US"/>
+          </a:p>
+        </p:txBody>
+      </p:sp>
+      <p:sp>
+        <p:nvSpPr>
+          <p:cNvPr id="6" name="Footer Placeholder 5"/>
+          <p:cNvSpPr>
+            <a:spLocks noGrp="1"/>
+          </p:cNvSpPr>
+          <p:nvPr>
+            <p:ph type="ftr" sz="quarter" idx="4"/>
+          </p:nvPr>
+        </p:nvSpPr>
+        <p:spPr>
+          <a:xfrm>
+            <a:off x="0" y="8685213"/>
+            <a:ext cx="2971800" cy="458787"/>
+          </a:xfrm>
+          <a:prstGeom prst="rect">
+            <a:avLst/>
+          </a:prstGeom>
+        </p:spPr>
+        <p:txBody>
+          <a:bodyPr vert="horz" lIns="91440" tIns="45720" rIns="91440" bIns="45720" rtlCol="0" anchor="b"/>
+          <a:lstStyle>
+            <a:lvl1pPr algn="l">
+              <a:defRPr sz="1200"/>
+            </a:lvl1pPr>
+          </a:lstStyle>
+          <a:p>
+            <a:endParaRPr lang="en-US"/>
+          </a:p>
+        </p:txBody>
+      </p:sp>
+      <p:sp>
+        <p:nvSpPr>
+          <p:cNvPr id="7" name="Slide Number Placeholder 6"/>
+          <p:cNvSpPr>
+            <a:spLocks noGrp="1"/>
+          </p:cNvSpPr>
+          <p:nvPr>
+            <p:ph type="sldNum" sz="quarter" idx="5"/>
+          </p:nvPr>
+        </p:nvSpPr>
+        <p:spPr>
+          <a:xfrm>
+            <a:off x="3884613" y="8685213"/>
+            <a:ext cx="2971800" cy="458787"/>
+          </a:xfrm>
+          <a:prstGeom prst="rect">
+            <a:avLst/>
+          </a:prstGeom>
+        </p:spPr>
+        <p:txBody>
+          <a:bodyPr vert="horz" lIns="91440" tIns="45720" rIns="91440" bIns="45720" rtlCol="0" anchor="b"/>
+          <a:lstStyle>
+            <a:lvl1pPr algn="r">
+              <a:defRPr sz="1200"/>
+            </a:lvl1pPr>
+          </a:lstStyle>
+          <a:p>
+            <a:fld id="{68208AFF-1C65-4E6A-ACD9-43CDFFA0A9E4}" type="slidenum">
+              <a:rPr lang="en-US" smtClean="0"/>
+              <a:t>‹#›</a:t>
+            </a:fld>
+            <a:endParaRPr lang="en-US"/>
+          </a:p>
+        </p:txBody>
+      </p:sp>
+    </p:spTree>
+    <p:extLst>
+      <p:ext uri="{BB962C8B-B14F-4D97-AF65-F5344CB8AC3E}">
+        <p14:creationId xmlns:p14="http://schemas.microsoft.com/office/powerpoint/2010/main" val="3639740523"/>
+      </p:ext>
+    </p:extLst>
+  </p:cSld>
+  <p:clrMap bg1="lt1" tx1="dk1" bg2="lt2" tx2="dk2" accent1="accent1" accent2="accent2" accent3="accent3" accent4="accent4" accent5="accent5" accent6="accent6" hlink="hlink" folHlink="folHlink"/>
+  <p:notesStyle>
+    <a:lvl1pPr marL="0" algn="l" defTabSz="914400" rtl="0" eaLnBrk="1" latinLnBrk="0" hangingPunct="1">
+      <a:defRPr sz="1200" kern="1200">
+        <a:solidFill>
+          <a:schemeClr val="tx1"/>
+        </a:solidFill>
+        <a:latin typeface="+mn-lt"/>
+        <a:ea typeface="+mn-ea"/>
+        <a:cs typeface="+mn-cs"/>
+      </a:defRPr>
+    </a:lvl1pPr>
+    <a:lvl2pPr marL="457200" algn="l" defTabSz="914400" rtl="0" eaLnBrk="1" latinLnBrk="0" hangingPunct="1">
+      <a:defRPr sz="1200" kern="1200">
+        <a:solidFill>
+          <a:schemeClr val="tx1"/>
+        </a:solidFill>
+        <a:latin typeface="+mn-lt"/>
+        <a:ea typeface="+mn-ea"/>
+        <a:cs typeface="+mn-cs"/>
+      </a:defRPr>
+    </a:lvl2pPr>
+    <a:lvl3pPr marL="914400" algn="l" defTabSz="914400" rtl="0" eaLnBrk="1" latinLnBrk="0" hangingPunct="1">
+      <a:defRPr sz="1200" kern="1200">
+        <a:solidFill>
+          <a:schemeClr val="tx1"/>
+        </a:solidFill>
+        <a:latin typeface="+mn-lt"/>
+        <a:ea typeface="+mn-ea"/>
+        <a:cs typeface="+mn-cs"/>
+      </a:defRPr>
+    </a:lvl3pPr>
+    <a:lvl4pPr marL="1371600" algn="l" defTabSz="914400" rtl="0" eaLnBrk="1" latinLnBrk="0" hangingPunct="1">
+      <a:defRPr sz="1200" kern="1200">
+        <a:solidFill>
+          <a:schemeClr val="tx1"/>
+        </a:solidFill>
+        <a:latin typeface="+mn-lt"/>
+        <a:ea typeface="+mn-ea"/>
+        <a:cs typeface="+mn-cs"/>
+      </a:defRPr>
+    </a:lvl4pPr>
+    <a:lvl5pPr marL="1828800" algn="l" defTabSz="914400" rtl="0" eaLnBrk="1" latinLnBrk="0" hangingPunct="1">
+      <a:defRPr sz="1200" kern="1200">
+        <a:solidFill>
+          <a:schemeClr val="tx1"/>
+        </a:solidFill>
+        <a:latin typeface="+mn-lt"/>
+        <a:ea typeface="+mn-ea"/>
+        <a:cs typeface="+mn-cs"/>
+      </a:defRPr>
+    </a:lvl5pPr>
+    <a:lvl6pPr marL="2286000" algn="l" defTabSz="914400" rtl="0" eaLnBrk="1" latinLnBrk="0" hangingPunct="1">
+      <a:defRPr sz="1200" kern="1200">
+        <a:solidFill>
+          <a:schemeClr val="tx1"/>
+        </a:solidFill>
+        <a:latin typeface="+mn-lt"/>
+        <a:ea typeface="+mn-ea"/>
+        <a:cs typeface="+mn-cs"/>
+      </a:defRPr>
+    </a:lvl6pPr>
+    <a:lvl7pPr marL="2743200" algn="l" defTabSz="914400" rtl="0" eaLnBrk="1" latinLnBrk="0" hangingPunct="1">
+      <a:defRPr sz="1200" kern="1200">
+        <a:solidFill>
+          <a:schemeClr val="tx1"/>
+        </a:solidFill>
+        <a:latin typeface="+mn-lt"/>
+        <a:ea typeface="+mn-ea"/>
+        <a:cs typeface="+mn-cs"/>
+      </a:defRPr>
+    </a:lvl7pPr>
+    <a:lvl8pPr marL="3200400" algn="l" defTabSz="914400" rtl="0" eaLnBrk="1" latinLnBrk="0" hangingPunct="1">
+      <a:defRPr sz="1200" kern="1200">
+        <a:solidFill>
+          <a:schemeClr val="tx1"/>
+        </a:solidFill>
+        <a:latin typeface="+mn-lt"/>
+        <a:ea typeface="+mn-ea"/>
+        <a:cs typeface="+mn-cs"/>
+      </a:defRPr>
+    </a:lvl8pPr>
+    <a:lvl9pPr marL="3657600" algn="l" defTabSz="914400" rtl="0" eaLnBrk="1" latinLnBrk="0" hangingPunct="1">
+      <a:defRPr sz="1200" kern="1200">
+        <a:solidFill>
+          <a:schemeClr val="tx1"/>
+        </a:solidFill>
+        <a:latin typeface="+mn-lt"/>
+        <a:ea typeface="+mn-ea"/>
+        <a:cs typeface="+mn-cs"/>
+      </a:defRPr>
+    </a:lvl9pPr>
+  </p:notesStyle>
+</p:notesMaster>
+</file>
+
+<file path=ppt/notesSlides/notesSlide1.xml><?xml version="1.0" encoding="utf-8"?>
+<p:notes xmlns:a="http://schemas.openxmlformats.org/drawingml/2006/main" xmlns:r="http://schemas.openxmlformats.org/officeDocument/2006/relationships" xmlns:p="http://schemas.openxmlformats.org/presentationml/2006/main">
+  <p:cSld>
+    <p:spTree>
+      <p:nvGrpSpPr>
+        <p:cNvPr id="1" name=""/>
+        <p:cNvGrpSpPr/>
+        <p:nvPr/>
+      </p:nvGrpSpPr>
+      <p:grpSpPr>
+        <a:xfrm>
+          <a:off x="0" y="0"/>
+          <a:ext cx="0" cy="0"/>
+          <a:chOff x="0" y="0"/>
+          <a:chExt cx="0" cy="0"/>
+        </a:xfrm>
+      </p:grpSpPr>
+      <p:sp>
+        <p:nvSpPr>
+          <p:cNvPr id="2" name="Slide Image Placeholder 1"/>
+          <p:cNvSpPr>
+            <a:spLocks noGrp="1" noRot="1" noChangeAspect="1"/>
+          </p:cNvSpPr>
+          <p:nvPr>
+            <p:ph type="sldImg"/>
+          </p:nvPr>
+        </p:nvSpPr>
+        <p:spPr/>
+      </p:sp>
+      <p:sp>
+        <p:nvSpPr>
+          <p:cNvPr id="3" name="Notes Placeholder 2"/>
+          <p:cNvSpPr>
+            <a:spLocks noGrp="1"/>
+          </p:cNvSpPr>
+          <p:nvPr>
+            <p:ph type="body" idx="1"/>
+          </p:nvPr>
+        </p:nvSpPr>
+        <p:spPr/>
+        <p:txBody>
+          <a:bodyPr/>
+          <a:lstStyle/>
+          <a:p>
+            <a:r>
+              <a:rPr lang="en-US" dirty="0" smtClean="0"/>
+              <a:t>Next series of plots are all center</a:t>
+            </a:r>
+            <a:r>
+              <a:rPr lang="en-US" baseline="0" dirty="0" smtClean="0"/>
+              <a:t> trace plots -&gt; plots of axial intensities down the center of mesh.</a:t>
+            </a:r>
+            <a:endParaRPr lang="en-US" dirty="0"/>
+          </a:p>
+        </p:txBody>
+      </p:sp>
+      <p:sp>
+        <p:nvSpPr>
+          <p:cNvPr id="4" name="Slide Number Placeholder 3"/>
+          <p:cNvSpPr>
+            <a:spLocks noGrp="1"/>
+          </p:cNvSpPr>
+          <p:nvPr>
+            <p:ph type="sldNum" sz="quarter" idx="10"/>
+          </p:nvPr>
+        </p:nvSpPr>
+        <p:spPr/>
+        <p:txBody>
+          <a:bodyPr/>
+          <a:lstStyle/>
+          <a:p>
+            <a:fld id="{68208AFF-1C65-4E6A-ACD9-43CDFFA0A9E4}" type="slidenum">
+              <a:rPr lang="en-US" smtClean="0"/>
+              <a:t>5</a:t>
+            </a:fld>
+            <a:endParaRPr lang="en-US"/>
+          </a:p>
+        </p:txBody>
+      </p:sp>
+    </p:spTree>
+    <p:extLst>
+      <p:ext uri="{BB962C8B-B14F-4D97-AF65-F5344CB8AC3E}">
+        <p14:creationId xmlns:p14="http://schemas.microsoft.com/office/powerpoint/2010/main" val="3498337573"/>
+      </p:ext>
+    </p:extLst>
+  </p:cSld>
+  <p:clrMapOvr>
+    <a:masterClrMapping/>
+  </p:clrMapOvr>
+</p:notes>
+</file>
+
+<file path=ppt/notesSlides/notesSlide2.xml><?xml version="1.0" encoding="utf-8"?>
+<p:notes xmlns:a="http://schemas.openxmlformats.org/drawingml/2006/main" xmlns:r="http://schemas.openxmlformats.org/officeDocument/2006/relationships" xmlns:p="http://schemas.openxmlformats.org/presentationml/2006/main">
+  <p:cSld>
+    <p:spTree>
+      <p:nvGrpSpPr>
+        <p:cNvPr id="1" name=""/>
+        <p:cNvGrpSpPr/>
+        <p:nvPr/>
+      </p:nvGrpSpPr>
+      <p:grpSpPr>
+        <a:xfrm>
+          <a:off x="0" y="0"/>
+          <a:ext cx="0" cy="0"/>
+          <a:chOff x="0" y="0"/>
+          <a:chExt cx="0" cy="0"/>
+        </a:xfrm>
+      </p:grpSpPr>
+      <p:sp>
+        <p:nvSpPr>
+          <p:cNvPr id="2" name="Slide Image Placeholder 1"/>
+          <p:cNvSpPr>
+            <a:spLocks noGrp="1" noRot="1" noChangeAspect="1"/>
+          </p:cNvSpPr>
+          <p:nvPr>
+            <p:ph type="sldImg"/>
+          </p:nvPr>
+        </p:nvSpPr>
+        <p:spPr/>
+      </p:sp>
+      <p:sp>
+        <p:nvSpPr>
+          <p:cNvPr id="3" name="Notes Placeholder 2"/>
+          <p:cNvSpPr>
+            <a:spLocks noGrp="1"/>
+          </p:cNvSpPr>
+          <p:nvPr>
+            <p:ph type="body" idx="1"/>
+          </p:nvPr>
+        </p:nvSpPr>
+        <p:spPr/>
+        <p:txBody>
+          <a:bodyPr/>
+          <a:lstStyle/>
+          <a:p>
+            <a:r>
+              <a:rPr lang="en-US" dirty="0" smtClean="0"/>
+              <a:t>Attenuation</a:t>
+            </a:r>
+            <a:r>
+              <a:rPr lang="en-US" baseline="0" dirty="0" smtClean="0"/>
+              <a:t> differences between Field II and KZK sim? Match up slightly better for no attenuation cases for identical sim inputs when KZK sim run in linear mode.</a:t>
+            </a:r>
+            <a:endParaRPr lang="en-US" dirty="0"/>
+          </a:p>
+        </p:txBody>
+      </p:sp>
+      <p:sp>
+        <p:nvSpPr>
+          <p:cNvPr id="4" name="Slide Number Placeholder 3"/>
+          <p:cNvSpPr>
+            <a:spLocks noGrp="1"/>
+          </p:cNvSpPr>
+          <p:nvPr>
+            <p:ph type="sldNum" sz="quarter" idx="10"/>
+          </p:nvPr>
+        </p:nvSpPr>
+        <p:spPr/>
+        <p:txBody>
+          <a:bodyPr/>
+          <a:lstStyle/>
+          <a:p>
+            <a:fld id="{68208AFF-1C65-4E6A-ACD9-43CDFFA0A9E4}" type="slidenum">
+              <a:rPr lang="en-US" smtClean="0"/>
+              <a:t>6</a:t>
+            </a:fld>
+            <a:endParaRPr lang="en-US"/>
+          </a:p>
+        </p:txBody>
+      </p:sp>
+    </p:spTree>
+    <p:extLst>
+      <p:ext uri="{BB962C8B-B14F-4D97-AF65-F5344CB8AC3E}">
+        <p14:creationId xmlns:p14="http://schemas.microsoft.com/office/powerpoint/2010/main" val="2302256237"/>
+      </p:ext>
+    </p:extLst>
+  </p:cSld>
+  <p:clrMapOvr>
+    <a:masterClrMapping/>
+  </p:clrMapOvr>
+</p:notes>
+</file>
+
+<file path=ppt/notesSlides/notesSlide3.xml><?xml version="1.0" encoding="utf-8"?>
+<p:notes xmlns:a="http://schemas.openxmlformats.org/drawingml/2006/main" xmlns:r="http://schemas.openxmlformats.org/officeDocument/2006/relationships" xmlns:p="http://schemas.openxmlformats.org/presentationml/2006/main">
+  <p:cSld>
+    <p:spTree>
+      <p:nvGrpSpPr>
+        <p:cNvPr id="1" name=""/>
+        <p:cNvGrpSpPr/>
+        <p:nvPr/>
+      </p:nvGrpSpPr>
+      <p:grpSpPr>
+        <a:xfrm>
+          <a:off x="0" y="0"/>
+          <a:ext cx="0" cy="0"/>
+          <a:chOff x="0" y="0"/>
+          <a:chExt cx="0" cy="0"/>
+        </a:xfrm>
+      </p:grpSpPr>
+      <p:sp>
+        <p:nvSpPr>
+          <p:cNvPr id="2" name="Slide Image Placeholder 1"/>
+          <p:cNvSpPr>
+            <a:spLocks noGrp="1" noRot="1" noChangeAspect="1"/>
+          </p:cNvSpPr>
+          <p:nvPr>
+            <p:ph type="sldImg"/>
+          </p:nvPr>
+        </p:nvSpPr>
+        <p:spPr/>
+      </p:sp>
+      <p:sp>
+        <p:nvSpPr>
+          <p:cNvPr id="3" name="Notes Placeholder 2"/>
+          <p:cNvSpPr>
+            <a:spLocks noGrp="1"/>
+          </p:cNvSpPr>
+          <p:nvPr>
+            <p:ph type="body" idx="1"/>
+          </p:nvPr>
+        </p:nvSpPr>
+        <p:spPr/>
+        <p:txBody>
+          <a:bodyPr/>
+          <a:lstStyle/>
+          <a:p>
+            <a:r>
+              <a:rPr lang="en-US" dirty="0" smtClean="0"/>
+              <a:t>As nonlinearity</a:t>
+            </a:r>
+            <a:r>
+              <a:rPr lang="en-US" baseline="0" dirty="0" smtClean="0"/>
+              <a:t> increases, the peak intensities occur at shallower depths. However, nonlinear affects are mitigated for greater attenuation levels.</a:t>
+            </a:r>
+            <a:endParaRPr lang="en-US" dirty="0"/>
+          </a:p>
+        </p:txBody>
+      </p:sp>
+      <p:sp>
+        <p:nvSpPr>
+          <p:cNvPr id="4" name="Slide Number Placeholder 3"/>
+          <p:cNvSpPr>
+            <a:spLocks noGrp="1"/>
+          </p:cNvSpPr>
+          <p:nvPr>
+            <p:ph type="sldNum" sz="quarter" idx="10"/>
+          </p:nvPr>
+        </p:nvSpPr>
+        <p:spPr/>
+        <p:txBody>
+          <a:bodyPr/>
+          <a:lstStyle/>
+          <a:p>
+            <a:fld id="{68208AFF-1C65-4E6A-ACD9-43CDFFA0A9E4}" type="slidenum">
+              <a:rPr lang="en-US" smtClean="0"/>
+              <a:t>7</a:t>
+            </a:fld>
+            <a:endParaRPr lang="en-US"/>
+          </a:p>
+        </p:txBody>
+      </p:sp>
+    </p:spTree>
+    <p:extLst>
+      <p:ext uri="{BB962C8B-B14F-4D97-AF65-F5344CB8AC3E}">
+        <p14:creationId xmlns:p14="http://schemas.microsoft.com/office/powerpoint/2010/main" val="3442966043"/>
+      </p:ext>
+    </p:extLst>
+  </p:cSld>
+  <p:clrMapOvr>
+    <a:masterClrMapping/>
+  </p:clrMapOvr>
+</p:notes>
+</file>
+
+<file path=ppt/notesSlides/notesSlide4.xml><?xml version="1.0" encoding="utf-8"?>
+<p:notes xmlns:a="http://schemas.openxmlformats.org/drawingml/2006/main" xmlns:r="http://schemas.openxmlformats.org/officeDocument/2006/relationships" xmlns:p="http://schemas.openxmlformats.org/presentationml/2006/main">
+  <p:cSld>
+    <p:spTree>
+      <p:nvGrpSpPr>
+        <p:cNvPr id="1" name=""/>
+        <p:cNvGrpSpPr/>
+        <p:nvPr/>
+      </p:nvGrpSpPr>
+      <p:grpSpPr>
+        <a:xfrm>
+          <a:off x="0" y="0"/>
+          <a:ext cx="0" cy="0"/>
+          <a:chOff x="0" y="0"/>
+          <a:chExt cx="0" cy="0"/>
+        </a:xfrm>
+      </p:grpSpPr>
+      <p:sp>
+        <p:nvSpPr>
+          <p:cNvPr id="2" name="Slide Image Placeholder 1"/>
+          <p:cNvSpPr>
+            <a:spLocks noGrp="1" noRot="1" noChangeAspect="1"/>
+          </p:cNvSpPr>
+          <p:nvPr>
+            <p:ph type="sldImg"/>
+          </p:nvPr>
+        </p:nvSpPr>
+        <p:spPr/>
+      </p:sp>
+      <p:sp>
+        <p:nvSpPr>
+          <p:cNvPr id="3" name="Notes Placeholder 2"/>
+          <p:cNvSpPr>
+            <a:spLocks noGrp="1"/>
+          </p:cNvSpPr>
+          <p:nvPr>
+            <p:ph type="body" idx="1"/>
+          </p:nvPr>
+        </p:nvSpPr>
+        <p:spPr/>
+        <p:txBody>
+          <a:bodyPr/>
+          <a:lstStyle/>
+          <a:p>
+            <a:endParaRPr lang="en-US" dirty="0"/>
+          </a:p>
+        </p:txBody>
+      </p:sp>
+      <p:sp>
+        <p:nvSpPr>
+          <p:cNvPr id="4" name="Slide Number Placeholder 3"/>
+          <p:cNvSpPr>
+            <a:spLocks noGrp="1"/>
+          </p:cNvSpPr>
+          <p:nvPr>
+            <p:ph type="sldNum" sz="quarter" idx="10"/>
+          </p:nvPr>
+        </p:nvSpPr>
+        <p:spPr/>
+        <p:txBody>
+          <a:bodyPr/>
+          <a:lstStyle/>
+          <a:p>
+            <a:fld id="{68208AFF-1C65-4E6A-ACD9-43CDFFA0A9E4}" type="slidenum">
+              <a:rPr lang="en-US" smtClean="0"/>
+              <a:t>9</a:t>
+            </a:fld>
+            <a:endParaRPr lang="en-US"/>
+          </a:p>
+        </p:txBody>
+      </p:sp>
+    </p:spTree>
+    <p:extLst>
+      <p:ext uri="{BB962C8B-B14F-4D97-AF65-F5344CB8AC3E}">
+        <p14:creationId xmlns:p14="http://schemas.microsoft.com/office/powerpoint/2010/main" val="323917936"/>
+      </p:ext>
+    </p:extLst>
+  </p:cSld>
+  <p:clrMapOvr>
+    <a:masterClrMapping/>
+  </p:clrMapOvr>
+</p:notes>
+</file>
+
+<file path=ppt/notesSlides/notesSlide5.xml><?xml version="1.0" encoding="utf-8"?>
+<p:notes xmlns:a="http://schemas.openxmlformats.org/drawingml/2006/main" xmlns:r="http://schemas.openxmlformats.org/officeDocument/2006/relationships" xmlns:p="http://schemas.openxmlformats.org/presentationml/2006/main">
+  <p:cSld>
+    <p:spTree>
+      <p:nvGrpSpPr>
+        <p:cNvPr id="1" name=""/>
+        <p:cNvGrpSpPr/>
+        <p:nvPr/>
+      </p:nvGrpSpPr>
+      <p:grpSpPr>
+        <a:xfrm>
+          <a:off x="0" y="0"/>
+          <a:ext cx="0" cy="0"/>
+          <a:chOff x="0" y="0"/>
+          <a:chExt cx="0" cy="0"/>
+        </a:xfrm>
+      </p:grpSpPr>
+      <p:sp>
+        <p:nvSpPr>
+          <p:cNvPr id="2" name="Slide Image Placeholder 1"/>
+          <p:cNvSpPr>
+            <a:spLocks noGrp="1" noRot="1" noChangeAspect="1"/>
+          </p:cNvSpPr>
+          <p:nvPr>
+            <p:ph type="sldImg"/>
+          </p:nvPr>
+        </p:nvSpPr>
+        <p:spPr/>
+      </p:sp>
+      <p:sp>
+        <p:nvSpPr>
+          <p:cNvPr id="3" name="Notes Placeholder 2"/>
+          <p:cNvSpPr>
+            <a:spLocks noGrp="1"/>
+          </p:cNvSpPr>
+          <p:nvPr>
+            <p:ph type="body" idx="1"/>
+          </p:nvPr>
+        </p:nvSpPr>
+        <p:spPr/>
+        <p:txBody>
+          <a:bodyPr/>
+          <a:lstStyle/>
+          <a:p>
+            <a:r>
+              <a:rPr lang="en-US" dirty="0" smtClean="0"/>
+              <a:t>Possible out-of-plane</a:t>
+            </a:r>
+            <a:r>
+              <a:rPr lang="en-US" baseline="0" dirty="0" smtClean="0"/>
+              <a:t> sources???</a:t>
+            </a:r>
+            <a:endParaRPr lang="en-US" dirty="0"/>
+          </a:p>
+        </p:txBody>
+      </p:sp>
+      <p:sp>
+        <p:nvSpPr>
+          <p:cNvPr id="4" name="Slide Number Placeholder 3"/>
+          <p:cNvSpPr>
+            <a:spLocks noGrp="1"/>
+          </p:cNvSpPr>
+          <p:nvPr>
+            <p:ph type="sldNum" sz="quarter" idx="10"/>
+          </p:nvPr>
+        </p:nvSpPr>
+        <p:spPr/>
+        <p:txBody>
+          <a:bodyPr/>
+          <a:lstStyle/>
+          <a:p>
+            <a:fld id="{68208AFF-1C65-4E6A-ACD9-43CDFFA0A9E4}" type="slidenum">
+              <a:rPr lang="en-US" smtClean="0"/>
+              <a:t>10</a:t>
+            </a:fld>
+            <a:endParaRPr lang="en-US"/>
+          </a:p>
+        </p:txBody>
+      </p:sp>
+    </p:spTree>
+    <p:extLst>
+      <p:ext uri="{BB962C8B-B14F-4D97-AF65-F5344CB8AC3E}">
+        <p14:creationId xmlns:p14="http://schemas.microsoft.com/office/powerpoint/2010/main" val="1741909592"/>
+      </p:ext>
+    </p:extLst>
+  </p:cSld>
+  <p:clrMapOvr>
+    <a:masterClrMapping/>
+  </p:clrMapOvr>
+</p:notes>
 </file>
 
 <file path=ppt/slideLayouts/slideLayout1.xml><?xml version="1.0" encoding="utf-8"?>
@@ -3043,6 +3852,803 @@
   <p:clrMapOvr>
     <a:masterClrMapping/>
   </p:clrMapOvr>
+  <p:timing>
+    <p:tnLst>
+      <p:par>
+        <p:cTn id="1" dur="indefinite" restart="never" nodeType="tmRoot"/>
+      </p:par>
+    </p:tnLst>
+  </p:timing>
+</p:sld>
+</file>
+
+<file path=ppt/slides/slide10.xml><?xml version="1.0" encoding="utf-8"?>
+<p:sld xmlns:a="http://schemas.openxmlformats.org/drawingml/2006/main" xmlns:r="http://schemas.openxmlformats.org/officeDocument/2006/relationships" xmlns:p="http://schemas.openxmlformats.org/presentationml/2006/main">
+  <p:cSld>
+    <p:spTree>
+      <p:nvGrpSpPr>
+        <p:cNvPr id="1" name=""/>
+        <p:cNvGrpSpPr/>
+        <p:nvPr/>
+      </p:nvGrpSpPr>
+      <p:grpSpPr>
+        <a:xfrm>
+          <a:off x="0" y="0"/>
+          <a:ext cx="0" cy="0"/>
+          <a:chOff x="0" y="0"/>
+          <a:chExt cx="0" cy="0"/>
+        </a:xfrm>
+      </p:grpSpPr>
+      <p:sp>
+        <p:nvSpPr>
+          <p:cNvPr id="2" name="Title 1"/>
+          <p:cNvSpPr>
+            <a:spLocks noGrp="1"/>
+          </p:cNvSpPr>
+          <p:nvPr>
+            <p:ph type="title"/>
+          </p:nvPr>
+        </p:nvSpPr>
+        <p:spPr>
+          <a:xfrm>
+            <a:off x="819397" y="6453"/>
+            <a:ext cx="10515600" cy="1325563"/>
+          </a:xfrm>
+        </p:spPr>
+        <p:txBody>
+          <a:bodyPr/>
+          <a:lstStyle/>
+          <a:p>
+            <a:r>
+              <a:rPr lang="en-US" dirty="0" smtClean="0"/>
+              <a:t>Intensity Fields with Increasing Nonlinearity</a:t>
+            </a:r>
+            <a:endParaRPr lang="en-US" dirty="0"/>
+          </a:p>
+        </p:txBody>
+      </p:sp>
+      <p:sp>
+        <p:nvSpPr>
+          <p:cNvPr id="3" name="Content Placeholder 2"/>
+          <p:cNvSpPr>
+            <a:spLocks noGrp="1"/>
+          </p:cNvSpPr>
+          <p:nvPr>
+            <p:ph idx="1"/>
+          </p:nvPr>
+        </p:nvSpPr>
+        <p:spPr>
+          <a:xfrm>
+            <a:off x="2189593" y="6393068"/>
+            <a:ext cx="927212" cy="464932"/>
+          </a:xfrm>
+        </p:spPr>
+        <p:txBody>
+          <a:bodyPr>
+            <a:normAutofit/>
+          </a:bodyPr>
+          <a:lstStyle/>
+          <a:p>
+            <a:pPr marL="0" indent="0">
+              <a:buNone/>
+            </a:pPr>
+            <a:r>
+              <a:rPr lang="el-GR" sz="2000" dirty="0" smtClean="0"/>
+              <a:t>β</a:t>
+            </a:r>
+            <a:r>
+              <a:rPr lang="en-US" sz="2000" dirty="0" smtClean="0"/>
+              <a:t> = 3.5</a:t>
+            </a:r>
+            <a:endParaRPr lang="en-US" sz="2000" dirty="0"/>
+          </a:p>
+        </p:txBody>
+      </p:sp>
+      <p:pic>
+        <p:nvPicPr>
+          <p:cNvPr id="5122" name="Picture 2" descr="https://github.com/Ningrui-Li/nonlinear_acoustic/blob/master/presentations/nc_bmes_sympo/paraview_kzk_isocontours/a_0.005/c52_70mm_a_0.005_B_3.5_elevation.png?raw=true"/>
+          <p:cNvPicPr>
+            <a:picLocks noChangeAspect="1" noChangeArrowheads="1"/>
+          </p:cNvPicPr>
+          <p:nvPr/>
+        </p:nvPicPr>
+        <p:blipFill rotWithShape="1">
+          <a:blip r:embed="rId3" cstate="print">
+            <a:extLst>
+              <a:ext uri="{28A0092B-C50C-407E-A947-70E740481C1C}">
+                <a14:useLocalDpi xmlns:a14="http://schemas.microsoft.com/office/drawing/2010/main" val="0"/>
+              </a:ext>
+            </a:extLst>
+          </a:blip>
+          <a:srcRect l="40944" r="42055"/>
+          <a:stretch/>
+        </p:blipFill>
+        <p:spPr bwMode="auto">
+          <a:xfrm>
+            <a:off x="1842549" y="1070759"/>
+            <a:ext cx="1621300" cy="5175662"/>
+          </a:xfrm>
+          <a:prstGeom prst="rect">
+            <a:avLst/>
+          </a:prstGeom>
+          <a:noFill/>
+          <a:extLst>
+            <a:ext uri="{909E8E84-426E-40DD-AFC4-6F175D3DCCD1}">
+              <a14:hiddenFill xmlns:a14="http://schemas.microsoft.com/office/drawing/2010/main">
+                <a:solidFill>
+                  <a:srgbClr val="FFFFFF"/>
+                </a:solidFill>
+              </a14:hiddenFill>
+            </a:ext>
+          </a:extLst>
+        </p:spPr>
+      </p:pic>
+      <p:cxnSp>
+        <p:nvCxnSpPr>
+          <p:cNvPr id="5" name="Straight Arrow Connector 4"/>
+          <p:cNvCxnSpPr/>
+          <p:nvPr/>
+        </p:nvCxnSpPr>
+        <p:spPr>
+          <a:xfrm>
+            <a:off x="275635" y="1677878"/>
+            <a:ext cx="0" cy="625935"/>
+          </a:xfrm>
+          <a:prstGeom prst="straightConnector1">
+            <a:avLst/>
+          </a:prstGeom>
+          <a:ln>
+            <a:tailEnd type="triangle"/>
+          </a:ln>
+        </p:spPr>
+        <p:style>
+          <a:lnRef idx="3">
+            <a:schemeClr val="dk1"/>
+          </a:lnRef>
+          <a:fillRef idx="0">
+            <a:schemeClr val="dk1"/>
+          </a:fillRef>
+          <a:effectRef idx="2">
+            <a:schemeClr val="dk1"/>
+          </a:effectRef>
+          <a:fontRef idx="minor">
+            <a:schemeClr val="tx1"/>
+          </a:fontRef>
+        </p:style>
+      </p:cxnSp>
+      <p:sp>
+        <p:nvSpPr>
+          <p:cNvPr id="6" name="TextBox 5"/>
+          <p:cNvSpPr txBox="1"/>
+          <p:nvPr/>
+        </p:nvSpPr>
+        <p:spPr>
+          <a:xfrm>
+            <a:off x="0" y="2303813"/>
+            <a:ext cx="819397" cy="369332"/>
+          </a:xfrm>
+          <a:prstGeom prst="rect">
+            <a:avLst/>
+          </a:prstGeom>
+          <a:noFill/>
+        </p:spPr>
+        <p:txBody>
+          <a:bodyPr wrap="square" rtlCol="0">
+            <a:spAutoFit/>
+          </a:bodyPr>
+          <a:lstStyle/>
+          <a:p>
+            <a:r>
+              <a:rPr lang="en-US" dirty="0" smtClean="0"/>
+              <a:t>depth</a:t>
+            </a:r>
+            <a:endParaRPr lang="en-US" dirty="0"/>
+          </a:p>
+        </p:txBody>
+      </p:sp>
+      <p:cxnSp>
+        <p:nvCxnSpPr>
+          <p:cNvPr id="7" name="Straight Arrow Connector 6"/>
+          <p:cNvCxnSpPr/>
+          <p:nvPr/>
+        </p:nvCxnSpPr>
+        <p:spPr>
+          <a:xfrm>
+            <a:off x="264284" y="1677878"/>
+            <a:ext cx="557617" cy="0"/>
+          </a:xfrm>
+          <a:prstGeom prst="straightConnector1">
+            <a:avLst/>
+          </a:prstGeom>
+          <a:ln>
+            <a:tailEnd type="triangle"/>
+          </a:ln>
+        </p:spPr>
+        <p:style>
+          <a:lnRef idx="3">
+            <a:schemeClr val="dk1"/>
+          </a:lnRef>
+          <a:fillRef idx="0">
+            <a:schemeClr val="dk1"/>
+          </a:fillRef>
+          <a:effectRef idx="2">
+            <a:schemeClr val="dk1"/>
+          </a:effectRef>
+          <a:fontRef idx="minor">
+            <a:schemeClr val="tx1"/>
+          </a:fontRef>
+        </p:style>
+      </p:cxnSp>
+      <p:sp>
+        <p:nvSpPr>
+          <p:cNvPr id="8" name="TextBox 7"/>
+          <p:cNvSpPr txBox="1"/>
+          <p:nvPr/>
+        </p:nvSpPr>
+        <p:spPr>
+          <a:xfrm>
+            <a:off x="451533" y="1261433"/>
+            <a:ext cx="1163511" cy="369332"/>
+          </a:xfrm>
+          <a:prstGeom prst="rect">
+            <a:avLst/>
+          </a:prstGeom>
+          <a:noFill/>
+        </p:spPr>
+        <p:txBody>
+          <a:bodyPr wrap="square" rtlCol="0">
+            <a:spAutoFit/>
+          </a:bodyPr>
+          <a:lstStyle/>
+          <a:p>
+            <a:r>
+              <a:rPr lang="en-US" dirty="0" smtClean="0"/>
+              <a:t>elevation</a:t>
+            </a:r>
+            <a:endParaRPr lang="en-US" dirty="0"/>
+          </a:p>
+        </p:txBody>
+      </p:sp>
+      <p:pic>
+        <p:nvPicPr>
+          <p:cNvPr id="5124" name="Picture 4" descr="https://github.com/Ningrui-Li/nonlinear_acoustic/blob/master/presentations/nc_bmes_sympo/paraview_kzk_isocontours/a_0.005/c52_70mm_a_0.005_B_0_elevation.png?raw=true"/>
+          <p:cNvPicPr>
+            <a:picLocks noChangeAspect="1" noChangeArrowheads="1"/>
+          </p:cNvPicPr>
+          <p:nvPr/>
+        </p:nvPicPr>
+        <p:blipFill rotWithShape="1">
+          <a:blip r:embed="rId4" cstate="print">
+            <a:extLst>
+              <a:ext uri="{28A0092B-C50C-407E-A947-70E740481C1C}">
+                <a14:useLocalDpi xmlns:a14="http://schemas.microsoft.com/office/drawing/2010/main" val="0"/>
+              </a:ext>
+            </a:extLst>
+          </a:blip>
+          <a:srcRect l="40802" r="42333"/>
+          <a:stretch/>
+        </p:blipFill>
+        <p:spPr bwMode="auto">
+          <a:xfrm>
+            <a:off x="5122328" y="1070759"/>
+            <a:ext cx="1608329" cy="5175662"/>
+          </a:xfrm>
+          <a:prstGeom prst="rect">
+            <a:avLst/>
+          </a:prstGeom>
+          <a:noFill/>
+          <a:extLst>
+            <a:ext uri="{909E8E84-426E-40DD-AFC4-6F175D3DCCD1}">
+              <a14:hiddenFill xmlns:a14="http://schemas.microsoft.com/office/drawing/2010/main">
+                <a:solidFill>
+                  <a:srgbClr val="FFFFFF"/>
+                </a:solidFill>
+              </a14:hiddenFill>
+            </a:ext>
+          </a:extLst>
+        </p:spPr>
+      </p:pic>
+      <p:sp>
+        <p:nvSpPr>
+          <p:cNvPr id="10" name="Content Placeholder 2"/>
+          <p:cNvSpPr txBox="1">
+            <a:spLocks/>
+          </p:cNvSpPr>
+          <p:nvPr/>
+        </p:nvSpPr>
+        <p:spPr>
+          <a:xfrm>
+            <a:off x="5472613" y="6393068"/>
+            <a:ext cx="907758" cy="464932"/>
+          </a:xfrm>
+          <a:prstGeom prst="rect">
+            <a:avLst/>
+          </a:prstGeom>
+        </p:spPr>
+        <p:txBody>
+          <a:bodyPr vert="horz" lIns="91440" tIns="45720" rIns="91440" bIns="45720" rtlCol="0">
+            <a:normAutofit/>
+          </a:bodyPr>
+          <a:lstStyle>
+            <a:lvl1pPr marL="228600" indent="-228600" algn="l" defTabSz="914400" rtl="0" eaLnBrk="1" latinLnBrk="0" hangingPunct="1">
+              <a:lnSpc>
+                <a:spcPct val="90000"/>
+              </a:lnSpc>
+              <a:spcBef>
+                <a:spcPts val="1000"/>
+              </a:spcBef>
+              <a:buFont typeface="Arial" panose="020B0604020202020204" pitchFamily="34" charset="0"/>
+              <a:buChar char="•"/>
+              <a:defRPr sz="2800" kern="1200">
+                <a:solidFill>
+                  <a:schemeClr val="tx1"/>
+                </a:solidFill>
+                <a:latin typeface="+mn-lt"/>
+                <a:ea typeface="+mn-ea"/>
+                <a:cs typeface="+mn-cs"/>
+              </a:defRPr>
+            </a:lvl1pPr>
+            <a:lvl2pPr marL="685800" indent="-228600" algn="l" defTabSz="914400" rtl="0" eaLnBrk="1" latinLnBrk="0" hangingPunct="1">
+              <a:lnSpc>
+                <a:spcPct val="90000"/>
+              </a:lnSpc>
+              <a:spcBef>
+                <a:spcPts val="500"/>
+              </a:spcBef>
+              <a:buFont typeface="Arial" panose="020B0604020202020204" pitchFamily="34" charset="0"/>
+              <a:buChar char="•"/>
+              <a:defRPr sz="2400" kern="1200">
+                <a:solidFill>
+                  <a:schemeClr val="tx1"/>
+                </a:solidFill>
+                <a:latin typeface="+mn-lt"/>
+                <a:ea typeface="+mn-ea"/>
+                <a:cs typeface="+mn-cs"/>
+              </a:defRPr>
+            </a:lvl2pPr>
+            <a:lvl3pPr marL="1143000" indent="-228600" algn="l" defTabSz="914400" rtl="0" eaLnBrk="1" latinLnBrk="0" hangingPunct="1">
+              <a:lnSpc>
+                <a:spcPct val="90000"/>
+              </a:lnSpc>
+              <a:spcBef>
+                <a:spcPts val="500"/>
+              </a:spcBef>
+              <a:buFont typeface="Arial" panose="020B0604020202020204" pitchFamily="34" charset="0"/>
+              <a:buChar char="•"/>
+              <a:defRPr sz="2000" kern="1200">
+                <a:solidFill>
+                  <a:schemeClr val="tx1"/>
+                </a:solidFill>
+                <a:latin typeface="+mn-lt"/>
+                <a:ea typeface="+mn-ea"/>
+                <a:cs typeface="+mn-cs"/>
+              </a:defRPr>
+            </a:lvl3pPr>
+            <a:lvl4pPr marL="1600200" indent="-228600" algn="l" defTabSz="914400" rtl="0" eaLnBrk="1" latinLnBrk="0" hangingPunct="1">
+              <a:lnSpc>
+                <a:spcPct val="90000"/>
+              </a:lnSpc>
+              <a:spcBef>
+                <a:spcPts val="500"/>
+              </a:spcBef>
+              <a:buFont typeface="Arial" panose="020B0604020202020204" pitchFamily="34" charset="0"/>
+              <a:buChar char="•"/>
+              <a:defRPr sz="1800" kern="1200">
+                <a:solidFill>
+                  <a:schemeClr val="tx1"/>
+                </a:solidFill>
+                <a:latin typeface="+mn-lt"/>
+                <a:ea typeface="+mn-ea"/>
+                <a:cs typeface="+mn-cs"/>
+              </a:defRPr>
+            </a:lvl4pPr>
+            <a:lvl5pPr marL="2057400" indent="-228600" algn="l" defTabSz="914400" rtl="0" eaLnBrk="1" latinLnBrk="0" hangingPunct="1">
+              <a:lnSpc>
+                <a:spcPct val="90000"/>
+              </a:lnSpc>
+              <a:spcBef>
+                <a:spcPts val="500"/>
+              </a:spcBef>
+              <a:buFont typeface="Arial" panose="020B0604020202020204" pitchFamily="34" charset="0"/>
+              <a:buChar char="•"/>
+              <a:defRPr sz="1800" kern="1200">
+                <a:solidFill>
+                  <a:schemeClr val="tx1"/>
+                </a:solidFill>
+                <a:latin typeface="+mn-lt"/>
+                <a:ea typeface="+mn-ea"/>
+                <a:cs typeface="+mn-cs"/>
+              </a:defRPr>
+            </a:lvl5pPr>
+            <a:lvl6pPr marL="2514600" indent="-228600" algn="l" defTabSz="914400" rtl="0" eaLnBrk="1" latinLnBrk="0" hangingPunct="1">
+              <a:lnSpc>
+                <a:spcPct val="90000"/>
+              </a:lnSpc>
+              <a:spcBef>
+                <a:spcPts val="500"/>
+              </a:spcBef>
+              <a:buFont typeface="Arial" panose="020B0604020202020204" pitchFamily="34" charset="0"/>
+              <a:buChar char="•"/>
+              <a:defRPr sz="1800" kern="1200">
+                <a:solidFill>
+                  <a:schemeClr val="tx1"/>
+                </a:solidFill>
+                <a:latin typeface="+mn-lt"/>
+                <a:ea typeface="+mn-ea"/>
+                <a:cs typeface="+mn-cs"/>
+              </a:defRPr>
+            </a:lvl6pPr>
+            <a:lvl7pPr marL="2971800" indent="-228600" algn="l" defTabSz="914400" rtl="0" eaLnBrk="1" latinLnBrk="0" hangingPunct="1">
+              <a:lnSpc>
+                <a:spcPct val="90000"/>
+              </a:lnSpc>
+              <a:spcBef>
+                <a:spcPts val="500"/>
+              </a:spcBef>
+              <a:buFont typeface="Arial" panose="020B0604020202020204" pitchFamily="34" charset="0"/>
+              <a:buChar char="•"/>
+              <a:defRPr sz="1800" kern="1200">
+                <a:solidFill>
+                  <a:schemeClr val="tx1"/>
+                </a:solidFill>
+                <a:latin typeface="+mn-lt"/>
+                <a:ea typeface="+mn-ea"/>
+                <a:cs typeface="+mn-cs"/>
+              </a:defRPr>
+            </a:lvl7pPr>
+            <a:lvl8pPr marL="3429000" indent="-228600" algn="l" defTabSz="914400" rtl="0" eaLnBrk="1" latinLnBrk="0" hangingPunct="1">
+              <a:lnSpc>
+                <a:spcPct val="90000"/>
+              </a:lnSpc>
+              <a:spcBef>
+                <a:spcPts val="500"/>
+              </a:spcBef>
+              <a:buFont typeface="Arial" panose="020B0604020202020204" pitchFamily="34" charset="0"/>
+              <a:buChar char="•"/>
+              <a:defRPr sz="1800" kern="1200">
+                <a:solidFill>
+                  <a:schemeClr val="tx1"/>
+                </a:solidFill>
+                <a:latin typeface="+mn-lt"/>
+                <a:ea typeface="+mn-ea"/>
+                <a:cs typeface="+mn-cs"/>
+              </a:defRPr>
+            </a:lvl8pPr>
+            <a:lvl9pPr marL="3886200" indent="-228600" algn="l" defTabSz="914400" rtl="0" eaLnBrk="1" latinLnBrk="0" hangingPunct="1">
+              <a:lnSpc>
+                <a:spcPct val="90000"/>
+              </a:lnSpc>
+              <a:spcBef>
+                <a:spcPts val="500"/>
+              </a:spcBef>
+              <a:buFont typeface="Arial" panose="020B0604020202020204" pitchFamily="34" charset="0"/>
+              <a:buChar char="•"/>
+              <a:defRPr sz="1800" kern="1200">
+                <a:solidFill>
+                  <a:schemeClr val="tx1"/>
+                </a:solidFill>
+                <a:latin typeface="+mn-lt"/>
+                <a:ea typeface="+mn-ea"/>
+                <a:cs typeface="+mn-cs"/>
+              </a:defRPr>
+            </a:lvl9pPr>
+          </a:lstStyle>
+          <a:p>
+            <a:pPr marL="0" indent="0">
+              <a:buFont typeface="Arial" panose="020B0604020202020204" pitchFamily="34" charset="0"/>
+              <a:buNone/>
+            </a:pPr>
+            <a:r>
+              <a:rPr lang="el-GR" sz="2000" dirty="0" smtClean="0"/>
+              <a:t>β</a:t>
+            </a:r>
+            <a:r>
+              <a:rPr lang="en-US" sz="2000" dirty="0" smtClean="0"/>
+              <a:t> = 0.0</a:t>
+            </a:r>
+            <a:endParaRPr lang="en-US" sz="2000" dirty="0"/>
+          </a:p>
+        </p:txBody>
+      </p:sp>
+      <p:sp>
+        <p:nvSpPr>
+          <p:cNvPr id="4" name="TextBox 3"/>
+          <p:cNvSpPr txBox="1"/>
+          <p:nvPr/>
+        </p:nvSpPr>
+        <p:spPr>
+          <a:xfrm>
+            <a:off x="4025894" y="2873760"/>
+            <a:ext cx="534389" cy="1569660"/>
+          </a:xfrm>
+          <a:prstGeom prst="rect">
+            <a:avLst/>
+          </a:prstGeom>
+          <a:noFill/>
+        </p:spPr>
+        <p:txBody>
+          <a:bodyPr wrap="square" rtlCol="0">
+            <a:spAutoFit/>
+          </a:bodyPr>
+          <a:lstStyle/>
+          <a:p>
+            <a:r>
+              <a:rPr lang="en-US" sz="9600" dirty="0" smtClean="0"/>
+              <a:t>-</a:t>
+            </a:r>
+            <a:endParaRPr lang="en-US" sz="9600" dirty="0"/>
+          </a:p>
+        </p:txBody>
+      </p:sp>
+      <p:sp>
+        <p:nvSpPr>
+          <p:cNvPr id="12" name="TextBox 11"/>
+          <p:cNvSpPr txBox="1"/>
+          <p:nvPr/>
+        </p:nvSpPr>
+        <p:spPr>
+          <a:xfrm>
+            <a:off x="7292702" y="2873760"/>
+            <a:ext cx="534389" cy="1569660"/>
+          </a:xfrm>
+          <a:prstGeom prst="rect">
+            <a:avLst/>
+          </a:prstGeom>
+          <a:noFill/>
+        </p:spPr>
+        <p:txBody>
+          <a:bodyPr wrap="square" rtlCol="0">
+            <a:spAutoFit/>
+          </a:bodyPr>
+          <a:lstStyle/>
+          <a:p>
+            <a:r>
+              <a:rPr lang="en-US" sz="9600" dirty="0"/>
+              <a:t>=</a:t>
+            </a:r>
+            <a:endParaRPr lang="en-US" sz="9600" dirty="0"/>
+          </a:p>
+        </p:txBody>
+      </p:sp>
+      <p:pic>
+        <p:nvPicPr>
+          <p:cNvPr id="5126" name="Picture 6" descr="https://github.com/Ningrui-Li/nonlinear_acoustic/blob/master/presentations/nc_bmes_sympo/paraview_kzk_isocontours/a_0.005/diff_plots/c52_70mm_a_0.005_B_3.5_diff_elevation.png?raw=true"/>
+          <p:cNvPicPr>
+            <a:picLocks noChangeAspect="1" noChangeArrowheads="1"/>
+          </p:cNvPicPr>
+          <p:nvPr/>
+        </p:nvPicPr>
+        <p:blipFill rotWithShape="1">
+          <a:blip r:embed="rId5" cstate="print">
+            <a:extLst>
+              <a:ext uri="{28A0092B-C50C-407E-A947-70E740481C1C}">
+                <a14:useLocalDpi xmlns:a14="http://schemas.microsoft.com/office/drawing/2010/main" val="0"/>
+              </a:ext>
+            </a:extLst>
+          </a:blip>
+          <a:srcRect l="38436" r="22144"/>
+          <a:stretch/>
+        </p:blipFill>
+        <p:spPr bwMode="auto">
+          <a:xfrm>
+            <a:off x="8583827" y="1070759"/>
+            <a:ext cx="2721742" cy="5175662"/>
+          </a:xfrm>
+          <a:prstGeom prst="rect">
+            <a:avLst/>
+          </a:prstGeom>
+          <a:noFill/>
+          <a:extLst>
+            <a:ext uri="{909E8E84-426E-40DD-AFC4-6F175D3DCCD1}">
+              <a14:hiddenFill xmlns:a14="http://schemas.microsoft.com/office/drawing/2010/main">
+                <a:solidFill>
+                  <a:srgbClr val="FFFFFF"/>
+                </a:solidFill>
+              </a14:hiddenFill>
+            </a:ext>
+          </a:extLst>
+        </p:spPr>
+      </p:pic>
+    </p:spTree>
+    <p:extLst>
+      <p:ext uri="{BB962C8B-B14F-4D97-AF65-F5344CB8AC3E}">
+        <p14:creationId xmlns:p14="http://schemas.microsoft.com/office/powerpoint/2010/main" val="1726099217"/>
+      </p:ext>
+    </p:extLst>
+  </p:cSld>
+  <p:clrMapOvr>
+    <a:masterClrMapping/>
+  </p:clrMapOvr>
+  <p:timing>
+    <p:tnLst>
+      <p:par>
+        <p:cTn id="1" dur="indefinite" restart="never" nodeType="tmRoot"/>
+      </p:par>
+    </p:tnLst>
+  </p:timing>
+</p:sld>
+</file>
+
+<file path=ppt/slides/slide11.xml><?xml version="1.0" encoding="utf-8"?>
+<p:sld xmlns:a="http://schemas.openxmlformats.org/drawingml/2006/main" xmlns:r="http://schemas.openxmlformats.org/officeDocument/2006/relationships" xmlns:p="http://schemas.openxmlformats.org/presentationml/2006/main">
+  <p:cSld>
+    <p:spTree>
+      <p:nvGrpSpPr>
+        <p:cNvPr id="1" name=""/>
+        <p:cNvGrpSpPr/>
+        <p:nvPr/>
+      </p:nvGrpSpPr>
+      <p:grpSpPr>
+        <a:xfrm>
+          <a:off x="0" y="0"/>
+          <a:ext cx="0" cy="0"/>
+          <a:chOff x="0" y="0"/>
+          <a:chExt cx="0" cy="0"/>
+        </a:xfrm>
+      </p:grpSpPr>
+      <p:sp>
+        <p:nvSpPr>
+          <p:cNvPr id="2" name="Title 1"/>
+          <p:cNvSpPr>
+            <a:spLocks noGrp="1"/>
+          </p:cNvSpPr>
+          <p:nvPr>
+            <p:ph type="title"/>
+          </p:nvPr>
+        </p:nvSpPr>
+        <p:spPr/>
+        <p:txBody>
+          <a:bodyPr/>
+          <a:lstStyle/>
+          <a:p>
+            <a:r>
+              <a:rPr lang="en-US" dirty="0"/>
+              <a:t>Methods – Shear Wave Simulations</a:t>
+            </a:r>
+          </a:p>
+        </p:txBody>
+      </p:sp>
+      <p:sp>
+        <p:nvSpPr>
+          <p:cNvPr id="3" name="Content Placeholder 2"/>
+          <p:cNvSpPr>
+            <a:spLocks noGrp="1"/>
+          </p:cNvSpPr>
+          <p:nvPr>
+            <p:ph idx="1"/>
+          </p:nvPr>
+        </p:nvSpPr>
+        <p:spPr/>
+        <p:txBody>
+          <a:bodyPr>
+            <a:normAutofit/>
+          </a:bodyPr>
+          <a:lstStyle/>
+          <a:p>
+            <a:r>
+              <a:rPr lang="en-US" sz="3600" dirty="0" smtClean="0"/>
+              <a:t>Imitated dyna*.mat intensity output file</a:t>
+            </a:r>
+          </a:p>
+          <a:p>
+            <a:pPr marL="685800" lvl="2">
+              <a:spcBef>
+                <a:spcPts val="1000"/>
+              </a:spcBef>
+            </a:pPr>
+            <a:r>
+              <a:rPr lang="en-US" sz="2800" dirty="0" smtClean="0"/>
+              <a:t>Linearly interpolated </a:t>
+            </a:r>
+            <a:r>
+              <a:rPr lang="en-US" sz="2800" dirty="0"/>
+              <a:t>3D KZK sim intensity </a:t>
+            </a:r>
+            <a:r>
+              <a:rPr lang="en-US" sz="2800" dirty="0" smtClean="0"/>
+              <a:t>output </a:t>
+            </a:r>
+            <a:r>
+              <a:rPr lang="en-US" sz="2800" dirty="0"/>
+              <a:t>to uniformly spaced set of </a:t>
+            </a:r>
+            <a:r>
+              <a:rPr lang="en-US" sz="2800" dirty="0" smtClean="0"/>
+              <a:t>nodes</a:t>
+            </a:r>
+          </a:p>
+          <a:p>
+            <a:pPr marL="685800" lvl="2">
+              <a:spcBef>
+                <a:spcPts val="1000"/>
+              </a:spcBef>
+            </a:pPr>
+            <a:r>
+              <a:rPr lang="en-US" sz="2800" dirty="0" smtClean="0"/>
+              <a:t>Exploited quarter symmetry → added boundary conditions and PMLs</a:t>
+            </a:r>
+            <a:endParaRPr lang="en-US" sz="3600" dirty="0" smtClean="0"/>
+          </a:p>
+          <a:p>
+            <a:r>
+              <a:rPr lang="en-US" sz="3600" dirty="0" smtClean="0"/>
+              <a:t>Simulated ARFI excitation in LS-DYNA</a:t>
+            </a:r>
+          </a:p>
+          <a:p>
+            <a:pPr lvl="1"/>
+            <a:r>
+              <a:rPr lang="en-US" sz="3200" dirty="0" smtClean="0"/>
+              <a:t>E = 3.0 </a:t>
+            </a:r>
+            <a:r>
+              <a:rPr lang="en-US" sz="3200" dirty="0" err="1" smtClean="0"/>
+              <a:t>kPa</a:t>
+            </a:r>
+            <a:r>
+              <a:rPr lang="en-US" sz="3200" dirty="0" smtClean="0"/>
+              <a:t>, </a:t>
+            </a:r>
+            <a:r>
+              <a:rPr lang="el-GR" sz="3200" dirty="0" smtClean="0"/>
+              <a:t>ν</a:t>
+            </a:r>
+            <a:r>
+              <a:rPr lang="en-US" sz="3200" dirty="0" smtClean="0"/>
+              <a:t> = 0.45 </a:t>
+            </a:r>
+            <a:r>
+              <a:rPr lang="en-US" sz="3200" smtClean="0"/>
+              <a:t>(quick runtimes)</a:t>
+            </a:r>
+            <a:endParaRPr lang="en-US" sz="3200" dirty="0" smtClean="0"/>
+          </a:p>
+          <a:p>
+            <a:pPr lvl="1"/>
+            <a:r>
+              <a:rPr lang="en-US" sz="3200" dirty="0" smtClean="0"/>
+              <a:t>300 </a:t>
+            </a:r>
+            <a:r>
+              <a:rPr lang="el-GR" sz="3200" dirty="0" smtClean="0"/>
+              <a:t>μ</a:t>
+            </a:r>
+            <a:r>
+              <a:rPr lang="en-US" sz="3200" dirty="0" smtClean="0"/>
+              <a:t>s excitation duration, 250 </a:t>
+            </a:r>
+            <a:r>
+              <a:rPr lang="en-US" sz="3200" dirty="0" err="1" smtClean="0"/>
+              <a:t>ms</a:t>
+            </a:r>
+            <a:r>
+              <a:rPr lang="en-US" sz="3200" dirty="0" smtClean="0"/>
+              <a:t> total duration</a:t>
+            </a:r>
+          </a:p>
+          <a:p>
+            <a:pPr lvl="1"/>
+            <a:endParaRPr lang="en-US" sz="3200" dirty="0"/>
+          </a:p>
+        </p:txBody>
+      </p:sp>
+    </p:spTree>
+    <p:extLst>
+      <p:ext uri="{BB962C8B-B14F-4D97-AF65-F5344CB8AC3E}">
+        <p14:creationId xmlns:p14="http://schemas.microsoft.com/office/powerpoint/2010/main" val="1207636987"/>
+      </p:ext>
+    </p:extLst>
+  </p:cSld>
+  <p:clrMapOvr>
+    <a:masterClrMapping/>
+  </p:clrMapOvr>
+  <p:timing>
+    <p:tnLst>
+      <p:par>
+        <p:cTn id="1" dur="indefinite" restart="never" nodeType="tmRoot"/>
+      </p:par>
+    </p:tnLst>
+  </p:timing>
 </p:sld>
 </file>
 
@@ -3300,7 +4906,12 @@
                 <p:ph idx="1"/>
               </p:nvPr>
             </p:nvSpPr>
-            <p:spPr/>
+            <p:spPr>
+              <a:xfrm>
+                <a:off x="530630" y="1825625"/>
+                <a:ext cx="10515600" cy="4351338"/>
+              </a:xfrm>
+            </p:spPr>
             <p:txBody>
               <a:bodyPr/>
               <a:lstStyle/>
@@ -3448,10 +5059,14 @@
               </p:nvPr>
             </p:nvSpPr>
             <p:spPr>
+              <a:xfrm>
+                <a:off x="530630" y="1825625"/>
+                <a:ext cx="10515600" cy="4351338"/>
+              </a:xfrm>
               <a:blipFill rotWithShape="0">
                 <a:blip r:embed="rId2"/>
                 <a:stretch>
-                  <a:fillRect l="-812" t="-1961"/>
+                  <a:fillRect l="-754" t="-1961"/>
                 </a:stretch>
               </a:blipFill>
             </p:spPr>
@@ -3491,7 +5106,7 @@
         </p:blipFill>
         <p:spPr bwMode="auto">
           <a:xfrm>
-            <a:off x="6458990" y="1825625"/>
+            <a:off x="6276110" y="1726175"/>
             <a:ext cx="5261956" cy="4550237"/>
           </a:xfrm>
           <a:prstGeom prst="rect">
@@ -3580,7 +5195,7 @@
           </p:nvPr>
         </p:nvPicPr>
         <p:blipFill>
-          <a:blip r:embed="rId2">
+          <a:blip r:embed="rId3">
             <a:extLst>
               <a:ext uri="{28A0092B-C50C-407E-A947-70E740481C1C}">
                 <a14:useLocalDpi xmlns:a14="http://schemas.microsoft.com/office/drawing/2010/main" val="0"/>
@@ -3594,8 +5209,8 @@
         </p:blipFill>
         <p:spPr bwMode="auto">
           <a:xfrm>
-            <a:off x="4396172" y="1509743"/>
-            <a:ext cx="6957628" cy="5218221"/>
+            <a:off x="4829695" y="1319738"/>
+            <a:ext cx="7249763" cy="5437322"/>
           </a:xfrm>
           <a:prstGeom prst="rect">
             <a:avLst/>
@@ -3621,7 +5236,7 @@
         <p:spPr>
           <a:xfrm>
             <a:off x="515389" y="1878676"/>
-            <a:ext cx="4314307" cy="1569660"/>
+            <a:ext cx="4314307" cy="2308324"/>
           </a:xfrm>
           <a:prstGeom prst="rect">
             <a:avLst/>
@@ -3656,7 +5271,11 @@
             </a:r>
             <a:r>
               <a:rPr lang="en-US" sz="2400" dirty="0" smtClean="0"/>
-              <a:t> = 0mm)</a:t>
+              <a:t> = 0mm</a:t>
+            </a:r>
+            <a:r>
+              <a:rPr lang="en-US" sz="2400" dirty="0" smtClean="0"/>
+              <a:t>)</a:t>
             </a:r>
           </a:p>
           <a:p>
@@ -3664,23 +5283,7 @@
               <a:buFont typeface="Arial" panose="020B0604020202020204" pitchFamily="34" charset="0"/>
               <a:buChar char="•"/>
             </a:pPr>
-            <a:r>
-              <a:rPr lang="el-GR" sz="2400" dirty="0" smtClean="0"/>
-              <a:t>α</a:t>
-            </a:r>
-            <a:r>
-              <a:rPr lang="en-US" sz="2400" dirty="0" smtClean="0"/>
-              <a:t> </a:t>
-            </a:r>
-            <a:r>
-              <a:rPr lang="en-US" sz="2400" dirty="0"/>
-              <a:t>= </a:t>
-            </a:r>
-            <a:r>
-              <a:rPr lang="en-US" sz="2400" dirty="0" smtClean="0"/>
-              <a:t>0.005 dB/cm/MHz</a:t>
-            </a:r>
-            <a:endParaRPr lang="en-US" sz="2400" dirty="0"/>
+            <a:endParaRPr lang="en-US" sz="2400" dirty="0" smtClean="0"/>
           </a:p>
           <a:p>
             <a:pPr marL="285750" indent="-285750">
@@ -3688,14 +5291,43 @@
               <a:buChar char="•"/>
             </a:pPr>
             <a:r>
-              <a:rPr lang="el-GR" sz="2400" dirty="0"/>
+              <a:rPr lang="el-GR" sz="2400" dirty="0" smtClean="0"/>
+              <a:t>α</a:t>
+            </a:r>
+            <a:r>
+              <a:rPr lang="en-US" sz="2400" dirty="0" smtClean="0"/>
+              <a:t> </a:t>
+            </a:r>
+            <a:r>
+              <a:rPr lang="en-US" sz="2400" dirty="0"/>
+              <a:t>= </a:t>
+            </a:r>
+            <a:r>
+              <a:rPr lang="en-US" sz="2400" dirty="0" smtClean="0"/>
+              <a:t>0.005 dB/cm/MHz</a:t>
+            </a:r>
+            <a:endParaRPr lang="en-US" sz="2400" dirty="0"/>
+          </a:p>
+          <a:p>
+            <a:pPr marL="285750" indent="-285750">
+              <a:buFont typeface="Arial" panose="020B0604020202020204" pitchFamily="34" charset="0"/>
+              <a:buChar char="•"/>
+            </a:pPr>
+            <a:endParaRPr lang="en-US" sz="2400" dirty="0" smtClean="0"/>
+          </a:p>
+          <a:p>
+            <a:pPr marL="285750" indent="-285750">
+              <a:buFont typeface="Arial" panose="020B0604020202020204" pitchFamily="34" charset="0"/>
+              <a:buChar char="•"/>
+            </a:pPr>
+            <a:r>
+              <a:rPr lang="el-GR" sz="2400" dirty="0" smtClean="0"/>
               <a:t>β </a:t>
             </a:r>
             <a:r>
               <a:rPr lang="en-US" sz="2400" dirty="0"/>
               <a:t>= 0</a:t>
             </a:r>
-            <a:endParaRPr lang="en-US" sz="2400" dirty="0"/>
           </a:p>
         </p:txBody>
       </p:sp>
@@ -3759,88 +5391,6 @@
           </a:p>
         </p:txBody>
       </p:sp>
-      <p:pic>
-        <p:nvPicPr>
-          <p:cNvPr id="4" name="Picture 2" descr="https://github.com/Ningrui-Li/nonlinear_acoustic/blob/master/comparisons/focus70mm/linear_compare/a_0/field_kzk_centertrace_c52_70mm.png?raw=true"/>
-          <p:cNvPicPr>
-            <a:picLocks noChangeAspect="1" noChangeArrowheads="1"/>
-          </p:cNvPicPr>
-          <p:nvPr/>
-        </p:nvPicPr>
-        <p:blipFill>
-          <a:blip r:embed="rId2">
-            <a:extLst>
-              <a:ext uri="{28A0092B-C50C-407E-A947-70E740481C1C}">
-                <a14:useLocalDpi xmlns:a14="http://schemas.microsoft.com/office/drawing/2010/main" val="0"/>
-              </a:ext>
-            </a:extLst>
-          </a:blip>
-          <a:srcRect/>
-          <a:stretch>
-            <a:fillRect/>
-          </a:stretch>
-        </p:blipFill>
-        <p:spPr bwMode="auto">
-          <a:xfrm>
-            <a:off x="335423" y="1690688"/>
-            <a:ext cx="5367539" cy="4025654"/>
-          </a:xfrm>
-          <a:prstGeom prst="rect">
-            <a:avLst/>
-          </a:prstGeom>
-          <a:noFill/>
-          <a:extLst>
-            <a:ext uri="{909E8E84-426E-40DD-AFC4-6F175D3DCCD1}">
-              <a14:hiddenFill xmlns:a14="http://schemas.microsoft.com/office/drawing/2010/main">
-                <a:solidFill>
-                  <a:srgbClr val="FFFFFF"/>
-                </a:solidFill>
-              </a14:hiddenFill>
-            </a:ext>
-          </a:extLst>
-        </p:spPr>
-      </p:pic>
-      <p:pic>
-        <p:nvPicPr>
-          <p:cNvPr id="4098" name="Picture 2" descr="https://github.com/Ningrui-Li/nonlinear_acoustic/blob/master/comparisons/focus70mm/linear_compare/a_0.45/field_kzk_centertrace_c52_70mm.png?raw=true"/>
-          <p:cNvPicPr>
-            <a:picLocks noChangeAspect="1" noChangeArrowheads="1"/>
-          </p:cNvPicPr>
-          <p:nvPr/>
-        </p:nvPicPr>
-        <p:blipFill>
-          <a:blip r:embed="rId3">
-            <a:extLst>
-              <a:ext uri="{28A0092B-C50C-407E-A947-70E740481C1C}">
-                <a14:useLocalDpi xmlns:a14="http://schemas.microsoft.com/office/drawing/2010/main" val="0"/>
-              </a:ext>
-            </a:extLst>
-          </a:blip>
-          <a:srcRect/>
-          <a:stretch>
-            <a:fillRect/>
-          </a:stretch>
-        </p:blipFill>
-        <p:spPr bwMode="auto">
-          <a:xfrm>
-            <a:off x="6205739" y="1690688"/>
-            <a:ext cx="5231073" cy="4025654"/>
-          </a:xfrm>
-          <a:prstGeom prst="rect">
-            <a:avLst/>
-          </a:prstGeom>
-          <a:noFill/>
-          <a:extLst>
-            <a:ext uri="{909E8E84-426E-40DD-AFC4-6F175D3DCCD1}">
-              <a14:hiddenFill xmlns:a14="http://schemas.microsoft.com/office/drawing/2010/main">
-                <a:solidFill>
-                  <a:srgbClr val="FFFFFF"/>
-                </a:solidFill>
-              </a14:hiddenFill>
-            </a:ext>
-          </a:extLst>
-        </p:spPr>
-      </p:pic>
       <p:sp>
         <p:nvSpPr>
           <p:cNvPr id="6" name="Content Placeholder 2"/>
@@ -3853,7 +5403,7 @@
         </p:nvSpPr>
         <p:spPr>
           <a:xfrm>
-            <a:off x="7199600" y="5912194"/>
+            <a:off x="7152893" y="6012312"/>
             <a:ext cx="3243350" cy="446650"/>
           </a:xfrm>
         </p:spPr>
@@ -3888,8 +5438,8 @@
         </p:nvSpPr>
         <p:spPr>
           <a:xfrm>
-            <a:off x="1436310" y="5915428"/>
-            <a:ext cx="3165764" cy="446650"/>
+            <a:off x="1871005" y="6012312"/>
+            <a:ext cx="2559035" cy="446650"/>
           </a:xfrm>
           <a:prstGeom prst="rect">
             <a:avLst/>
@@ -4073,12 +5623,102 @@
             </a:r>
             <a:r>
               <a:rPr lang="en-US" dirty="0" smtClean="0"/>
-              <a:t> = 0.005 dB/cm/MHz</a:t>
+              <a:t> = </a:t>
+            </a:r>
+            <a:r>
+              <a:rPr lang="en-US" dirty="0" smtClean="0"/>
+              <a:t>0 </a:t>
+            </a:r>
+            <a:r>
+              <a:rPr lang="en-US" dirty="0" smtClean="0"/>
+              <a:t>dB/cm/MHz</a:t>
             </a:r>
             <a:endParaRPr lang="en-US" dirty="0"/>
           </a:p>
         </p:txBody>
       </p:sp>
+      <p:pic>
+        <p:nvPicPr>
+          <p:cNvPr id="1026" name="Picture 2" descr="Center Trace Plot, Linear KZK and Field II Sims, 70 mm Focus"/>
+          <p:cNvPicPr>
+            <a:picLocks noChangeAspect="1" noChangeArrowheads="1"/>
+          </p:cNvPicPr>
+          <p:nvPr/>
+        </p:nvPicPr>
+        <p:blipFill>
+          <a:blip r:embed="rId3" cstate="print">
+            <a:extLst>
+              <a:ext uri="{28A0092B-C50C-407E-A947-70E740481C1C}">
+                <a14:useLocalDpi xmlns:a14="http://schemas.microsoft.com/office/drawing/2010/main" val="0"/>
+              </a:ext>
+            </a:extLst>
+          </a:blip>
+          <a:srcRect/>
+          <a:stretch>
+            <a:fillRect/>
+          </a:stretch>
+        </p:blipFill>
+        <p:spPr bwMode="auto">
+          <a:xfrm>
+            <a:off x="338500" y="1462337"/>
+            <a:ext cx="5624046" cy="4499236"/>
+          </a:xfrm>
+          <a:prstGeom prst="rect">
+            <a:avLst/>
+          </a:prstGeom>
+          <a:noFill/>
+          <a:extLst>
+            <a:ext uri="{909E8E84-426E-40DD-AFC4-6F175D3DCCD1}">
+              <a14:hiddenFill xmlns:a14="http://schemas.microsoft.com/office/drawing/2010/main">
+                <a:solidFill>
+                  <a:srgbClr val="FFFFFF"/>
+                </a:solidFill>
+              </a14:hiddenFill>
+            </a:ext>
+          </a:extLst>
+        </p:spPr>
+      </p:pic>
+      <p:pic>
+        <p:nvPicPr>
+          <p:cNvPr id="1028" name="Picture 4" descr="Center Trace Plot, Linear KZK and Field II Sims, 70 mm Focus"/>
+          <p:cNvPicPr>
+            <a:picLocks noChangeAspect="1" noChangeArrowheads="1"/>
+          </p:cNvPicPr>
+          <p:nvPr/>
+        </p:nvPicPr>
+        <p:blipFill>
+          <a:blip r:embed="rId4" cstate="print">
+            <a:extLst>
+              <a:ext uri="{28A0092B-C50C-407E-A947-70E740481C1C}">
+                <a14:useLocalDpi xmlns:a14="http://schemas.microsoft.com/office/drawing/2010/main" val="0"/>
+              </a:ext>
+            </a:extLst>
+          </a:blip>
+          <a:srcRect/>
+          <a:stretch>
+            <a:fillRect/>
+          </a:stretch>
+        </p:blipFill>
+        <p:spPr bwMode="auto">
+          <a:xfrm>
+            <a:off x="5962546" y="1462337"/>
+            <a:ext cx="5624045" cy="4499236"/>
+          </a:xfrm>
+          <a:prstGeom prst="rect">
+            <a:avLst/>
+          </a:prstGeom>
+          <a:noFill/>
+          <a:extLst>
+            <a:ext uri="{909E8E84-426E-40DD-AFC4-6F175D3DCCD1}">
+              <a14:hiddenFill xmlns:a14="http://schemas.microsoft.com/office/drawing/2010/main">
+                <a:solidFill>
+                  <a:srgbClr val="FFFFFF"/>
+                </a:solidFill>
+              </a14:hiddenFill>
+            </a:ext>
+          </a:extLst>
+        </p:spPr>
+      </p:pic>
     </p:spTree>
     <p:extLst>
       <p:ext uri="{BB962C8B-B14F-4D97-AF65-F5344CB8AC3E}">
@@ -4131,33 +5771,1674 @@
           <a:bodyPr/>
           <a:lstStyle/>
           <a:p>
-            <a:endParaRPr lang="en-US"/>
-          </a:p>
-        </p:txBody>
-      </p:sp>
-      <p:sp>
-        <p:nvSpPr>
-          <p:cNvPr id="3" name="Content Placeholder 2"/>
-          <p:cNvSpPr>
-            <a:spLocks noGrp="1"/>
-          </p:cNvSpPr>
-          <p:nvPr>
-            <p:ph idx="1"/>
-          </p:nvPr>
-        </p:nvSpPr>
-        <p:spPr/>
-        <p:txBody>
-          <a:bodyPr/>
-          <a:lstStyle/>
-          <a:p>
+            <a:r>
+              <a:rPr lang="en-US" dirty="0" smtClean="0"/>
+              <a:t>Intensity Fields with Increasing Nonlinearity</a:t>
+            </a:r>
             <a:endParaRPr lang="en-US" dirty="0"/>
           </a:p>
         </p:txBody>
       </p:sp>
+      <p:pic>
+        <p:nvPicPr>
+          <p:cNvPr id="4098" name="Picture 2" descr="kzk_centertrace_c52_70mm_a_0.005.png"/>
+          <p:cNvPicPr>
+            <a:picLocks noChangeAspect="1" noChangeArrowheads="1"/>
+          </p:cNvPicPr>
+          <p:nvPr/>
+        </p:nvPicPr>
+        <p:blipFill>
+          <a:blip r:embed="rId3">
+            <a:extLst>
+              <a:ext uri="{28A0092B-C50C-407E-A947-70E740481C1C}">
+                <a14:useLocalDpi xmlns:a14="http://schemas.microsoft.com/office/drawing/2010/main" val="0"/>
+              </a:ext>
+            </a:extLst>
+          </a:blip>
+          <a:srcRect/>
+          <a:stretch>
+            <a:fillRect/>
+          </a:stretch>
+        </p:blipFill>
+        <p:spPr bwMode="auto">
+          <a:xfrm>
+            <a:off x="65872" y="1587056"/>
+            <a:ext cx="6030128" cy="4522596"/>
+          </a:xfrm>
+          <a:prstGeom prst="rect">
+            <a:avLst/>
+          </a:prstGeom>
+          <a:noFill/>
+          <a:extLst>
+            <a:ext uri="{909E8E84-426E-40DD-AFC4-6F175D3DCCD1}">
+              <a14:hiddenFill xmlns:a14="http://schemas.microsoft.com/office/drawing/2010/main">
+                <a:solidFill>
+                  <a:srgbClr val="FFFFFF"/>
+                </a:solidFill>
+              </a14:hiddenFill>
+            </a:ext>
+          </a:extLst>
+        </p:spPr>
+      </p:pic>
+      <p:pic>
+        <p:nvPicPr>
+          <p:cNvPr id="4100" name="Picture 4" descr="kzk_centertrace_c52_70mm_a_1.0.png"/>
+          <p:cNvPicPr>
+            <a:picLocks noChangeAspect="1" noChangeArrowheads="1"/>
+          </p:cNvPicPr>
+          <p:nvPr/>
+        </p:nvPicPr>
+        <p:blipFill>
+          <a:blip r:embed="rId4">
+            <a:extLst>
+              <a:ext uri="{28A0092B-C50C-407E-A947-70E740481C1C}">
+                <a14:useLocalDpi xmlns:a14="http://schemas.microsoft.com/office/drawing/2010/main" val="0"/>
+              </a:ext>
+            </a:extLst>
+          </a:blip>
+          <a:srcRect/>
+          <a:stretch>
+            <a:fillRect/>
+          </a:stretch>
+        </p:blipFill>
+        <p:spPr bwMode="auto">
+          <a:xfrm>
+            <a:off x="6095999" y="1587056"/>
+            <a:ext cx="6030129" cy="4522596"/>
+          </a:xfrm>
+          <a:prstGeom prst="rect">
+            <a:avLst/>
+          </a:prstGeom>
+          <a:noFill/>
+          <a:extLst>
+            <a:ext uri="{909E8E84-426E-40DD-AFC4-6F175D3DCCD1}">
+              <a14:hiddenFill xmlns:a14="http://schemas.microsoft.com/office/drawing/2010/main">
+                <a:solidFill>
+                  <a:srgbClr val="FFFFFF"/>
+                </a:solidFill>
+              </a14:hiddenFill>
+            </a:ext>
+          </a:extLst>
+        </p:spPr>
+      </p:pic>
     </p:spTree>
     <p:extLst>
       <p:ext uri="{BB962C8B-B14F-4D97-AF65-F5344CB8AC3E}">
         <p14:creationId xmlns:p14="http://schemas.microsoft.com/office/powerpoint/2010/main" val="454608012"/>
+      </p:ext>
+    </p:extLst>
+  </p:cSld>
+  <p:clrMapOvr>
+    <a:masterClrMapping/>
+  </p:clrMapOvr>
+  <p:timing>
+    <p:tnLst>
+      <p:par>
+        <p:cTn id="1" dur="indefinite" restart="never" nodeType="tmRoot"/>
+      </p:par>
+    </p:tnLst>
+  </p:timing>
+</p:sld>
+</file>
+
+<file path=ppt/slides/slide8.xml><?xml version="1.0" encoding="utf-8"?>
+<p:sld xmlns:a="http://schemas.openxmlformats.org/drawingml/2006/main" xmlns:r="http://schemas.openxmlformats.org/officeDocument/2006/relationships" xmlns:p="http://schemas.openxmlformats.org/presentationml/2006/main">
+  <p:cSld>
+    <p:spTree>
+      <p:nvGrpSpPr>
+        <p:cNvPr id="1" name=""/>
+        <p:cNvGrpSpPr/>
+        <p:nvPr/>
+      </p:nvGrpSpPr>
+      <p:grpSpPr>
+        <a:xfrm>
+          <a:off x="0" y="0"/>
+          <a:ext cx="0" cy="0"/>
+          <a:chOff x="0" y="0"/>
+          <a:chExt cx="0" cy="0"/>
+        </a:xfrm>
+      </p:grpSpPr>
+      <p:sp>
+        <p:nvSpPr>
+          <p:cNvPr id="2" name="Title 1"/>
+          <p:cNvSpPr>
+            <a:spLocks noGrp="1"/>
+          </p:cNvSpPr>
+          <p:nvPr>
+            <p:ph type="title"/>
+          </p:nvPr>
+        </p:nvSpPr>
+        <p:spPr>
+          <a:xfrm>
+            <a:off x="584394" y="206166"/>
+            <a:ext cx="10515600" cy="751552"/>
+          </a:xfrm>
+        </p:spPr>
+        <p:txBody>
+          <a:bodyPr/>
+          <a:lstStyle/>
+          <a:p>
+            <a:r>
+              <a:rPr lang="en-US" dirty="0" smtClean="0"/>
+              <a:t>Intensity Fields with Increasing Nonlinearity</a:t>
+            </a:r>
+            <a:endParaRPr lang="en-US" dirty="0"/>
+          </a:p>
+        </p:txBody>
+      </p:sp>
+      <p:sp>
+        <p:nvSpPr>
+          <p:cNvPr id="3" name="Content Placeholder 2"/>
+          <p:cNvSpPr>
+            <a:spLocks noGrp="1"/>
+          </p:cNvSpPr>
+          <p:nvPr>
+            <p:ph idx="1"/>
+          </p:nvPr>
+        </p:nvSpPr>
+        <p:spPr>
+          <a:xfrm>
+            <a:off x="5057095" y="6291945"/>
+            <a:ext cx="1206338" cy="393680"/>
+          </a:xfrm>
+        </p:spPr>
+        <p:txBody>
+          <a:bodyPr>
+            <a:normAutofit fontScale="92500" lnSpcReduction="20000"/>
+          </a:bodyPr>
+          <a:lstStyle/>
+          <a:p>
+            <a:pPr marL="0" indent="0">
+              <a:buNone/>
+            </a:pPr>
+            <a:r>
+              <a:rPr lang="el-GR" dirty="0" smtClean="0"/>
+              <a:t>β</a:t>
+            </a:r>
+            <a:r>
+              <a:rPr lang="en-US" dirty="0" smtClean="0"/>
+              <a:t> = 3.5</a:t>
+            </a:r>
+            <a:endParaRPr lang="en-US" dirty="0"/>
+          </a:p>
+        </p:txBody>
+      </p:sp>
+      <p:pic>
+        <p:nvPicPr>
+          <p:cNvPr id="2052" name="Picture 4" descr="https://github.com/Ningrui-Li/nonlinear_acoustic/blob/master/presentations/nc_bmes_sympo/paraview_kzk_isocontours/a_0.005/c52_70mm_a_0.005_B_0_lateral.png?raw=true"/>
+          <p:cNvPicPr>
+            <a:picLocks noChangeAspect="1" noChangeArrowheads="1"/>
+          </p:cNvPicPr>
+          <p:nvPr/>
+        </p:nvPicPr>
+        <p:blipFill rotWithShape="1">
+          <a:blip r:embed="rId2" cstate="print">
+            <a:extLst>
+              <a:ext uri="{28A0092B-C50C-407E-A947-70E740481C1C}">
+                <a14:useLocalDpi xmlns:a14="http://schemas.microsoft.com/office/drawing/2010/main" val="0"/>
+              </a:ext>
+            </a:extLst>
+          </a:blip>
+          <a:srcRect l="37070" r="37817"/>
+          <a:stretch/>
+        </p:blipFill>
+        <p:spPr bwMode="auto">
+          <a:xfrm>
+            <a:off x="1446826" y="1463585"/>
+            <a:ext cx="2113811" cy="4568178"/>
+          </a:xfrm>
+          <a:prstGeom prst="rect">
+            <a:avLst/>
+          </a:prstGeom>
+          <a:noFill/>
+          <a:extLst>
+            <a:ext uri="{909E8E84-426E-40DD-AFC4-6F175D3DCCD1}">
+              <a14:hiddenFill xmlns:a14="http://schemas.microsoft.com/office/drawing/2010/main">
+                <a:solidFill>
+                  <a:srgbClr val="FFFFFF"/>
+                </a:solidFill>
+              </a14:hiddenFill>
+            </a:ext>
+          </a:extLst>
+        </p:spPr>
+      </p:pic>
+      <p:pic>
+        <p:nvPicPr>
+          <p:cNvPr id="2054" name="Picture 6" descr="https://raw.githubusercontent.com/Ningrui-Li/nonlinear_acoustic/master/presentations/nc_bmes_sympo/paraview_kzk_isocontours/a_0.005/c52_70mm_a_0.005_B_3.5_lateral.png"/>
+          <p:cNvPicPr>
+            <a:picLocks noChangeAspect="1" noChangeArrowheads="1"/>
+          </p:cNvPicPr>
+          <p:nvPr/>
+        </p:nvPicPr>
+        <p:blipFill rotWithShape="1">
+          <a:blip r:embed="rId3" cstate="print">
+            <a:extLst>
+              <a:ext uri="{28A0092B-C50C-407E-A947-70E740481C1C}">
+                <a14:useLocalDpi xmlns:a14="http://schemas.microsoft.com/office/drawing/2010/main" val="0"/>
+              </a:ext>
+            </a:extLst>
+          </a:blip>
+          <a:srcRect l="37729" r="38252"/>
+          <a:stretch/>
+        </p:blipFill>
+        <p:spPr bwMode="auto">
+          <a:xfrm>
+            <a:off x="4649402" y="1463585"/>
+            <a:ext cx="2021725" cy="4568178"/>
+          </a:xfrm>
+          <a:prstGeom prst="rect">
+            <a:avLst/>
+          </a:prstGeom>
+          <a:noFill/>
+          <a:extLst>
+            <a:ext uri="{909E8E84-426E-40DD-AFC4-6F175D3DCCD1}">
+              <a14:hiddenFill xmlns:a14="http://schemas.microsoft.com/office/drawing/2010/main">
+                <a:solidFill>
+                  <a:srgbClr val="FFFFFF"/>
+                </a:solidFill>
+              </a14:hiddenFill>
+            </a:ext>
+          </a:extLst>
+        </p:spPr>
+      </p:pic>
+      <p:pic>
+        <p:nvPicPr>
+          <p:cNvPr id="2056" name="Picture 8" descr="https://raw.githubusercontent.com/Ningrui-Li/nonlinear_acoustic/master/presentations/nc_bmes_sympo/paraview_kzk_isocontours/a_0.005/c52_70mm_a_0.005_B_7_lateral.png"/>
+          <p:cNvPicPr>
+            <a:picLocks noChangeAspect="1" noChangeArrowheads="1"/>
+          </p:cNvPicPr>
+          <p:nvPr/>
+        </p:nvPicPr>
+        <p:blipFill rotWithShape="1">
+          <a:blip r:embed="rId4" cstate="print">
+            <a:extLst>
+              <a:ext uri="{28A0092B-C50C-407E-A947-70E740481C1C}">
+                <a14:useLocalDpi xmlns:a14="http://schemas.microsoft.com/office/drawing/2010/main" val="0"/>
+              </a:ext>
+            </a:extLst>
+          </a:blip>
+          <a:srcRect l="37404" r="23146"/>
+          <a:stretch/>
+        </p:blipFill>
+        <p:spPr bwMode="auto">
+          <a:xfrm>
+            <a:off x="7759893" y="1463585"/>
+            <a:ext cx="3320617" cy="4568178"/>
+          </a:xfrm>
+          <a:prstGeom prst="rect">
+            <a:avLst/>
+          </a:prstGeom>
+          <a:noFill/>
+          <a:extLst>
+            <a:ext uri="{909E8E84-426E-40DD-AFC4-6F175D3DCCD1}">
+              <a14:hiddenFill xmlns:a14="http://schemas.microsoft.com/office/drawing/2010/main">
+                <a:solidFill>
+                  <a:srgbClr val="FFFFFF"/>
+                </a:solidFill>
+              </a14:hiddenFill>
+            </a:ext>
+          </a:extLst>
+        </p:spPr>
+      </p:pic>
+      <p:sp>
+        <p:nvSpPr>
+          <p:cNvPr id="9" name="Content Placeholder 2"/>
+          <p:cNvSpPr txBox="1">
+            <a:spLocks/>
+          </p:cNvSpPr>
+          <p:nvPr/>
+        </p:nvSpPr>
+        <p:spPr>
+          <a:xfrm>
+            <a:off x="1898367" y="6291945"/>
+            <a:ext cx="1206338" cy="393680"/>
+          </a:xfrm>
+          <a:prstGeom prst="rect">
+            <a:avLst/>
+          </a:prstGeom>
+        </p:spPr>
+        <p:txBody>
+          <a:bodyPr vert="horz" lIns="91440" tIns="45720" rIns="91440" bIns="45720" rtlCol="0">
+            <a:normAutofit fontScale="92500" lnSpcReduction="20000"/>
+          </a:bodyPr>
+          <a:lstStyle>
+            <a:lvl1pPr marL="228600" indent="-228600" algn="l" defTabSz="914400" rtl="0" eaLnBrk="1" latinLnBrk="0" hangingPunct="1">
+              <a:lnSpc>
+                <a:spcPct val="90000"/>
+              </a:lnSpc>
+              <a:spcBef>
+                <a:spcPts val="1000"/>
+              </a:spcBef>
+              <a:buFont typeface="Arial" panose="020B0604020202020204" pitchFamily="34" charset="0"/>
+              <a:buChar char="•"/>
+              <a:defRPr sz="2800" kern="1200">
+                <a:solidFill>
+                  <a:schemeClr val="tx1"/>
+                </a:solidFill>
+                <a:latin typeface="+mn-lt"/>
+                <a:ea typeface="+mn-ea"/>
+                <a:cs typeface="+mn-cs"/>
+              </a:defRPr>
+            </a:lvl1pPr>
+            <a:lvl2pPr marL="685800" indent="-228600" algn="l" defTabSz="914400" rtl="0" eaLnBrk="1" latinLnBrk="0" hangingPunct="1">
+              <a:lnSpc>
+                <a:spcPct val="90000"/>
+              </a:lnSpc>
+              <a:spcBef>
+                <a:spcPts val="500"/>
+              </a:spcBef>
+              <a:buFont typeface="Arial" panose="020B0604020202020204" pitchFamily="34" charset="0"/>
+              <a:buChar char="•"/>
+              <a:defRPr sz="2400" kern="1200">
+                <a:solidFill>
+                  <a:schemeClr val="tx1"/>
+                </a:solidFill>
+                <a:latin typeface="+mn-lt"/>
+                <a:ea typeface="+mn-ea"/>
+                <a:cs typeface="+mn-cs"/>
+              </a:defRPr>
+            </a:lvl2pPr>
+            <a:lvl3pPr marL="1143000" indent="-228600" algn="l" defTabSz="914400" rtl="0" eaLnBrk="1" latinLnBrk="0" hangingPunct="1">
+              <a:lnSpc>
+                <a:spcPct val="90000"/>
+              </a:lnSpc>
+              <a:spcBef>
+                <a:spcPts val="500"/>
+              </a:spcBef>
+              <a:buFont typeface="Arial" panose="020B0604020202020204" pitchFamily="34" charset="0"/>
+              <a:buChar char="•"/>
+              <a:defRPr sz="2000" kern="1200">
+                <a:solidFill>
+                  <a:schemeClr val="tx1"/>
+                </a:solidFill>
+                <a:latin typeface="+mn-lt"/>
+                <a:ea typeface="+mn-ea"/>
+                <a:cs typeface="+mn-cs"/>
+              </a:defRPr>
+            </a:lvl3pPr>
+            <a:lvl4pPr marL="1600200" indent="-228600" algn="l" defTabSz="914400" rtl="0" eaLnBrk="1" latinLnBrk="0" hangingPunct="1">
+              <a:lnSpc>
+                <a:spcPct val="90000"/>
+              </a:lnSpc>
+              <a:spcBef>
+                <a:spcPts val="500"/>
+              </a:spcBef>
+              <a:buFont typeface="Arial" panose="020B0604020202020204" pitchFamily="34" charset="0"/>
+              <a:buChar char="•"/>
+              <a:defRPr sz="1800" kern="1200">
+                <a:solidFill>
+                  <a:schemeClr val="tx1"/>
+                </a:solidFill>
+                <a:latin typeface="+mn-lt"/>
+                <a:ea typeface="+mn-ea"/>
+                <a:cs typeface="+mn-cs"/>
+              </a:defRPr>
+            </a:lvl4pPr>
+            <a:lvl5pPr marL="2057400" indent="-228600" algn="l" defTabSz="914400" rtl="0" eaLnBrk="1" latinLnBrk="0" hangingPunct="1">
+              <a:lnSpc>
+                <a:spcPct val="90000"/>
+              </a:lnSpc>
+              <a:spcBef>
+                <a:spcPts val="500"/>
+              </a:spcBef>
+              <a:buFont typeface="Arial" panose="020B0604020202020204" pitchFamily="34" charset="0"/>
+              <a:buChar char="•"/>
+              <a:defRPr sz="1800" kern="1200">
+                <a:solidFill>
+                  <a:schemeClr val="tx1"/>
+                </a:solidFill>
+                <a:latin typeface="+mn-lt"/>
+                <a:ea typeface="+mn-ea"/>
+                <a:cs typeface="+mn-cs"/>
+              </a:defRPr>
+            </a:lvl5pPr>
+            <a:lvl6pPr marL="2514600" indent="-228600" algn="l" defTabSz="914400" rtl="0" eaLnBrk="1" latinLnBrk="0" hangingPunct="1">
+              <a:lnSpc>
+                <a:spcPct val="90000"/>
+              </a:lnSpc>
+              <a:spcBef>
+                <a:spcPts val="500"/>
+              </a:spcBef>
+              <a:buFont typeface="Arial" panose="020B0604020202020204" pitchFamily="34" charset="0"/>
+              <a:buChar char="•"/>
+              <a:defRPr sz="1800" kern="1200">
+                <a:solidFill>
+                  <a:schemeClr val="tx1"/>
+                </a:solidFill>
+                <a:latin typeface="+mn-lt"/>
+                <a:ea typeface="+mn-ea"/>
+                <a:cs typeface="+mn-cs"/>
+              </a:defRPr>
+            </a:lvl6pPr>
+            <a:lvl7pPr marL="2971800" indent="-228600" algn="l" defTabSz="914400" rtl="0" eaLnBrk="1" latinLnBrk="0" hangingPunct="1">
+              <a:lnSpc>
+                <a:spcPct val="90000"/>
+              </a:lnSpc>
+              <a:spcBef>
+                <a:spcPts val="500"/>
+              </a:spcBef>
+              <a:buFont typeface="Arial" panose="020B0604020202020204" pitchFamily="34" charset="0"/>
+              <a:buChar char="•"/>
+              <a:defRPr sz="1800" kern="1200">
+                <a:solidFill>
+                  <a:schemeClr val="tx1"/>
+                </a:solidFill>
+                <a:latin typeface="+mn-lt"/>
+                <a:ea typeface="+mn-ea"/>
+                <a:cs typeface="+mn-cs"/>
+              </a:defRPr>
+            </a:lvl7pPr>
+            <a:lvl8pPr marL="3429000" indent="-228600" algn="l" defTabSz="914400" rtl="0" eaLnBrk="1" latinLnBrk="0" hangingPunct="1">
+              <a:lnSpc>
+                <a:spcPct val="90000"/>
+              </a:lnSpc>
+              <a:spcBef>
+                <a:spcPts val="500"/>
+              </a:spcBef>
+              <a:buFont typeface="Arial" panose="020B0604020202020204" pitchFamily="34" charset="0"/>
+              <a:buChar char="•"/>
+              <a:defRPr sz="1800" kern="1200">
+                <a:solidFill>
+                  <a:schemeClr val="tx1"/>
+                </a:solidFill>
+                <a:latin typeface="+mn-lt"/>
+                <a:ea typeface="+mn-ea"/>
+                <a:cs typeface="+mn-cs"/>
+              </a:defRPr>
+            </a:lvl8pPr>
+            <a:lvl9pPr marL="3886200" indent="-228600" algn="l" defTabSz="914400" rtl="0" eaLnBrk="1" latinLnBrk="0" hangingPunct="1">
+              <a:lnSpc>
+                <a:spcPct val="90000"/>
+              </a:lnSpc>
+              <a:spcBef>
+                <a:spcPts val="500"/>
+              </a:spcBef>
+              <a:buFont typeface="Arial" panose="020B0604020202020204" pitchFamily="34" charset="0"/>
+              <a:buChar char="•"/>
+              <a:defRPr sz="1800" kern="1200">
+                <a:solidFill>
+                  <a:schemeClr val="tx1"/>
+                </a:solidFill>
+                <a:latin typeface="+mn-lt"/>
+                <a:ea typeface="+mn-ea"/>
+                <a:cs typeface="+mn-cs"/>
+              </a:defRPr>
+            </a:lvl9pPr>
+          </a:lstStyle>
+          <a:p>
+            <a:pPr marL="0" indent="0">
+              <a:buFont typeface="Arial" panose="020B0604020202020204" pitchFamily="34" charset="0"/>
+              <a:buNone/>
+            </a:pPr>
+            <a:r>
+              <a:rPr lang="el-GR" dirty="0" smtClean="0"/>
+              <a:t>β</a:t>
+            </a:r>
+            <a:r>
+              <a:rPr lang="en-US" dirty="0" smtClean="0"/>
+              <a:t> = 0.0</a:t>
+            </a:r>
+            <a:endParaRPr lang="en-US" dirty="0"/>
+          </a:p>
+        </p:txBody>
+      </p:sp>
+      <p:sp>
+        <p:nvSpPr>
+          <p:cNvPr id="10" name="Content Placeholder 2"/>
+          <p:cNvSpPr txBox="1">
+            <a:spLocks/>
+          </p:cNvSpPr>
+          <p:nvPr/>
+        </p:nvSpPr>
+        <p:spPr>
+          <a:xfrm>
+            <a:off x="8213863" y="6291945"/>
+            <a:ext cx="1206338" cy="393680"/>
+          </a:xfrm>
+          <a:prstGeom prst="rect">
+            <a:avLst/>
+          </a:prstGeom>
+        </p:spPr>
+        <p:txBody>
+          <a:bodyPr vert="horz" lIns="91440" tIns="45720" rIns="91440" bIns="45720" rtlCol="0">
+            <a:normAutofit fontScale="92500" lnSpcReduction="20000"/>
+          </a:bodyPr>
+          <a:lstStyle>
+            <a:lvl1pPr marL="228600" indent="-228600" algn="l" defTabSz="914400" rtl="0" eaLnBrk="1" latinLnBrk="0" hangingPunct="1">
+              <a:lnSpc>
+                <a:spcPct val="90000"/>
+              </a:lnSpc>
+              <a:spcBef>
+                <a:spcPts val="1000"/>
+              </a:spcBef>
+              <a:buFont typeface="Arial" panose="020B0604020202020204" pitchFamily="34" charset="0"/>
+              <a:buChar char="•"/>
+              <a:defRPr sz="2800" kern="1200">
+                <a:solidFill>
+                  <a:schemeClr val="tx1"/>
+                </a:solidFill>
+                <a:latin typeface="+mn-lt"/>
+                <a:ea typeface="+mn-ea"/>
+                <a:cs typeface="+mn-cs"/>
+              </a:defRPr>
+            </a:lvl1pPr>
+            <a:lvl2pPr marL="685800" indent="-228600" algn="l" defTabSz="914400" rtl="0" eaLnBrk="1" latinLnBrk="0" hangingPunct="1">
+              <a:lnSpc>
+                <a:spcPct val="90000"/>
+              </a:lnSpc>
+              <a:spcBef>
+                <a:spcPts val="500"/>
+              </a:spcBef>
+              <a:buFont typeface="Arial" panose="020B0604020202020204" pitchFamily="34" charset="0"/>
+              <a:buChar char="•"/>
+              <a:defRPr sz="2400" kern="1200">
+                <a:solidFill>
+                  <a:schemeClr val="tx1"/>
+                </a:solidFill>
+                <a:latin typeface="+mn-lt"/>
+                <a:ea typeface="+mn-ea"/>
+                <a:cs typeface="+mn-cs"/>
+              </a:defRPr>
+            </a:lvl2pPr>
+            <a:lvl3pPr marL="1143000" indent="-228600" algn="l" defTabSz="914400" rtl="0" eaLnBrk="1" latinLnBrk="0" hangingPunct="1">
+              <a:lnSpc>
+                <a:spcPct val="90000"/>
+              </a:lnSpc>
+              <a:spcBef>
+                <a:spcPts val="500"/>
+              </a:spcBef>
+              <a:buFont typeface="Arial" panose="020B0604020202020204" pitchFamily="34" charset="0"/>
+              <a:buChar char="•"/>
+              <a:defRPr sz="2000" kern="1200">
+                <a:solidFill>
+                  <a:schemeClr val="tx1"/>
+                </a:solidFill>
+                <a:latin typeface="+mn-lt"/>
+                <a:ea typeface="+mn-ea"/>
+                <a:cs typeface="+mn-cs"/>
+              </a:defRPr>
+            </a:lvl3pPr>
+            <a:lvl4pPr marL="1600200" indent="-228600" algn="l" defTabSz="914400" rtl="0" eaLnBrk="1" latinLnBrk="0" hangingPunct="1">
+              <a:lnSpc>
+                <a:spcPct val="90000"/>
+              </a:lnSpc>
+              <a:spcBef>
+                <a:spcPts val="500"/>
+              </a:spcBef>
+              <a:buFont typeface="Arial" panose="020B0604020202020204" pitchFamily="34" charset="0"/>
+              <a:buChar char="•"/>
+              <a:defRPr sz="1800" kern="1200">
+                <a:solidFill>
+                  <a:schemeClr val="tx1"/>
+                </a:solidFill>
+                <a:latin typeface="+mn-lt"/>
+                <a:ea typeface="+mn-ea"/>
+                <a:cs typeface="+mn-cs"/>
+              </a:defRPr>
+            </a:lvl4pPr>
+            <a:lvl5pPr marL="2057400" indent="-228600" algn="l" defTabSz="914400" rtl="0" eaLnBrk="1" latinLnBrk="0" hangingPunct="1">
+              <a:lnSpc>
+                <a:spcPct val="90000"/>
+              </a:lnSpc>
+              <a:spcBef>
+                <a:spcPts val="500"/>
+              </a:spcBef>
+              <a:buFont typeface="Arial" panose="020B0604020202020204" pitchFamily="34" charset="0"/>
+              <a:buChar char="•"/>
+              <a:defRPr sz="1800" kern="1200">
+                <a:solidFill>
+                  <a:schemeClr val="tx1"/>
+                </a:solidFill>
+                <a:latin typeface="+mn-lt"/>
+                <a:ea typeface="+mn-ea"/>
+                <a:cs typeface="+mn-cs"/>
+              </a:defRPr>
+            </a:lvl5pPr>
+            <a:lvl6pPr marL="2514600" indent="-228600" algn="l" defTabSz="914400" rtl="0" eaLnBrk="1" latinLnBrk="0" hangingPunct="1">
+              <a:lnSpc>
+                <a:spcPct val="90000"/>
+              </a:lnSpc>
+              <a:spcBef>
+                <a:spcPts val="500"/>
+              </a:spcBef>
+              <a:buFont typeface="Arial" panose="020B0604020202020204" pitchFamily="34" charset="0"/>
+              <a:buChar char="•"/>
+              <a:defRPr sz="1800" kern="1200">
+                <a:solidFill>
+                  <a:schemeClr val="tx1"/>
+                </a:solidFill>
+                <a:latin typeface="+mn-lt"/>
+                <a:ea typeface="+mn-ea"/>
+                <a:cs typeface="+mn-cs"/>
+              </a:defRPr>
+            </a:lvl6pPr>
+            <a:lvl7pPr marL="2971800" indent="-228600" algn="l" defTabSz="914400" rtl="0" eaLnBrk="1" latinLnBrk="0" hangingPunct="1">
+              <a:lnSpc>
+                <a:spcPct val="90000"/>
+              </a:lnSpc>
+              <a:spcBef>
+                <a:spcPts val="500"/>
+              </a:spcBef>
+              <a:buFont typeface="Arial" panose="020B0604020202020204" pitchFamily="34" charset="0"/>
+              <a:buChar char="•"/>
+              <a:defRPr sz="1800" kern="1200">
+                <a:solidFill>
+                  <a:schemeClr val="tx1"/>
+                </a:solidFill>
+                <a:latin typeface="+mn-lt"/>
+                <a:ea typeface="+mn-ea"/>
+                <a:cs typeface="+mn-cs"/>
+              </a:defRPr>
+            </a:lvl7pPr>
+            <a:lvl8pPr marL="3429000" indent="-228600" algn="l" defTabSz="914400" rtl="0" eaLnBrk="1" latinLnBrk="0" hangingPunct="1">
+              <a:lnSpc>
+                <a:spcPct val="90000"/>
+              </a:lnSpc>
+              <a:spcBef>
+                <a:spcPts val="500"/>
+              </a:spcBef>
+              <a:buFont typeface="Arial" panose="020B0604020202020204" pitchFamily="34" charset="0"/>
+              <a:buChar char="•"/>
+              <a:defRPr sz="1800" kern="1200">
+                <a:solidFill>
+                  <a:schemeClr val="tx1"/>
+                </a:solidFill>
+                <a:latin typeface="+mn-lt"/>
+                <a:ea typeface="+mn-ea"/>
+                <a:cs typeface="+mn-cs"/>
+              </a:defRPr>
+            </a:lvl8pPr>
+            <a:lvl9pPr marL="3886200" indent="-228600" algn="l" defTabSz="914400" rtl="0" eaLnBrk="1" latinLnBrk="0" hangingPunct="1">
+              <a:lnSpc>
+                <a:spcPct val="90000"/>
+              </a:lnSpc>
+              <a:spcBef>
+                <a:spcPts val="500"/>
+              </a:spcBef>
+              <a:buFont typeface="Arial" panose="020B0604020202020204" pitchFamily="34" charset="0"/>
+              <a:buChar char="•"/>
+              <a:defRPr sz="1800" kern="1200">
+                <a:solidFill>
+                  <a:schemeClr val="tx1"/>
+                </a:solidFill>
+                <a:latin typeface="+mn-lt"/>
+                <a:ea typeface="+mn-ea"/>
+                <a:cs typeface="+mn-cs"/>
+              </a:defRPr>
+            </a:lvl9pPr>
+          </a:lstStyle>
+          <a:p>
+            <a:pPr marL="0" indent="0">
+              <a:buFont typeface="Arial" panose="020B0604020202020204" pitchFamily="34" charset="0"/>
+              <a:buNone/>
+            </a:pPr>
+            <a:r>
+              <a:rPr lang="el-GR" dirty="0" smtClean="0"/>
+              <a:t>β</a:t>
+            </a:r>
+            <a:r>
+              <a:rPr lang="en-US" dirty="0" smtClean="0"/>
+              <a:t> = 7.0</a:t>
+            </a:r>
+            <a:endParaRPr lang="en-US" dirty="0"/>
+          </a:p>
+        </p:txBody>
+      </p:sp>
+      <p:sp>
+        <p:nvSpPr>
+          <p:cNvPr id="4" name="TextBox 3"/>
+          <p:cNvSpPr txBox="1"/>
+          <p:nvPr/>
+        </p:nvSpPr>
+        <p:spPr>
+          <a:xfrm>
+            <a:off x="3151255" y="871829"/>
+            <a:ext cx="5018017" cy="461665"/>
+          </a:xfrm>
+          <a:prstGeom prst="rect">
+            <a:avLst/>
+          </a:prstGeom>
+          <a:noFill/>
+        </p:spPr>
+        <p:txBody>
+          <a:bodyPr wrap="square" rtlCol="0">
+            <a:spAutoFit/>
+          </a:bodyPr>
+          <a:lstStyle/>
+          <a:p>
+            <a:r>
+              <a:rPr lang="en-US" sz="2400" dirty="0" smtClean="0"/>
+              <a:t>70 mm focus, </a:t>
+            </a:r>
+            <a:r>
+              <a:rPr lang="el-GR" sz="2400" dirty="0" smtClean="0"/>
+              <a:t>α</a:t>
+            </a:r>
+            <a:r>
+              <a:rPr lang="en-US" sz="2400" dirty="0" smtClean="0"/>
+              <a:t> = 0.005 dB/cm/MHz</a:t>
+            </a:r>
+            <a:endParaRPr lang="en-US" sz="2400" dirty="0"/>
+          </a:p>
+        </p:txBody>
+      </p:sp>
+      <p:cxnSp>
+        <p:nvCxnSpPr>
+          <p:cNvPr id="8" name="Straight Arrow Connector 7"/>
+          <p:cNvCxnSpPr/>
+          <p:nvPr/>
+        </p:nvCxnSpPr>
+        <p:spPr>
+          <a:xfrm>
+            <a:off x="275635" y="1677878"/>
+            <a:ext cx="0" cy="625935"/>
+          </a:xfrm>
+          <a:prstGeom prst="straightConnector1">
+            <a:avLst/>
+          </a:prstGeom>
+          <a:ln>
+            <a:tailEnd type="triangle"/>
+          </a:ln>
+        </p:spPr>
+        <p:style>
+          <a:lnRef idx="3">
+            <a:schemeClr val="dk1"/>
+          </a:lnRef>
+          <a:fillRef idx="0">
+            <a:schemeClr val="dk1"/>
+          </a:fillRef>
+          <a:effectRef idx="2">
+            <a:schemeClr val="dk1"/>
+          </a:effectRef>
+          <a:fontRef idx="minor">
+            <a:schemeClr val="tx1"/>
+          </a:fontRef>
+        </p:style>
+      </p:cxnSp>
+      <p:sp>
+        <p:nvSpPr>
+          <p:cNvPr id="14" name="TextBox 13"/>
+          <p:cNvSpPr txBox="1"/>
+          <p:nvPr/>
+        </p:nvSpPr>
+        <p:spPr>
+          <a:xfrm>
+            <a:off x="0" y="2303813"/>
+            <a:ext cx="819397" cy="369332"/>
+          </a:xfrm>
+          <a:prstGeom prst="rect">
+            <a:avLst/>
+          </a:prstGeom>
+          <a:noFill/>
+        </p:spPr>
+        <p:txBody>
+          <a:bodyPr wrap="square" rtlCol="0">
+            <a:spAutoFit/>
+          </a:bodyPr>
+          <a:lstStyle/>
+          <a:p>
+            <a:r>
+              <a:rPr lang="en-US" dirty="0" smtClean="0"/>
+              <a:t>depth</a:t>
+            </a:r>
+            <a:endParaRPr lang="en-US" dirty="0"/>
+          </a:p>
+        </p:txBody>
+      </p:sp>
+      <p:cxnSp>
+        <p:nvCxnSpPr>
+          <p:cNvPr id="20" name="Straight Arrow Connector 19"/>
+          <p:cNvCxnSpPr/>
+          <p:nvPr/>
+        </p:nvCxnSpPr>
+        <p:spPr>
+          <a:xfrm>
+            <a:off x="264284" y="1677878"/>
+            <a:ext cx="557617" cy="0"/>
+          </a:xfrm>
+          <a:prstGeom prst="straightConnector1">
+            <a:avLst/>
+          </a:prstGeom>
+          <a:ln>
+            <a:tailEnd type="triangle"/>
+          </a:ln>
+        </p:spPr>
+        <p:style>
+          <a:lnRef idx="3">
+            <a:schemeClr val="dk1"/>
+          </a:lnRef>
+          <a:fillRef idx="0">
+            <a:schemeClr val="dk1"/>
+          </a:fillRef>
+          <a:effectRef idx="2">
+            <a:schemeClr val="dk1"/>
+          </a:effectRef>
+          <a:fontRef idx="minor">
+            <a:schemeClr val="tx1"/>
+          </a:fontRef>
+        </p:style>
+      </p:cxnSp>
+      <p:sp>
+        <p:nvSpPr>
+          <p:cNvPr id="22" name="TextBox 21"/>
+          <p:cNvSpPr txBox="1"/>
+          <p:nvPr/>
+        </p:nvSpPr>
+        <p:spPr>
+          <a:xfrm>
+            <a:off x="451533" y="1261433"/>
+            <a:ext cx="819397" cy="369332"/>
+          </a:xfrm>
+          <a:prstGeom prst="rect">
+            <a:avLst/>
+          </a:prstGeom>
+          <a:noFill/>
+        </p:spPr>
+        <p:txBody>
+          <a:bodyPr wrap="square" rtlCol="0">
+            <a:spAutoFit/>
+          </a:bodyPr>
+          <a:lstStyle/>
+          <a:p>
+            <a:r>
+              <a:rPr lang="en-US" dirty="0" smtClean="0"/>
+              <a:t>lateral</a:t>
+            </a:r>
+            <a:endParaRPr lang="en-US" dirty="0"/>
+          </a:p>
+        </p:txBody>
+      </p:sp>
+    </p:spTree>
+    <p:extLst>
+      <p:ext uri="{BB962C8B-B14F-4D97-AF65-F5344CB8AC3E}">
+        <p14:creationId xmlns:p14="http://schemas.microsoft.com/office/powerpoint/2010/main" val="1059947133"/>
+      </p:ext>
+    </p:extLst>
+  </p:cSld>
+  <p:clrMapOvr>
+    <a:masterClrMapping/>
+  </p:clrMapOvr>
+  <p:timing>
+    <p:tnLst>
+      <p:par>
+        <p:cTn id="1" dur="indefinite" restart="never" nodeType="tmRoot"/>
+      </p:par>
+    </p:tnLst>
+  </p:timing>
+</p:sld>
+</file>
+
+<file path=ppt/slides/slide9.xml><?xml version="1.0" encoding="utf-8"?>
+<p:sld xmlns:a="http://schemas.openxmlformats.org/drawingml/2006/main" xmlns:r="http://schemas.openxmlformats.org/officeDocument/2006/relationships" xmlns:p="http://schemas.openxmlformats.org/presentationml/2006/main">
+  <p:cSld>
+    <p:spTree>
+      <p:nvGrpSpPr>
+        <p:cNvPr id="1" name=""/>
+        <p:cNvGrpSpPr/>
+        <p:nvPr/>
+      </p:nvGrpSpPr>
+      <p:grpSpPr>
+        <a:xfrm>
+          <a:off x="0" y="0"/>
+          <a:ext cx="0" cy="0"/>
+          <a:chOff x="0" y="0"/>
+          <a:chExt cx="0" cy="0"/>
+        </a:xfrm>
+      </p:grpSpPr>
+      <p:sp>
+        <p:nvSpPr>
+          <p:cNvPr id="2" name="Title 1"/>
+          <p:cNvSpPr>
+            <a:spLocks noGrp="1"/>
+          </p:cNvSpPr>
+          <p:nvPr>
+            <p:ph type="title"/>
+          </p:nvPr>
+        </p:nvSpPr>
+        <p:spPr>
+          <a:xfrm>
+            <a:off x="584394" y="206166"/>
+            <a:ext cx="10515600" cy="751552"/>
+          </a:xfrm>
+        </p:spPr>
+        <p:txBody>
+          <a:bodyPr/>
+          <a:lstStyle/>
+          <a:p>
+            <a:r>
+              <a:rPr lang="en-US" dirty="0" smtClean="0"/>
+              <a:t>Intensity Fields with Increasing Nonlinearity</a:t>
+            </a:r>
+            <a:endParaRPr lang="en-US" dirty="0"/>
+          </a:p>
+        </p:txBody>
+      </p:sp>
+      <p:sp>
+        <p:nvSpPr>
+          <p:cNvPr id="3" name="Content Placeholder 2"/>
+          <p:cNvSpPr>
+            <a:spLocks noGrp="1"/>
+          </p:cNvSpPr>
+          <p:nvPr>
+            <p:ph idx="1"/>
+          </p:nvPr>
+        </p:nvSpPr>
+        <p:spPr>
+          <a:xfrm>
+            <a:off x="5110330" y="6291945"/>
+            <a:ext cx="1099866" cy="393680"/>
+          </a:xfrm>
+        </p:spPr>
+        <p:txBody>
+          <a:bodyPr>
+            <a:normAutofit fontScale="92500" lnSpcReduction="20000"/>
+          </a:bodyPr>
+          <a:lstStyle/>
+          <a:p>
+            <a:pPr marL="0" indent="0">
+              <a:buNone/>
+            </a:pPr>
+            <a:r>
+              <a:rPr lang="el-GR" dirty="0" smtClean="0"/>
+              <a:t>β</a:t>
+            </a:r>
+            <a:r>
+              <a:rPr lang="en-US" dirty="0" smtClean="0"/>
+              <a:t> = 3.5</a:t>
+            </a:r>
+            <a:endParaRPr lang="en-US" dirty="0"/>
+          </a:p>
+        </p:txBody>
+      </p:sp>
+      <p:sp>
+        <p:nvSpPr>
+          <p:cNvPr id="9" name="Content Placeholder 2"/>
+          <p:cNvSpPr txBox="1">
+            <a:spLocks/>
+          </p:cNvSpPr>
+          <p:nvPr/>
+        </p:nvSpPr>
+        <p:spPr>
+          <a:xfrm>
+            <a:off x="1868025" y="6291945"/>
+            <a:ext cx="1206338" cy="393680"/>
+          </a:xfrm>
+          <a:prstGeom prst="rect">
+            <a:avLst/>
+          </a:prstGeom>
+        </p:spPr>
+        <p:txBody>
+          <a:bodyPr vert="horz" lIns="91440" tIns="45720" rIns="91440" bIns="45720" rtlCol="0">
+            <a:normAutofit fontScale="92500" lnSpcReduction="20000"/>
+          </a:bodyPr>
+          <a:lstStyle>
+            <a:lvl1pPr marL="228600" indent="-228600" algn="l" defTabSz="914400" rtl="0" eaLnBrk="1" latinLnBrk="0" hangingPunct="1">
+              <a:lnSpc>
+                <a:spcPct val="90000"/>
+              </a:lnSpc>
+              <a:spcBef>
+                <a:spcPts val="1000"/>
+              </a:spcBef>
+              <a:buFont typeface="Arial" panose="020B0604020202020204" pitchFamily="34" charset="0"/>
+              <a:buChar char="•"/>
+              <a:defRPr sz="2800" kern="1200">
+                <a:solidFill>
+                  <a:schemeClr val="tx1"/>
+                </a:solidFill>
+                <a:latin typeface="+mn-lt"/>
+                <a:ea typeface="+mn-ea"/>
+                <a:cs typeface="+mn-cs"/>
+              </a:defRPr>
+            </a:lvl1pPr>
+            <a:lvl2pPr marL="685800" indent="-228600" algn="l" defTabSz="914400" rtl="0" eaLnBrk="1" latinLnBrk="0" hangingPunct="1">
+              <a:lnSpc>
+                <a:spcPct val="90000"/>
+              </a:lnSpc>
+              <a:spcBef>
+                <a:spcPts val="500"/>
+              </a:spcBef>
+              <a:buFont typeface="Arial" panose="020B0604020202020204" pitchFamily="34" charset="0"/>
+              <a:buChar char="•"/>
+              <a:defRPr sz="2400" kern="1200">
+                <a:solidFill>
+                  <a:schemeClr val="tx1"/>
+                </a:solidFill>
+                <a:latin typeface="+mn-lt"/>
+                <a:ea typeface="+mn-ea"/>
+                <a:cs typeface="+mn-cs"/>
+              </a:defRPr>
+            </a:lvl2pPr>
+            <a:lvl3pPr marL="1143000" indent="-228600" algn="l" defTabSz="914400" rtl="0" eaLnBrk="1" latinLnBrk="0" hangingPunct="1">
+              <a:lnSpc>
+                <a:spcPct val="90000"/>
+              </a:lnSpc>
+              <a:spcBef>
+                <a:spcPts val="500"/>
+              </a:spcBef>
+              <a:buFont typeface="Arial" panose="020B0604020202020204" pitchFamily="34" charset="0"/>
+              <a:buChar char="•"/>
+              <a:defRPr sz="2000" kern="1200">
+                <a:solidFill>
+                  <a:schemeClr val="tx1"/>
+                </a:solidFill>
+                <a:latin typeface="+mn-lt"/>
+                <a:ea typeface="+mn-ea"/>
+                <a:cs typeface="+mn-cs"/>
+              </a:defRPr>
+            </a:lvl3pPr>
+            <a:lvl4pPr marL="1600200" indent="-228600" algn="l" defTabSz="914400" rtl="0" eaLnBrk="1" latinLnBrk="0" hangingPunct="1">
+              <a:lnSpc>
+                <a:spcPct val="90000"/>
+              </a:lnSpc>
+              <a:spcBef>
+                <a:spcPts val="500"/>
+              </a:spcBef>
+              <a:buFont typeface="Arial" panose="020B0604020202020204" pitchFamily="34" charset="0"/>
+              <a:buChar char="•"/>
+              <a:defRPr sz="1800" kern="1200">
+                <a:solidFill>
+                  <a:schemeClr val="tx1"/>
+                </a:solidFill>
+                <a:latin typeface="+mn-lt"/>
+                <a:ea typeface="+mn-ea"/>
+                <a:cs typeface="+mn-cs"/>
+              </a:defRPr>
+            </a:lvl4pPr>
+            <a:lvl5pPr marL="2057400" indent="-228600" algn="l" defTabSz="914400" rtl="0" eaLnBrk="1" latinLnBrk="0" hangingPunct="1">
+              <a:lnSpc>
+                <a:spcPct val="90000"/>
+              </a:lnSpc>
+              <a:spcBef>
+                <a:spcPts val="500"/>
+              </a:spcBef>
+              <a:buFont typeface="Arial" panose="020B0604020202020204" pitchFamily="34" charset="0"/>
+              <a:buChar char="•"/>
+              <a:defRPr sz="1800" kern="1200">
+                <a:solidFill>
+                  <a:schemeClr val="tx1"/>
+                </a:solidFill>
+                <a:latin typeface="+mn-lt"/>
+                <a:ea typeface="+mn-ea"/>
+                <a:cs typeface="+mn-cs"/>
+              </a:defRPr>
+            </a:lvl5pPr>
+            <a:lvl6pPr marL="2514600" indent="-228600" algn="l" defTabSz="914400" rtl="0" eaLnBrk="1" latinLnBrk="0" hangingPunct="1">
+              <a:lnSpc>
+                <a:spcPct val="90000"/>
+              </a:lnSpc>
+              <a:spcBef>
+                <a:spcPts val="500"/>
+              </a:spcBef>
+              <a:buFont typeface="Arial" panose="020B0604020202020204" pitchFamily="34" charset="0"/>
+              <a:buChar char="•"/>
+              <a:defRPr sz="1800" kern="1200">
+                <a:solidFill>
+                  <a:schemeClr val="tx1"/>
+                </a:solidFill>
+                <a:latin typeface="+mn-lt"/>
+                <a:ea typeface="+mn-ea"/>
+                <a:cs typeface="+mn-cs"/>
+              </a:defRPr>
+            </a:lvl6pPr>
+            <a:lvl7pPr marL="2971800" indent="-228600" algn="l" defTabSz="914400" rtl="0" eaLnBrk="1" latinLnBrk="0" hangingPunct="1">
+              <a:lnSpc>
+                <a:spcPct val="90000"/>
+              </a:lnSpc>
+              <a:spcBef>
+                <a:spcPts val="500"/>
+              </a:spcBef>
+              <a:buFont typeface="Arial" panose="020B0604020202020204" pitchFamily="34" charset="0"/>
+              <a:buChar char="•"/>
+              <a:defRPr sz="1800" kern="1200">
+                <a:solidFill>
+                  <a:schemeClr val="tx1"/>
+                </a:solidFill>
+                <a:latin typeface="+mn-lt"/>
+                <a:ea typeface="+mn-ea"/>
+                <a:cs typeface="+mn-cs"/>
+              </a:defRPr>
+            </a:lvl7pPr>
+            <a:lvl8pPr marL="3429000" indent="-228600" algn="l" defTabSz="914400" rtl="0" eaLnBrk="1" latinLnBrk="0" hangingPunct="1">
+              <a:lnSpc>
+                <a:spcPct val="90000"/>
+              </a:lnSpc>
+              <a:spcBef>
+                <a:spcPts val="500"/>
+              </a:spcBef>
+              <a:buFont typeface="Arial" panose="020B0604020202020204" pitchFamily="34" charset="0"/>
+              <a:buChar char="•"/>
+              <a:defRPr sz="1800" kern="1200">
+                <a:solidFill>
+                  <a:schemeClr val="tx1"/>
+                </a:solidFill>
+                <a:latin typeface="+mn-lt"/>
+                <a:ea typeface="+mn-ea"/>
+                <a:cs typeface="+mn-cs"/>
+              </a:defRPr>
+            </a:lvl8pPr>
+            <a:lvl9pPr marL="3886200" indent="-228600" algn="l" defTabSz="914400" rtl="0" eaLnBrk="1" latinLnBrk="0" hangingPunct="1">
+              <a:lnSpc>
+                <a:spcPct val="90000"/>
+              </a:lnSpc>
+              <a:spcBef>
+                <a:spcPts val="500"/>
+              </a:spcBef>
+              <a:buFont typeface="Arial" panose="020B0604020202020204" pitchFamily="34" charset="0"/>
+              <a:buChar char="•"/>
+              <a:defRPr sz="1800" kern="1200">
+                <a:solidFill>
+                  <a:schemeClr val="tx1"/>
+                </a:solidFill>
+                <a:latin typeface="+mn-lt"/>
+                <a:ea typeface="+mn-ea"/>
+                <a:cs typeface="+mn-cs"/>
+              </a:defRPr>
+            </a:lvl9pPr>
+          </a:lstStyle>
+          <a:p>
+            <a:pPr marL="0" indent="0">
+              <a:buFont typeface="Arial" panose="020B0604020202020204" pitchFamily="34" charset="0"/>
+              <a:buNone/>
+            </a:pPr>
+            <a:r>
+              <a:rPr lang="el-GR" dirty="0" smtClean="0"/>
+              <a:t>β</a:t>
+            </a:r>
+            <a:r>
+              <a:rPr lang="en-US" dirty="0" smtClean="0"/>
+              <a:t> = 0.0</a:t>
+            </a:r>
+            <a:endParaRPr lang="en-US" dirty="0"/>
+          </a:p>
+        </p:txBody>
+      </p:sp>
+      <p:sp>
+        <p:nvSpPr>
+          <p:cNvPr id="10" name="Content Placeholder 2"/>
+          <p:cNvSpPr txBox="1">
+            <a:spLocks/>
+          </p:cNvSpPr>
+          <p:nvPr/>
+        </p:nvSpPr>
+        <p:spPr>
+          <a:xfrm>
+            <a:off x="8264262" y="6291945"/>
+            <a:ext cx="1206338" cy="393680"/>
+          </a:xfrm>
+          <a:prstGeom prst="rect">
+            <a:avLst/>
+          </a:prstGeom>
+        </p:spPr>
+        <p:txBody>
+          <a:bodyPr vert="horz" lIns="91440" tIns="45720" rIns="91440" bIns="45720" rtlCol="0">
+            <a:normAutofit fontScale="92500" lnSpcReduction="20000"/>
+          </a:bodyPr>
+          <a:lstStyle>
+            <a:lvl1pPr marL="228600" indent="-228600" algn="l" defTabSz="914400" rtl="0" eaLnBrk="1" latinLnBrk="0" hangingPunct="1">
+              <a:lnSpc>
+                <a:spcPct val="90000"/>
+              </a:lnSpc>
+              <a:spcBef>
+                <a:spcPts val="1000"/>
+              </a:spcBef>
+              <a:buFont typeface="Arial" panose="020B0604020202020204" pitchFamily="34" charset="0"/>
+              <a:buChar char="•"/>
+              <a:defRPr sz="2800" kern="1200">
+                <a:solidFill>
+                  <a:schemeClr val="tx1"/>
+                </a:solidFill>
+                <a:latin typeface="+mn-lt"/>
+                <a:ea typeface="+mn-ea"/>
+                <a:cs typeface="+mn-cs"/>
+              </a:defRPr>
+            </a:lvl1pPr>
+            <a:lvl2pPr marL="685800" indent="-228600" algn="l" defTabSz="914400" rtl="0" eaLnBrk="1" latinLnBrk="0" hangingPunct="1">
+              <a:lnSpc>
+                <a:spcPct val="90000"/>
+              </a:lnSpc>
+              <a:spcBef>
+                <a:spcPts val="500"/>
+              </a:spcBef>
+              <a:buFont typeface="Arial" panose="020B0604020202020204" pitchFamily="34" charset="0"/>
+              <a:buChar char="•"/>
+              <a:defRPr sz="2400" kern="1200">
+                <a:solidFill>
+                  <a:schemeClr val="tx1"/>
+                </a:solidFill>
+                <a:latin typeface="+mn-lt"/>
+                <a:ea typeface="+mn-ea"/>
+                <a:cs typeface="+mn-cs"/>
+              </a:defRPr>
+            </a:lvl2pPr>
+            <a:lvl3pPr marL="1143000" indent="-228600" algn="l" defTabSz="914400" rtl="0" eaLnBrk="1" latinLnBrk="0" hangingPunct="1">
+              <a:lnSpc>
+                <a:spcPct val="90000"/>
+              </a:lnSpc>
+              <a:spcBef>
+                <a:spcPts val="500"/>
+              </a:spcBef>
+              <a:buFont typeface="Arial" panose="020B0604020202020204" pitchFamily="34" charset="0"/>
+              <a:buChar char="•"/>
+              <a:defRPr sz="2000" kern="1200">
+                <a:solidFill>
+                  <a:schemeClr val="tx1"/>
+                </a:solidFill>
+                <a:latin typeface="+mn-lt"/>
+                <a:ea typeface="+mn-ea"/>
+                <a:cs typeface="+mn-cs"/>
+              </a:defRPr>
+            </a:lvl3pPr>
+            <a:lvl4pPr marL="1600200" indent="-228600" algn="l" defTabSz="914400" rtl="0" eaLnBrk="1" latinLnBrk="0" hangingPunct="1">
+              <a:lnSpc>
+                <a:spcPct val="90000"/>
+              </a:lnSpc>
+              <a:spcBef>
+                <a:spcPts val="500"/>
+              </a:spcBef>
+              <a:buFont typeface="Arial" panose="020B0604020202020204" pitchFamily="34" charset="0"/>
+              <a:buChar char="•"/>
+              <a:defRPr sz="1800" kern="1200">
+                <a:solidFill>
+                  <a:schemeClr val="tx1"/>
+                </a:solidFill>
+                <a:latin typeface="+mn-lt"/>
+                <a:ea typeface="+mn-ea"/>
+                <a:cs typeface="+mn-cs"/>
+              </a:defRPr>
+            </a:lvl4pPr>
+            <a:lvl5pPr marL="2057400" indent="-228600" algn="l" defTabSz="914400" rtl="0" eaLnBrk="1" latinLnBrk="0" hangingPunct="1">
+              <a:lnSpc>
+                <a:spcPct val="90000"/>
+              </a:lnSpc>
+              <a:spcBef>
+                <a:spcPts val="500"/>
+              </a:spcBef>
+              <a:buFont typeface="Arial" panose="020B0604020202020204" pitchFamily="34" charset="0"/>
+              <a:buChar char="•"/>
+              <a:defRPr sz="1800" kern="1200">
+                <a:solidFill>
+                  <a:schemeClr val="tx1"/>
+                </a:solidFill>
+                <a:latin typeface="+mn-lt"/>
+                <a:ea typeface="+mn-ea"/>
+                <a:cs typeface="+mn-cs"/>
+              </a:defRPr>
+            </a:lvl5pPr>
+            <a:lvl6pPr marL="2514600" indent="-228600" algn="l" defTabSz="914400" rtl="0" eaLnBrk="1" latinLnBrk="0" hangingPunct="1">
+              <a:lnSpc>
+                <a:spcPct val="90000"/>
+              </a:lnSpc>
+              <a:spcBef>
+                <a:spcPts val="500"/>
+              </a:spcBef>
+              <a:buFont typeface="Arial" panose="020B0604020202020204" pitchFamily="34" charset="0"/>
+              <a:buChar char="•"/>
+              <a:defRPr sz="1800" kern="1200">
+                <a:solidFill>
+                  <a:schemeClr val="tx1"/>
+                </a:solidFill>
+                <a:latin typeface="+mn-lt"/>
+                <a:ea typeface="+mn-ea"/>
+                <a:cs typeface="+mn-cs"/>
+              </a:defRPr>
+            </a:lvl6pPr>
+            <a:lvl7pPr marL="2971800" indent="-228600" algn="l" defTabSz="914400" rtl="0" eaLnBrk="1" latinLnBrk="0" hangingPunct="1">
+              <a:lnSpc>
+                <a:spcPct val="90000"/>
+              </a:lnSpc>
+              <a:spcBef>
+                <a:spcPts val="500"/>
+              </a:spcBef>
+              <a:buFont typeface="Arial" panose="020B0604020202020204" pitchFamily="34" charset="0"/>
+              <a:buChar char="•"/>
+              <a:defRPr sz="1800" kern="1200">
+                <a:solidFill>
+                  <a:schemeClr val="tx1"/>
+                </a:solidFill>
+                <a:latin typeface="+mn-lt"/>
+                <a:ea typeface="+mn-ea"/>
+                <a:cs typeface="+mn-cs"/>
+              </a:defRPr>
+            </a:lvl7pPr>
+            <a:lvl8pPr marL="3429000" indent="-228600" algn="l" defTabSz="914400" rtl="0" eaLnBrk="1" latinLnBrk="0" hangingPunct="1">
+              <a:lnSpc>
+                <a:spcPct val="90000"/>
+              </a:lnSpc>
+              <a:spcBef>
+                <a:spcPts val="500"/>
+              </a:spcBef>
+              <a:buFont typeface="Arial" panose="020B0604020202020204" pitchFamily="34" charset="0"/>
+              <a:buChar char="•"/>
+              <a:defRPr sz="1800" kern="1200">
+                <a:solidFill>
+                  <a:schemeClr val="tx1"/>
+                </a:solidFill>
+                <a:latin typeface="+mn-lt"/>
+                <a:ea typeface="+mn-ea"/>
+                <a:cs typeface="+mn-cs"/>
+              </a:defRPr>
+            </a:lvl8pPr>
+            <a:lvl9pPr marL="3886200" indent="-228600" algn="l" defTabSz="914400" rtl="0" eaLnBrk="1" latinLnBrk="0" hangingPunct="1">
+              <a:lnSpc>
+                <a:spcPct val="90000"/>
+              </a:lnSpc>
+              <a:spcBef>
+                <a:spcPts val="500"/>
+              </a:spcBef>
+              <a:buFont typeface="Arial" panose="020B0604020202020204" pitchFamily="34" charset="0"/>
+              <a:buChar char="•"/>
+              <a:defRPr sz="1800" kern="1200">
+                <a:solidFill>
+                  <a:schemeClr val="tx1"/>
+                </a:solidFill>
+                <a:latin typeface="+mn-lt"/>
+                <a:ea typeface="+mn-ea"/>
+                <a:cs typeface="+mn-cs"/>
+              </a:defRPr>
+            </a:lvl9pPr>
+          </a:lstStyle>
+          <a:p>
+            <a:pPr marL="0" indent="0">
+              <a:buFont typeface="Arial" panose="020B0604020202020204" pitchFamily="34" charset="0"/>
+              <a:buNone/>
+            </a:pPr>
+            <a:r>
+              <a:rPr lang="el-GR" dirty="0" smtClean="0"/>
+              <a:t>β</a:t>
+            </a:r>
+            <a:r>
+              <a:rPr lang="en-US" dirty="0" smtClean="0"/>
+              <a:t> = 7.0</a:t>
+            </a:r>
+            <a:endParaRPr lang="en-US" dirty="0"/>
+          </a:p>
+        </p:txBody>
+      </p:sp>
+      <p:sp>
+        <p:nvSpPr>
+          <p:cNvPr id="4" name="TextBox 3"/>
+          <p:cNvSpPr txBox="1"/>
+          <p:nvPr/>
+        </p:nvSpPr>
+        <p:spPr>
+          <a:xfrm>
+            <a:off x="3489226" y="874716"/>
+            <a:ext cx="4342075" cy="461665"/>
+          </a:xfrm>
+          <a:prstGeom prst="rect">
+            <a:avLst/>
+          </a:prstGeom>
+          <a:noFill/>
+        </p:spPr>
+        <p:txBody>
+          <a:bodyPr wrap="square" rtlCol="0">
+            <a:spAutoFit/>
+          </a:bodyPr>
+          <a:lstStyle/>
+          <a:p>
+            <a:r>
+              <a:rPr lang="en-US" sz="2400" dirty="0" smtClean="0"/>
+              <a:t>70 mm focus, </a:t>
+            </a:r>
+            <a:r>
+              <a:rPr lang="el-GR" sz="2400" dirty="0" smtClean="0"/>
+              <a:t>α</a:t>
+            </a:r>
+            <a:r>
+              <a:rPr lang="en-US" sz="2400" dirty="0" smtClean="0"/>
+              <a:t> = 1.0 dB/cm/MHz</a:t>
+            </a:r>
+            <a:endParaRPr lang="en-US" sz="2400" dirty="0"/>
+          </a:p>
+        </p:txBody>
+      </p:sp>
+      <p:pic>
+        <p:nvPicPr>
+          <p:cNvPr id="3074" name="Picture 2" descr="https://github.com/Ningrui-Li/nonlinear_acoustic/blob/master/presentations/nc_bmes_sympo/paraview_kzk_isocontours/a_1.0/c52_70mm_a_1.0_B_0_lateral.png?raw=true"/>
+          <p:cNvPicPr>
+            <a:picLocks noChangeAspect="1" noChangeArrowheads="1"/>
+          </p:cNvPicPr>
+          <p:nvPr/>
+        </p:nvPicPr>
+        <p:blipFill rotWithShape="1">
+          <a:blip r:embed="rId3" cstate="print">
+            <a:extLst>
+              <a:ext uri="{28A0092B-C50C-407E-A947-70E740481C1C}">
+                <a14:useLocalDpi xmlns:a14="http://schemas.microsoft.com/office/drawing/2010/main" val="0"/>
+              </a:ext>
+            </a:extLst>
+          </a:blip>
+          <a:srcRect l="33204" r="33367"/>
+          <a:stretch/>
+        </p:blipFill>
+        <p:spPr bwMode="auto">
+          <a:xfrm>
+            <a:off x="1453162" y="1463585"/>
+            <a:ext cx="2036064" cy="4568178"/>
+          </a:xfrm>
+          <a:prstGeom prst="rect">
+            <a:avLst/>
+          </a:prstGeom>
+          <a:noFill/>
+          <a:extLst>
+            <a:ext uri="{909E8E84-426E-40DD-AFC4-6F175D3DCCD1}">
+              <a14:hiddenFill xmlns:a14="http://schemas.microsoft.com/office/drawing/2010/main">
+                <a:solidFill>
+                  <a:srgbClr val="FFFFFF"/>
+                </a:solidFill>
+              </a14:hiddenFill>
+            </a:ext>
+          </a:extLst>
+        </p:spPr>
+      </p:pic>
+      <p:pic>
+        <p:nvPicPr>
+          <p:cNvPr id="3076" name="Picture 4" descr="https://github.com/Ningrui-Li/nonlinear_acoustic/blob/master/presentations/nc_bmes_sympo/paraview_kzk_isocontours/a_1.0/c52_70mm_a_1.0_B_3.5_lateral.png?raw=true"/>
+          <p:cNvPicPr>
+            <a:picLocks noChangeAspect="1" noChangeArrowheads="1"/>
+          </p:cNvPicPr>
+          <p:nvPr/>
+        </p:nvPicPr>
+        <p:blipFill rotWithShape="1">
+          <a:blip r:embed="rId4" cstate="print">
+            <a:extLst>
+              <a:ext uri="{28A0092B-C50C-407E-A947-70E740481C1C}">
+                <a14:useLocalDpi xmlns:a14="http://schemas.microsoft.com/office/drawing/2010/main" val="0"/>
+              </a:ext>
+            </a:extLst>
+          </a:blip>
+          <a:srcRect l="33106" r="33489"/>
+          <a:stretch/>
+        </p:blipFill>
+        <p:spPr bwMode="auto">
+          <a:xfrm>
+            <a:off x="4641118" y="1463585"/>
+            <a:ext cx="2038290" cy="4573952"/>
+          </a:xfrm>
+          <a:prstGeom prst="rect">
+            <a:avLst/>
+          </a:prstGeom>
+          <a:noFill/>
+          <a:extLst>
+            <a:ext uri="{909E8E84-426E-40DD-AFC4-6F175D3DCCD1}">
+              <a14:hiddenFill xmlns:a14="http://schemas.microsoft.com/office/drawing/2010/main">
+                <a:solidFill>
+                  <a:srgbClr val="FFFFFF"/>
+                </a:solidFill>
+              </a14:hiddenFill>
+            </a:ext>
+          </a:extLst>
+        </p:spPr>
+      </p:pic>
+      <p:pic>
+        <p:nvPicPr>
+          <p:cNvPr id="3078" name="Picture 6" descr="https://github.com/Ningrui-Li/nonlinear_acoustic/blob/master/presentations/nc_bmes_sympo/paraview_kzk_isocontours/a_1.0/c52_70mm_a_1.0_B_7_lateral.png?raw=true"/>
+          <p:cNvPicPr>
+            <a:picLocks noChangeAspect="1" noChangeArrowheads="1"/>
+          </p:cNvPicPr>
+          <p:nvPr/>
+        </p:nvPicPr>
+        <p:blipFill rotWithShape="1">
+          <a:blip r:embed="rId5" cstate="print">
+            <a:extLst>
+              <a:ext uri="{28A0092B-C50C-407E-A947-70E740481C1C}">
+                <a14:useLocalDpi xmlns:a14="http://schemas.microsoft.com/office/drawing/2010/main" val="0"/>
+              </a:ext>
+            </a:extLst>
+          </a:blip>
+          <a:srcRect l="32588" r="33406"/>
+          <a:stretch/>
+        </p:blipFill>
+        <p:spPr bwMode="auto">
+          <a:xfrm>
+            <a:off x="7831300" y="1463585"/>
+            <a:ext cx="2072262" cy="4568178"/>
+          </a:xfrm>
+          <a:prstGeom prst="rect">
+            <a:avLst/>
+          </a:prstGeom>
+          <a:noFill/>
+          <a:extLst>
+            <a:ext uri="{909E8E84-426E-40DD-AFC4-6F175D3DCCD1}">
+              <a14:hiddenFill xmlns:a14="http://schemas.microsoft.com/office/drawing/2010/main">
+                <a:solidFill>
+                  <a:srgbClr val="FFFFFF"/>
+                </a:solidFill>
+              </a14:hiddenFill>
+            </a:ext>
+          </a:extLst>
+        </p:spPr>
+      </p:pic>
+      <p:cxnSp>
+        <p:nvCxnSpPr>
+          <p:cNvPr id="13" name="Straight Arrow Connector 12"/>
+          <p:cNvCxnSpPr/>
+          <p:nvPr/>
+        </p:nvCxnSpPr>
+        <p:spPr>
+          <a:xfrm>
+            <a:off x="275635" y="1677878"/>
+            <a:ext cx="0" cy="625935"/>
+          </a:xfrm>
+          <a:prstGeom prst="straightConnector1">
+            <a:avLst/>
+          </a:prstGeom>
+          <a:ln>
+            <a:tailEnd type="triangle"/>
+          </a:ln>
+        </p:spPr>
+        <p:style>
+          <a:lnRef idx="3">
+            <a:schemeClr val="dk1"/>
+          </a:lnRef>
+          <a:fillRef idx="0">
+            <a:schemeClr val="dk1"/>
+          </a:fillRef>
+          <a:effectRef idx="2">
+            <a:schemeClr val="dk1"/>
+          </a:effectRef>
+          <a:fontRef idx="minor">
+            <a:schemeClr val="tx1"/>
+          </a:fontRef>
+        </p:style>
+      </p:cxnSp>
+      <p:sp>
+        <p:nvSpPr>
+          <p:cNvPr id="14" name="TextBox 13"/>
+          <p:cNvSpPr txBox="1"/>
+          <p:nvPr/>
+        </p:nvSpPr>
+        <p:spPr>
+          <a:xfrm>
+            <a:off x="0" y="2303813"/>
+            <a:ext cx="819397" cy="369332"/>
+          </a:xfrm>
+          <a:prstGeom prst="rect">
+            <a:avLst/>
+          </a:prstGeom>
+          <a:noFill/>
+        </p:spPr>
+        <p:txBody>
+          <a:bodyPr wrap="square" rtlCol="0">
+            <a:spAutoFit/>
+          </a:bodyPr>
+          <a:lstStyle/>
+          <a:p>
+            <a:r>
+              <a:rPr lang="en-US" dirty="0" smtClean="0"/>
+              <a:t>depth</a:t>
+            </a:r>
+            <a:endParaRPr lang="en-US" dirty="0"/>
+          </a:p>
+        </p:txBody>
+      </p:sp>
+      <p:cxnSp>
+        <p:nvCxnSpPr>
+          <p:cNvPr id="15" name="Straight Arrow Connector 14"/>
+          <p:cNvCxnSpPr/>
+          <p:nvPr/>
+        </p:nvCxnSpPr>
+        <p:spPr>
+          <a:xfrm>
+            <a:off x="264284" y="1677878"/>
+            <a:ext cx="557617" cy="0"/>
+          </a:xfrm>
+          <a:prstGeom prst="straightConnector1">
+            <a:avLst/>
+          </a:prstGeom>
+          <a:ln>
+            <a:tailEnd type="triangle"/>
+          </a:ln>
+        </p:spPr>
+        <p:style>
+          <a:lnRef idx="3">
+            <a:schemeClr val="dk1"/>
+          </a:lnRef>
+          <a:fillRef idx="0">
+            <a:schemeClr val="dk1"/>
+          </a:fillRef>
+          <a:effectRef idx="2">
+            <a:schemeClr val="dk1"/>
+          </a:effectRef>
+          <a:fontRef idx="minor">
+            <a:schemeClr val="tx1"/>
+          </a:fontRef>
+        </p:style>
+      </p:cxnSp>
+      <p:sp>
+        <p:nvSpPr>
+          <p:cNvPr id="16" name="TextBox 15"/>
+          <p:cNvSpPr txBox="1"/>
+          <p:nvPr/>
+        </p:nvSpPr>
+        <p:spPr>
+          <a:xfrm>
+            <a:off x="451533" y="1261433"/>
+            <a:ext cx="819397" cy="369332"/>
+          </a:xfrm>
+          <a:prstGeom prst="rect">
+            <a:avLst/>
+          </a:prstGeom>
+          <a:noFill/>
+        </p:spPr>
+        <p:txBody>
+          <a:bodyPr wrap="square" rtlCol="0">
+            <a:spAutoFit/>
+          </a:bodyPr>
+          <a:lstStyle/>
+          <a:p>
+            <a:r>
+              <a:rPr lang="en-US" dirty="0" smtClean="0"/>
+              <a:t>lateral</a:t>
+            </a:r>
+            <a:endParaRPr lang="en-US" dirty="0"/>
+          </a:p>
+        </p:txBody>
+      </p:sp>
+    </p:spTree>
+    <p:extLst>
+      <p:ext uri="{BB962C8B-B14F-4D97-AF65-F5344CB8AC3E}">
+        <p14:creationId xmlns:p14="http://schemas.microsoft.com/office/powerpoint/2010/main" val="704496916"/>
       </p:ext>
     </p:extLst>
   </p:cSld>
@@ -4433,4 +7714,265 @@
     </a:ext>
   </a:extLst>
 </a:theme>
+</file>
+
+<file path=ppt/theme/theme2.xml><?xml version="1.0" encoding="utf-8"?>
+<a:theme xmlns:a="http://schemas.openxmlformats.org/drawingml/2006/main" name="Office Theme">
+  <a:themeElements>
+    <a:clrScheme name="Office">
+      <a:dk1>
+        <a:sysClr val="windowText" lastClr="000000"/>
+      </a:dk1>
+      <a:lt1>
+        <a:sysClr val="window" lastClr="FFFFFF"/>
+      </a:lt1>
+      <a:dk2>
+        <a:srgbClr val="44546A"/>
+      </a:dk2>
+      <a:lt2>
+        <a:srgbClr val="E7E6E6"/>
+      </a:lt2>
+      <a:accent1>
+        <a:srgbClr val="5B9BD5"/>
+      </a:accent1>
+      <a:accent2>
+        <a:srgbClr val="ED7D31"/>
+      </a:accent2>
+      <a:accent3>
+        <a:srgbClr val="A5A5A5"/>
+      </a:accent3>
+      <a:accent4>
+        <a:srgbClr val="FFC000"/>
+      </a:accent4>
+      <a:accent5>
+        <a:srgbClr val="4472C4"/>
+      </a:accent5>
+      <a:accent6>
+        <a:srgbClr val="70AD47"/>
+      </a:accent6>
+      <a:hlink>
+        <a:srgbClr val="0563C1"/>
+      </a:hlink>
+      <a:folHlink>
+        <a:srgbClr val="954F72"/>
+      </a:folHlink>
+    </a:clrScheme>
+    <a:fontScheme name="Office">
+      <a:majorFont>
+        <a:latin typeface="Calibri Light" panose="020F0302020204030204"/>
+        <a:ea typeface=""/>
+        <a:cs typeface=""/>
+        <a:font script="Jpan" typeface="ＭＳ Ｐゴシック"/>
+        <a:font script="Hang" typeface="맑은 고딕"/>
+        <a:font script="Hans" typeface="宋体"/>
+        <a:font script="Hant" typeface="新細明體"/>
+        <a:font script="Arab" typeface="Times New Roman"/>
+        <a:font script="Hebr" typeface="Times New Roman"/>
+        <a:font script="Thai" typeface="Angsana New"/>
+        <a:font script="Ethi" typeface="Nyala"/>
+        <a:font script="Beng" typeface="Vrinda"/>
+        <a:font script="Gujr" typeface="Shruti"/>
+        <a:font script="Khmr" typeface="MoolBoran"/>
+        <a:font script="Knda" typeface="Tunga"/>
+        <a:font script="Guru" typeface="Raavi"/>
+        <a:font script="Cans" typeface="Euphemia"/>
+        <a:font script="Cher" typeface="Plantagenet Cherokee"/>
+        <a:font script="Yiii" typeface="Microsoft Yi Baiti"/>
+        <a:font script="Tibt" typeface="Microsoft Himalaya"/>
+        <a:font script="Thaa" typeface="MV Boli"/>
+        <a:font script="Deva" typeface="Mangal"/>
+        <a:font script="Telu" typeface="Gautami"/>
+        <a:font script="Taml" typeface="Latha"/>
+        <a:font script="Syrc" typeface="Estrangelo Edessa"/>
+        <a:font script="Orya" typeface="Kalinga"/>
+        <a:font script="Mlym" typeface="Kartika"/>
+        <a:font script="Laoo" typeface="DokChampa"/>
+        <a:font script="Sinh" typeface="Iskoola Pota"/>
+        <a:font script="Mong" typeface="Mongolian Baiti"/>
+        <a:font script="Viet" typeface="Times New Roman"/>
+        <a:font script="Uigh" typeface="Microsoft Uighur"/>
+        <a:font script="Geor" typeface="Sylfaen"/>
+      </a:majorFont>
+      <a:minorFont>
+        <a:latin typeface="Calibri" panose="020F0502020204030204"/>
+        <a:ea typeface=""/>
+        <a:cs typeface=""/>
+        <a:font script="Jpan" typeface="ＭＳ Ｐゴシック"/>
+        <a:font script="Hang" typeface="맑은 고딕"/>
+        <a:font script="Hans" typeface="宋体"/>
+        <a:font script="Hant" typeface="新細明體"/>
+        <a:font script="Arab" typeface="Arial"/>
+        <a:font script="Hebr" typeface="Arial"/>
+        <a:font script="Thai" typeface="Cordia New"/>
+        <a:font script="Ethi" typeface="Nyala"/>
+        <a:font script="Beng" typeface="Vrinda"/>
+        <a:font script="Gujr" typeface="Shruti"/>
+        <a:font script="Khmr" typeface="DaunPenh"/>
+        <a:font script="Knda" typeface="Tunga"/>
+        <a:font script="Guru" typeface="Raavi"/>
+        <a:font script="Cans" typeface="Euphemia"/>
+        <a:font script="Cher" typeface="Plantagenet Cherokee"/>
+        <a:font script="Yiii" typeface="Microsoft Yi Baiti"/>
+        <a:font script="Tibt" typeface="Microsoft Himalaya"/>
+        <a:font script="Thaa" typeface="MV Boli"/>
+        <a:font script="Deva" typeface="Mangal"/>
+        <a:font script="Telu" typeface="Gautami"/>
+        <a:font script="Taml" typeface="Latha"/>
+        <a:font script="Syrc" typeface="Estrangelo Edessa"/>
+        <a:font script="Orya" typeface="Kalinga"/>
+        <a:font script="Mlym" typeface="Kartika"/>
+        <a:font script="Laoo" typeface="DokChampa"/>
+        <a:font script="Sinh" typeface="Iskoola Pota"/>
+        <a:font script="Mong" typeface="Mongolian Baiti"/>
+        <a:font script="Viet" typeface="Arial"/>
+        <a:font script="Uigh" typeface="Microsoft Uighur"/>
+        <a:font script="Geor" typeface="Sylfaen"/>
+      </a:minorFont>
+    </a:fontScheme>
+    <a:fmtScheme name="Office">
+      <a:fillStyleLst>
+        <a:solidFill>
+          <a:schemeClr val="phClr"/>
+        </a:solidFill>
+        <a:gradFill rotWithShape="1">
+          <a:gsLst>
+            <a:gs pos="0">
+              <a:schemeClr val="phClr">
+                <a:lumMod val="110000"/>
+                <a:satMod val="105000"/>
+                <a:tint val="67000"/>
+              </a:schemeClr>
+            </a:gs>
+            <a:gs pos="50000">
+              <a:schemeClr val="phClr">
+                <a:lumMod val="105000"/>
+                <a:satMod val="103000"/>
+                <a:tint val="73000"/>
+              </a:schemeClr>
+            </a:gs>
+            <a:gs pos="100000">
+              <a:schemeClr val="phClr">
+                <a:lumMod val="105000"/>
+                <a:satMod val="109000"/>
+                <a:tint val="81000"/>
+              </a:schemeClr>
+            </a:gs>
+          </a:gsLst>
+          <a:lin ang="5400000" scaled="0"/>
+        </a:gradFill>
+        <a:gradFill rotWithShape="1">
+          <a:gsLst>
+            <a:gs pos="0">
+              <a:schemeClr val="phClr">
+                <a:satMod val="103000"/>
+                <a:lumMod val="102000"/>
+                <a:tint val="94000"/>
+              </a:schemeClr>
+            </a:gs>
+            <a:gs pos="50000">
+              <a:schemeClr val="phClr">
+                <a:satMod val="110000"/>
+                <a:lumMod val="100000"/>
+                <a:shade val="100000"/>
+              </a:schemeClr>
+            </a:gs>
+            <a:gs pos="100000">
+              <a:schemeClr val="phClr">
+                <a:lumMod val="99000"/>
+                <a:satMod val="120000"/>
+                <a:shade val="78000"/>
+              </a:schemeClr>
+            </a:gs>
+          </a:gsLst>
+          <a:lin ang="5400000" scaled="0"/>
+        </a:gradFill>
+      </a:fillStyleLst>
+      <a:lnStyleLst>
+        <a:ln w="6350" cap="flat" cmpd="sng" algn="ctr">
+          <a:solidFill>
+            <a:schemeClr val="phClr"/>
+          </a:solidFill>
+          <a:prstDash val="solid"/>
+          <a:miter lim="800000"/>
+        </a:ln>
+        <a:ln w="12700" cap="flat" cmpd="sng" algn="ctr">
+          <a:solidFill>
+            <a:schemeClr val="phClr"/>
+          </a:solidFill>
+          <a:prstDash val="solid"/>
+          <a:miter lim="800000"/>
+        </a:ln>
+        <a:ln w="19050" cap="flat" cmpd="sng" algn="ctr">
+          <a:solidFill>
+            <a:schemeClr val="phClr"/>
+          </a:solidFill>
+          <a:prstDash val="solid"/>
+          <a:miter lim="800000"/>
+        </a:ln>
+      </a:lnStyleLst>
+      <a:effectStyleLst>
+        <a:effectStyle>
+          <a:effectLst/>
+        </a:effectStyle>
+        <a:effectStyle>
+          <a:effectLst/>
+        </a:effectStyle>
+        <a:effectStyle>
+          <a:effectLst>
+            <a:outerShdw blurRad="57150" dist="19050" dir="5400000" algn="ctr" rotWithShape="0">
+              <a:srgbClr val="000000">
+                <a:alpha val="63000"/>
+              </a:srgbClr>
+            </a:outerShdw>
+          </a:effectLst>
+        </a:effectStyle>
+      </a:effectStyleLst>
+      <a:bgFillStyleLst>
+        <a:solidFill>
+          <a:schemeClr val="phClr"/>
+        </a:solidFill>
+        <a:solidFill>
+          <a:schemeClr val="phClr">
+            <a:tint val="95000"/>
+            <a:satMod val="170000"/>
+          </a:schemeClr>
+        </a:solidFill>
+        <a:gradFill rotWithShape="1">
+          <a:gsLst>
+            <a:gs pos="0">
+              <a:schemeClr val="phClr">
+                <a:tint val="93000"/>
+                <a:satMod val="150000"/>
+                <a:shade val="98000"/>
+                <a:lumMod val="102000"/>
+              </a:schemeClr>
+            </a:gs>
+            <a:gs pos="50000">
+              <a:schemeClr val="phClr">
+                <a:tint val="98000"/>
+                <a:satMod val="130000"/>
+                <a:shade val="90000"/>
+                <a:lumMod val="103000"/>
+              </a:schemeClr>
+            </a:gs>
+            <a:gs pos="100000">
+              <a:schemeClr val="phClr">
+                <a:shade val="63000"/>
+                <a:satMod val="120000"/>
+              </a:schemeClr>
+            </a:gs>
+          </a:gsLst>
+          <a:lin ang="5400000" scaled="0"/>
+        </a:gradFill>
+      </a:bgFillStyleLst>
+    </a:fmtScheme>
+  </a:themeElements>
+  <a:objectDefaults/>
+  <a:extraClrSchemeLst/>
+  <a:extLst>
+    <a:ext uri="{05A4C25C-085E-4340-85A3-A5531E510DB2}">
+      <thm15:themeFamily xmlns:thm15="http://schemas.microsoft.com/office/thememl/2012/main" name="Office Theme" id="{62F939B6-93AF-4DB8-9C6B-D6C7DFDC589F}" vid="{4A3C46E8-61CC-4603-A589-7422A47A8E4A}"/>
+    </a:ext>
+  </a:extLst>
+</a:theme>
 </file>
</xml_diff>

<commit_message>
added rest of dyna sws estimate slides
</commit_message>
<xml_diff>
--- a/presentations/lab_meeting/lab_meeting_2015.04.24_kzk_sws.pptx
+++ b/presentations/lab_meeting/lab_meeting_2015.04.24_kzk_sws.pptx
@@ -5,7 +5,7 @@
     <p:sldMasterId id="2147483648" r:id="rId1"/>
   </p:sldMasterIdLst>
   <p:notesMasterIdLst>
-    <p:notesMasterId r:id="rId13"/>
+    <p:notesMasterId r:id="rId17"/>
   </p:notesMasterIdLst>
   <p:sldIdLst>
     <p:sldId id="256" r:id="rId2"/>
@@ -19,6 +19,10 @@
     <p:sldId id="266" r:id="rId10"/>
     <p:sldId id="265" r:id="rId11"/>
     <p:sldId id="267" r:id="rId12"/>
+    <p:sldId id="268" r:id="rId13"/>
+    <p:sldId id="269" r:id="rId14"/>
+    <p:sldId id="271" r:id="rId15"/>
+    <p:sldId id="270" r:id="rId16"/>
   </p:sldIdLst>
   <p:sldSz cx="12192000" cy="6858000"/>
   <p:notesSz cx="6858000" cy="9144000"/>
@@ -918,6 +922,174 @@
     <p:extLst>
       <p:ext uri="{BB962C8B-B14F-4D97-AF65-F5344CB8AC3E}">
         <p14:creationId xmlns:p14="http://schemas.microsoft.com/office/powerpoint/2010/main" val="1741909592"/>
+      </p:ext>
+    </p:extLst>
+  </p:cSld>
+  <p:clrMapOvr>
+    <a:masterClrMapping/>
+  </p:clrMapOvr>
+</p:notes>
+</file>
+
+<file path=ppt/notesSlides/notesSlide6.xml><?xml version="1.0" encoding="utf-8"?>
+<p:notes xmlns:a="http://schemas.openxmlformats.org/drawingml/2006/main" xmlns:r="http://schemas.openxmlformats.org/officeDocument/2006/relationships" xmlns:p="http://schemas.openxmlformats.org/presentationml/2006/main">
+  <p:cSld>
+    <p:spTree>
+      <p:nvGrpSpPr>
+        <p:cNvPr id="1" name=""/>
+        <p:cNvGrpSpPr/>
+        <p:nvPr/>
+      </p:nvGrpSpPr>
+      <p:grpSpPr>
+        <a:xfrm>
+          <a:off x="0" y="0"/>
+          <a:ext cx="0" cy="0"/>
+          <a:chOff x="0" y="0"/>
+          <a:chExt cx="0" cy="0"/>
+        </a:xfrm>
+      </p:grpSpPr>
+      <p:sp>
+        <p:nvSpPr>
+          <p:cNvPr id="2" name="Slide Image Placeholder 1"/>
+          <p:cNvSpPr>
+            <a:spLocks noGrp="1" noRot="1" noChangeAspect="1"/>
+          </p:cNvSpPr>
+          <p:nvPr>
+            <p:ph type="sldImg"/>
+          </p:nvPr>
+        </p:nvSpPr>
+        <p:spPr/>
+      </p:sp>
+      <p:sp>
+        <p:nvSpPr>
+          <p:cNvPr id="3" name="Notes Placeholder 2"/>
+          <p:cNvSpPr>
+            <a:spLocks noGrp="1"/>
+          </p:cNvSpPr>
+          <p:nvPr>
+            <p:ph type="body" idx="1"/>
+          </p:nvPr>
+        </p:nvSpPr>
+        <p:spPr/>
+        <p:txBody>
+          <a:bodyPr/>
+          <a:lstStyle/>
+          <a:p>
+            <a:endParaRPr lang="en-US" dirty="0"/>
+          </a:p>
+        </p:txBody>
+      </p:sp>
+      <p:sp>
+        <p:nvSpPr>
+          <p:cNvPr id="4" name="Slide Number Placeholder 3"/>
+          <p:cNvSpPr>
+            <a:spLocks noGrp="1"/>
+          </p:cNvSpPr>
+          <p:nvPr>
+            <p:ph type="sldNum" sz="quarter" idx="10"/>
+          </p:nvPr>
+        </p:nvSpPr>
+        <p:spPr/>
+        <p:txBody>
+          <a:bodyPr/>
+          <a:lstStyle/>
+          <a:p>
+            <a:fld id="{68208AFF-1C65-4E6A-ACD9-43CDFFA0A9E4}" type="slidenum">
+              <a:rPr lang="en-US" smtClean="0"/>
+              <a:t>13</a:t>
+            </a:fld>
+            <a:endParaRPr lang="en-US"/>
+          </a:p>
+        </p:txBody>
+      </p:sp>
+    </p:spTree>
+    <p:extLst>
+      <p:ext uri="{BB962C8B-B14F-4D97-AF65-F5344CB8AC3E}">
+        <p14:creationId xmlns:p14="http://schemas.microsoft.com/office/powerpoint/2010/main" val="3385590677"/>
+      </p:ext>
+    </p:extLst>
+  </p:cSld>
+  <p:clrMapOvr>
+    <a:masterClrMapping/>
+  </p:clrMapOvr>
+</p:notes>
+</file>
+
+<file path=ppt/notesSlides/notesSlide7.xml><?xml version="1.0" encoding="utf-8"?>
+<p:notes xmlns:a="http://schemas.openxmlformats.org/drawingml/2006/main" xmlns:r="http://schemas.openxmlformats.org/officeDocument/2006/relationships" xmlns:p="http://schemas.openxmlformats.org/presentationml/2006/main">
+  <p:cSld>
+    <p:spTree>
+      <p:nvGrpSpPr>
+        <p:cNvPr id="1" name=""/>
+        <p:cNvGrpSpPr/>
+        <p:nvPr/>
+      </p:nvGrpSpPr>
+      <p:grpSpPr>
+        <a:xfrm>
+          <a:off x="0" y="0"/>
+          <a:ext cx="0" cy="0"/>
+          <a:chOff x="0" y="0"/>
+          <a:chExt cx="0" cy="0"/>
+        </a:xfrm>
+      </p:grpSpPr>
+      <p:sp>
+        <p:nvSpPr>
+          <p:cNvPr id="2" name="Slide Image Placeholder 1"/>
+          <p:cNvSpPr>
+            <a:spLocks noGrp="1" noRot="1" noChangeAspect="1"/>
+          </p:cNvSpPr>
+          <p:nvPr>
+            <p:ph type="sldImg"/>
+          </p:nvPr>
+        </p:nvSpPr>
+        <p:spPr/>
+      </p:sp>
+      <p:sp>
+        <p:nvSpPr>
+          <p:cNvPr id="3" name="Notes Placeholder 2"/>
+          <p:cNvSpPr>
+            <a:spLocks noGrp="1"/>
+          </p:cNvSpPr>
+          <p:nvPr>
+            <p:ph type="body" idx="1"/>
+          </p:nvPr>
+        </p:nvSpPr>
+        <p:spPr/>
+        <p:txBody>
+          <a:bodyPr/>
+          <a:lstStyle/>
+          <a:p>
+            <a:endParaRPr lang="en-US" dirty="0"/>
+          </a:p>
+        </p:txBody>
+      </p:sp>
+      <p:sp>
+        <p:nvSpPr>
+          <p:cNvPr id="4" name="Slide Number Placeholder 3"/>
+          <p:cNvSpPr>
+            <a:spLocks noGrp="1"/>
+          </p:cNvSpPr>
+          <p:nvPr>
+            <p:ph type="sldNum" sz="quarter" idx="10"/>
+          </p:nvPr>
+        </p:nvSpPr>
+        <p:spPr/>
+        <p:txBody>
+          <a:bodyPr/>
+          <a:lstStyle/>
+          <a:p>
+            <a:fld id="{68208AFF-1C65-4E6A-ACD9-43CDFFA0A9E4}" type="slidenum">
+              <a:rPr lang="en-US" smtClean="0"/>
+              <a:t>15</a:t>
+            </a:fld>
+            <a:endParaRPr lang="en-US"/>
+          </a:p>
+        </p:txBody>
+      </p:sp>
+    </p:spTree>
+    <p:extLst>
+      <p:ext uri="{BB962C8B-B14F-4D97-AF65-F5344CB8AC3E}">
+        <p14:creationId xmlns:p14="http://schemas.microsoft.com/office/powerpoint/2010/main" val="1769560903"/>
       </p:ext>
     </p:extLst>
   </p:cSld>
@@ -3803,7 +3975,7 @@
           <a:p>
             <a:r>
               <a:rPr lang="en-US" dirty="0" smtClean="0"/>
-              <a:t>Simulating Shear Wave Speeds from 3D KZK Simulation</a:t>
+              <a:t>Investigating Effects of Nonlinear Acoustic Propagation on Shear Wave Speed Estimates</a:t>
             </a:r>
             <a:endParaRPr lang="en-US" dirty="0"/>
           </a:p>
@@ -4595,13 +4767,8 @@
             </a:r>
             <a:r>
               <a:rPr lang="en-US" sz="3200" dirty="0" smtClean="0"/>
-              <a:t> = 0.45 </a:t>
-            </a:r>
-            <a:r>
-              <a:rPr lang="en-US" sz="3200" smtClean="0"/>
-              <a:t>(quick runtimes)</a:t>
-            </a:r>
-            <a:endParaRPr lang="en-US" sz="3200" dirty="0" smtClean="0"/>
+              <a:t> = 0.45 (quick runtimes)</a:t>
+            </a:r>
           </a:p>
           <a:p>
             <a:pPr lvl="1"/>
@@ -4615,7 +4782,7 @@
             </a:r>
             <a:r>
               <a:rPr lang="en-US" sz="3200" dirty="0" smtClean="0"/>
-              <a:t>s excitation duration, 250 </a:t>
+              <a:t>s excitation duration, 25 </a:t>
             </a:r>
             <a:r>
               <a:rPr lang="en-US" sz="3200" dirty="0" err="1" smtClean="0"/>
@@ -4636,6 +4803,873 @@
     <p:extLst>
       <p:ext uri="{BB962C8B-B14F-4D97-AF65-F5344CB8AC3E}">
         <p14:creationId xmlns:p14="http://schemas.microsoft.com/office/powerpoint/2010/main" val="1207636987"/>
+      </p:ext>
+    </p:extLst>
+  </p:cSld>
+  <p:clrMapOvr>
+    <a:masterClrMapping/>
+  </p:clrMapOvr>
+  <p:timing>
+    <p:tnLst>
+      <p:par>
+        <p:cTn id="1" dur="indefinite" restart="never" nodeType="tmRoot"/>
+      </p:par>
+    </p:tnLst>
+  </p:timing>
+</p:sld>
+</file>
+
+<file path=ppt/slides/slide12.xml><?xml version="1.0" encoding="utf-8"?>
+<p:sld xmlns:a="http://schemas.openxmlformats.org/drawingml/2006/main" xmlns:r="http://schemas.openxmlformats.org/officeDocument/2006/relationships" xmlns:p="http://schemas.openxmlformats.org/presentationml/2006/main">
+  <p:cSld>
+    <p:spTree>
+      <p:nvGrpSpPr>
+        <p:cNvPr id="1" name=""/>
+        <p:cNvGrpSpPr/>
+        <p:nvPr/>
+      </p:nvGrpSpPr>
+      <p:grpSpPr>
+        <a:xfrm>
+          <a:off x="0" y="0"/>
+          <a:ext cx="0" cy="0"/>
+          <a:chOff x="0" y="0"/>
+          <a:chExt cx="0" cy="0"/>
+        </a:xfrm>
+      </p:grpSpPr>
+      <p:sp>
+        <p:nvSpPr>
+          <p:cNvPr id="2" name="Title 1"/>
+          <p:cNvSpPr>
+            <a:spLocks noGrp="1"/>
+          </p:cNvSpPr>
+          <p:nvPr>
+            <p:ph type="title"/>
+          </p:nvPr>
+        </p:nvSpPr>
+        <p:spPr/>
+        <p:txBody>
+          <a:bodyPr/>
+          <a:lstStyle/>
+          <a:p>
+            <a:r>
+              <a:rPr lang="en-US" dirty="0" smtClean="0"/>
+              <a:t>Axial Displacements Plot</a:t>
+            </a:r>
+            <a:endParaRPr lang="en-US" dirty="0"/>
+          </a:p>
+        </p:txBody>
+      </p:sp>
+      <p:pic>
+        <p:nvPicPr>
+          <p:cNvPr id="6146" name="Picture 2" descr="https://github.com/Ningrui-Li/nonlinear_acoustic/blob/master/sws/axial_displacements_v_tracking_pos.png?raw=true"/>
+          <p:cNvPicPr>
+            <a:picLocks noChangeAspect="1" noChangeArrowheads="1"/>
+          </p:cNvPicPr>
+          <p:nvPr/>
+        </p:nvPicPr>
+        <p:blipFill>
+          <a:blip r:embed="rId2">
+            <a:extLst>
+              <a:ext uri="{28A0092B-C50C-407E-A947-70E740481C1C}">
+                <a14:useLocalDpi xmlns:a14="http://schemas.microsoft.com/office/drawing/2010/main" val="0"/>
+              </a:ext>
+            </a:extLst>
+          </a:blip>
+          <a:srcRect/>
+          <a:stretch>
+            <a:fillRect/>
+          </a:stretch>
+        </p:blipFill>
+        <p:spPr bwMode="auto">
+          <a:xfrm>
+            <a:off x="2687977" y="1373981"/>
+            <a:ext cx="6816045" cy="5112034"/>
+          </a:xfrm>
+          <a:prstGeom prst="rect">
+            <a:avLst/>
+          </a:prstGeom>
+          <a:noFill/>
+          <a:extLst>
+            <a:ext uri="{909E8E84-426E-40DD-AFC4-6F175D3DCCD1}">
+              <a14:hiddenFill xmlns:a14="http://schemas.microsoft.com/office/drawing/2010/main">
+                <a:solidFill>
+                  <a:srgbClr val="FFFFFF"/>
+                </a:solidFill>
+              </a14:hiddenFill>
+            </a:ext>
+          </a:extLst>
+        </p:spPr>
+      </p:pic>
+    </p:spTree>
+    <p:extLst>
+      <p:ext uri="{BB962C8B-B14F-4D97-AF65-F5344CB8AC3E}">
+        <p14:creationId xmlns:p14="http://schemas.microsoft.com/office/powerpoint/2010/main" val="445619102"/>
+      </p:ext>
+    </p:extLst>
+  </p:cSld>
+  <p:clrMapOvr>
+    <a:masterClrMapping/>
+  </p:clrMapOvr>
+  <p:timing>
+    <p:tnLst>
+      <p:par>
+        <p:cTn id="1" dur="indefinite" restart="never" nodeType="tmRoot"/>
+      </p:par>
+    </p:tnLst>
+  </p:timing>
+</p:sld>
+</file>
+
+<file path=ppt/slides/slide13.xml><?xml version="1.0" encoding="utf-8"?>
+<p:sld xmlns:a="http://schemas.openxmlformats.org/drawingml/2006/main" xmlns:r="http://schemas.openxmlformats.org/officeDocument/2006/relationships" xmlns:p="http://schemas.openxmlformats.org/presentationml/2006/main">
+  <p:cSld>
+    <p:spTree>
+      <p:nvGrpSpPr>
+        <p:cNvPr id="1" name=""/>
+        <p:cNvGrpSpPr/>
+        <p:nvPr/>
+      </p:nvGrpSpPr>
+      <p:grpSpPr>
+        <a:xfrm>
+          <a:off x="0" y="0"/>
+          <a:ext cx="0" cy="0"/>
+          <a:chOff x="0" y="0"/>
+          <a:chExt cx="0" cy="0"/>
+        </a:xfrm>
+      </p:grpSpPr>
+      <p:sp>
+        <p:nvSpPr>
+          <p:cNvPr id="2" name="Title 1"/>
+          <p:cNvSpPr>
+            <a:spLocks noGrp="1"/>
+          </p:cNvSpPr>
+          <p:nvPr>
+            <p:ph type="title"/>
+          </p:nvPr>
+        </p:nvSpPr>
+        <p:spPr/>
+        <p:txBody>
+          <a:bodyPr/>
+          <a:lstStyle/>
+          <a:p>
+            <a:r>
+              <a:rPr lang="en-US" dirty="0" smtClean="0"/>
+              <a:t>Time-to-Peak Shear Wave Speed Estimation</a:t>
+            </a:r>
+            <a:endParaRPr lang="en-US" dirty="0"/>
+          </a:p>
+        </p:txBody>
+      </p:sp>
+      <p:pic>
+        <p:nvPicPr>
+          <p:cNvPr id="7170" name="Picture 2" descr="sws_ttp_foc70_a0.300_B3.5_depth70.0.png"/>
+          <p:cNvPicPr>
+            <a:picLocks noChangeAspect="1" noChangeArrowheads="1"/>
+          </p:cNvPicPr>
+          <p:nvPr/>
+        </p:nvPicPr>
+        <p:blipFill>
+          <a:blip r:embed="rId3">
+            <a:extLst>
+              <a:ext uri="{28A0092B-C50C-407E-A947-70E740481C1C}">
+                <a14:useLocalDpi xmlns:a14="http://schemas.microsoft.com/office/drawing/2010/main" val="0"/>
+              </a:ext>
+            </a:extLst>
+          </a:blip>
+          <a:srcRect/>
+          <a:stretch>
+            <a:fillRect/>
+          </a:stretch>
+        </p:blipFill>
+        <p:spPr bwMode="auto">
+          <a:xfrm>
+            <a:off x="2603383" y="1328130"/>
+            <a:ext cx="6985233" cy="5238925"/>
+          </a:xfrm>
+          <a:prstGeom prst="rect">
+            <a:avLst/>
+          </a:prstGeom>
+          <a:noFill/>
+          <a:extLst>
+            <a:ext uri="{909E8E84-426E-40DD-AFC4-6F175D3DCCD1}">
+              <a14:hiddenFill xmlns:a14="http://schemas.microsoft.com/office/drawing/2010/main">
+                <a:solidFill>
+                  <a:srgbClr val="FFFFFF"/>
+                </a:solidFill>
+              </a14:hiddenFill>
+            </a:ext>
+          </a:extLst>
+        </p:spPr>
+      </p:pic>
+    </p:spTree>
+    <p:extLst>
+      <p:ext uri="{BB962C8B-B14F-4D97-AF65-F5344CB8AC3E}">
+        <p14:creationId xmlns:p14="http://schemas.microsoft.com/office/powerpoint/2010/main" val="1571934866"/>
+      </p:ext>
+    </p:extLst>
+  </p:cSld>
+  <p:clrMapOvr>
+    <a:masterClrMapping/>
+  </p:clrMapOvr>
+  <p:timing>
+    <p:tnLst>
+      <p:par>
+        <p:cTn id="1" dur="indefinite" restart="never" nodeType="tmRoot"/>
+      </p:par>
+    </p:tnLst>
+  </p:timing>
+</p:sld>
+</file>
+
+<file path=ppt/slides/slide14.xml><?xml version="1.0" encoding="utf-8"?>
+<p:sld xmlns:a="http://schemas.openxmlformats.org/drawingml/2006/main" xmlns:r="http://schemas.openxmlformats.org/officeDocument/2006/relationships" xmlns:p="http://schemas.openxmlformats.org/presentationml/2006/main">
+  <p:cSld>
+    <p:spTree>
+      <p:nvGrpSpPr>
+        <p:cNvPr id="1" name=""/>
+        <p:cNvGrpSpPr/>
+        <p:nvPr/>
+      </p:nvGrpSpPr>
+      <p:grpSpPr>
+        <a:xfrm>
+          <a:off x="0" y="0"/>
+          <a:ext cx="0" cy="0"/>
+          <a:chOff x="0" y="0"/>
+          <a:chExt cx="0" cy="0"/>
+        </a:xfrm>
+      </p:grpSpPr>
+      <p:sp>
+        <p:nvSpPr>
+          <p:cNvPr id="2" name="Title 1"/>
+          <p:cNvSpPr>
+            <a:spLocks noGrp="1"/>
+          </p:cNvSpPr>
+          <p:nvPr>
+            <p:ph type="title"/>
+          </p:nvPr>
+        </p:nvSpPr>
+        <p:spPr/>
+        <p:txBody>
+          <a:bodyPr/>
+          <a:lstStyle/>
+          <a:p>
+            <a:r>
+              <a:rPr lang="en-US" dirty="0" smtClean="0"/>
+              <a:t>Expected SWS Calculation</a:t>
+            </a:r>
+            <a:endParaRPr lang="en-US" dirty="0"/>
+          </a:p>
+        </p:txBody>
+      </p:sp>
+      <mc:AlternateContent xmlns:mc="http://schemas.openxmlformats.org/markup-compatibility/2006">
+        <mc:Choice xmlns:a14="http://schemas.microsoft.com/office/drawing/2010/main" Requires="a14">
+          <p:sp>
+            <p:nvSpPr>
+              <p:cNvPr id="3" name="Content Placeholder 2"/>
+              <p:cNvSpPr>
+                <a:spLocks noGrp="1"/>
+              </p:cNvSpPr>
+              <p:nvPr>
+                <p:ph idx="1"/>
+              </p:nvPr>
+            </p:nvSpPr>
+            <p:spPr/>
+            <p:txBody>
+              <a:bodyPr/>
+              <a:lstStyle/>
+              <a:p>
+                <a:pPr marL="0" indent="0">
+                  <a:lnSpc>
+                    <a:spcPct val="100000"/>
+                  </a:lnSpc>
+                  <a:buNone/>
+                </a:pPr>
+                <a14:m>
+                  <m:oMathPara xmlns:m="http://schemas.openxmlformats.org/officeDocument/2006/math">
+                    <m:oMathParaPr>
+                      <m:jc m:val="centerGroup"/>
+                    </m:oMathParaPr>
+                    <m:oMath xmlns:m="http://schemas.openxmlformats.org/officeDocument/2006/math">
+                      <m:r>
+                        <m:rPr>
+                          <m:nor/>
+                        </m:rPr>
+                        <a:rPr lang="en-US" b="0" i="0" smtClean="0">
+                          <a:latin typeface="Cambria Math" panose="02040503050406030204" pitchFamily="18" charset="0"/>
+                        </a:rPr>
+                        <m:t>shear</m:t>
+                      </m:r>
+                      <m:r>
+                        <m:rPr>
+                          <m:nor/>
+                        </m:rPr>
+                        <a:rPr lang="en-US" b="0" i="0" smtClean="0">
+                          <a:latin typeface="Cambria Math" panose="02040503050406030204" pitchFamily="18" charset="0"/>
+                        </a:rPr>
+                        <m:t> </m:t>
+                      </m:r>
+                      <m:r>
+                        <m:rPr>
+                          <m:nor/>
+                        </m:rPr>
+                        <a:rPr lang="en-US" b="0" i="0" smtClean="0">
+                          <a:latin typeface="Cambria Math" panose="02040503050406030204" pitchFamily="18" charset="0"/>
+                        </a:rPr>
+                        <m:t>modulus</m:t>
+                      </m:r>
+                      <m:r>
+                        <a:rPr lang="en-US" b="0" i="1" smtClean="0">
+                          <a:latin typeface="Cambria Math" panose="02040503050406030204" pitchFamily="18" charset="0"/>
+                        </a:rPr>
+                        <m:t>=</m:t>
+                      </m:r>
+                      <m:r>
+                        <a:rPr lang="en-US" b="0" i="1" smtClean="0">
+                          <a:latin typeface="Cambria Math" panose="02040503050406030204" pitchFamily="18" charset="0"/>
+                        </a:rPr>
+                        <m:t>𝜇</m:t>
+                      </m:r>
+                      <m:r>
+                        <a:rPr lang="en-US" b="0" i="1" smtClean="0">
+                          <a:latin typeface="Cambria Math" panose="02040503050406030204" pitchFamily="18" charset="0"/>
+                        </a:rPr>
+                        <m:t>=</m:t>
+                      </m:r>
+                      <m:f>
+                        <m:fPr>
+                          <m:ctrlPr>
+                            <a:rPr lang="en-US" b="0" i="1" smtClean="0">
+                              <a:latin typeface="Cambria Math" panose="02040503050406030204" pitchFamily="18" charset="0"/>
+                            </a:rPr>
+                          </m:ctrlPr>
+                        </m:fPr>
+                        <m:num>
+                          <m:r>
+                            <a:rPr lang="en-US" b="0" i="1" smtClean="0">
+                              <a:latin typeface="Cambria Math" panose="02040503050406030204" pitchFamily="18" charset="0"/>
+                            </a:rPr>
+                            <m:t>𝐸</m:t>
+                          </m:r>
+                        </m:num>
+                        <m:den>
+                          <m:r>
+                            <a:rPr lang="en-US" b="0" i="1" smtClean="0">
+                              <a:latin typeface="Cambria Math" panose="02040503050406030204" pitchFamily="18" charset="0"/>
+                            </a:rPr>
+                            <m:t>2(1+</m:t>
+                          </m:r>
+                          <m:r>
+                            <a:rPr lang="en-US" b="0" i="1" smtClean="0">
+                              <a:latin typeface="Cambria Math" panose="02040503050406030204" pitchFamily="18" charset="0"/>
+                            </a:rPr>
+                            <m:t>𝜈</m:t>
+                          </m:r>
+                          <m:r>
+                            <a:rPr lang="en-US" b="0" i="1" smtClean="0">
+                              <a:latin typeface="Cambria Math" panose="02040503050406030204" pitchFamily="18" charset="0"/>
+                            </a:rPr>
+                            <m:t>)</m:t>
+                          </m:r>
+                        </m:den>
+                      </m:f>
+                    </m:oMath>
+                  </m:oMathPara>
+                </a14:m>
+                <a:endParaRPr lang="en-US" b="0" dirty="0" smtClean="0"/>
+              </a:p>
+              <a:p>
+                <a:pPr marL="0" indent="0">
+                  <a:lnSpc>
+                    <a:spcPct val="100000"/>
+                  </a:lnSpc>
+                  <a:buNone/>
+                </a:pPr>
+                <a14:m>
+                  <m:oMathPara xmlns:m="http://schemas.openxmlformats.org/officeDocument/2006/math">
+                    <m:oMathParaPr>
+                      <m:jc m:val="centerGroup"/>
+                    </m:oMathParaPr>
+                    <m:oMath xmlns:m="http://schemas.openxmlformats.org/officeDocument/2006/math">
+                      <m:r>
+                        <a:rPr lang="en-US" b="0" i="1" smtClean="0">
+                          <a:latin typeface="Cambria Math" panose="02040503050406030204" pitchFamily="18" charset="0"/>
+                        </a:rPr>
+                        <m:t>𝑆𝑊𝑆</m:t>
+                      </m:r>
+                      <m:r>
+                        <a:rPr lang="en-US" b="0" i="1" smtClean="0">
+                          <a:latin typeface="Cambria Math" panose="02040503050406030204" pitchFamily="18" charset="0"/>
+                        </a:rPr>
+                        <m:t>=</m:t>
+                      </m:r>
+                      <m:rad>
+                        <m:radPr>
+                          <m:degHide m:val="on"/>
+                          <m:ctrlPr>
+                            <a:rPr lang="en-US" b="0" i="1" smtClean="0">
+                              <a:latin typeface="Cambria Math" panose="02040503050406030204" pitchFamily="18" charset="0"/>
+                            </a:rPr>
+                          </m:ctrlPr>
+                        </m:radPr>
+                        <m:deg/>
+                        <m:e>
+                          <m:f>
+                            <m:fPr>
+                              <m:ctrlPr>
+                                <a:rPr lang="en-US" b="0" i="1" smtClean="0">
+                                  <a:latin typeface="Cambria Math" panose="02040503050406030204" pitchFamily="18" charset="0"/>
+                                </a:rPr>
+                              </m:ctrlPr>
+                            </m:fPr>
+                            <m:num>
+                              <m:r>
+                                <a:rPr lang="en-US" b="0" i="1" smtClean="0">
+                                  <a:latin typeface="Cambria Math" panose="02040503050406030204" pitchFamily="18" charset="0"/>
+                                </a:rPr>
+                                <m:t>𝜇</m:t>
+                              </m:r>
+                            </m:num>
+                            <m:den>
+                              <m:r>
+                                <a:rPr lang="en-US" b="0" i="1" smtClean="0">
+                                  <a:latin typeface="Cambria Math" panose="02040503050406030204" pitchFamily="18" charset="0"/>
+                                </a:rPr>
+                                <m:t>𝜌</m:t>
+                              </m:r>
+                            </m:den>
+                          </m:f>
+                        </m:e>
+                      </m:rad>
+                    </m:oMath>
+                  </m:oMathPara>
+                </a14:m>
+                <a:endParaRPr lang="en-US" dirty="0" smtClean="0"/>
+              </a:p>
+              <a:p>
+                <a:pPr marL="0" indent="0">
+                  <a:lnSpc>
+                    <a:spcPct val="100000"/>
+                  </a:lnSpc>
+                  <a:buNone/>
+                </a:pPr>
+                <a14:m>
+                  <m:oMathPara xmlns:m="http://schemas.openxmlformats.org/officeDocument/2006/math">
+                    <m:oMathParaPr>
+                      <m:jc m:val="centerGroup"/>
+                    </m:oMathParaPr>
+                    <m:oMath xmlns:m="http://schemas.openxmlformats.org/officeDocument/2006/math">
+                      <m:r>
+                        <a:rPr lang="en-US" sz="2400" b="0" i="1" smtClean="0">
+                          <a:latin typeface="Cambria Math" panose="02040503050406030204" pitchFamily="18" charset="0"/>
+                        </a:rPr>
+                        <m:t>𝑆𝑊𝑆</m:t>
+                      </m:r>
+                      <m:r>
+                        <a:rPr lang="en-US" sz="2400" b="0" i="1" smtClean="0">
+                          <a:latin typeface="Cambria Math" panose="02040503050406030204" pitchFamily="18" charset="0"/>
+                        </a:rPr>
+                        <m:t>=</m:t>
+                      </m:r>
+                      <m:rad>
+                        <m:radPr>
+                          <m:degHide m:val="on"/>
+                          <m:ctrlPr>
+                            <a:rPr lang="en-US" sz="2400" b="0" i="1" smtClean="0">
+                              <a:latin typeface="Cambria Math" panose="02040503050406030204" pitchFamily="18" charset="0"/>
+                            </a:rPr>
+                          </m:ctrlPr>
+                        </m:radPr>
+                        <m:deg/>
+                        <m:e>
+                          <m:f>
+                            <m:fPr>
+                              <m:ctrlPr>
+                                <a:rPr lang="en-US" sz="2400" b="0" i="1" smtClean="0">
+                                  <a:latin typeface="Cambria Math" panose="02040503050406030204" pitchFamily="18" charset="0"/>
+                                </a:rPr>
+                              </m:ctrlPr>
+                            </m:fPr>
+                            <m:num>
+                              <m:r>
+                                <a:rPr lang="en-US" sz="2400" b="0" i="1" smtClean="0">
+                                  <a:latin typeface="Cambria Math" panose="02040503050406030204" pitchFamily="18" charset="0"/>
+                                </a:rPr>
+                                <m:t>𝐸</m:t>
+                              </m:r>
+                            </m:num>
+                            <m:den>
+                              <m:r>
+                                <a:rPr lang="en-US" sz="2400" b="0" i="1" smtClean="0">
+                                  <a:latin typeface="Cambria Math" panose="02040503050406030204" pitchFamily="18" charset="0"/>
+                                </a:rPr>
+                                <m:t>2</m:t>
+                              </m:r>
+                              <m:d>
+                                <m:dPr>
+                                  <m:ctrlPr>
+                                    <a:rPr lang="en-US" sz="2400" b="0" i="1" smtClean="0">
+                                      <a:latin typeface="Cambria Math" panose="02040503050406030204" pitchFamily="18" charset="0"/>
+                                    </a:rPr>
+                                  </m:ctrlPr>
+                                </m:dPr>
+                                <m:e>
+                                  <m:r>
+                                    <a:rPr lang="en-US" sz="2400" b="0" i="1" smtClean="0">
+                                      <a:latin typeface="Cambria Math" panose="02040503050406030204" pitchFamily="18" charset="0"/>
+                                    </a:rPr>
+                                    <m:t>1+</m:t>
+                                  </m:r>
+                                  <m:r>
+                                    <a:rPr lang="en-US" sz="2400" b="0" i="1" smtClean="0">
+                                      <a:latin typeface="Cambria Math" panose="02040503050406030204" pitchFamily="18" charset="0"/>
+                                    </a:rPr>
+                                    <m:t>𝜈</m:t>
+                                  </m:r>
+                                </m:e>
+                              </m:d>
+                              <m:r>
+                                <a:rPr lang="en-US" sz="2400" b="0" i="1" smtClean="0">
+                                  <a:latin typeface="Cambria Math" panose="02040503050406030204" pitchFamily="18" charset="0"/>
+                                </a:rPr>
+                                <m:t>𝜌</m:t>
+                              </m:r>
+                            </m:den>
+                          </m:f>
+                        </m:e>
+                      </m:rad>
+                      <m:r>
+                        <a:rPr lang="en-US" sz="2400" b="0" i="1" smtClean="0">
+                          <a:latin typeface="Cambria Math" panose="02040503050406030204" pitchFamily="18" charset="0"/>
+                        </a:rPr>
+                        <m:t>=</m:t>
+                      </m:r>
+                      <m:rad>
+                        <m:radPr>
+                          <m:degHide m:val="on"/>
+                          <m:ctrlPr>
+                            <a:rPr lang="en-US" sz="2400" b="0" i="1" smtClean="0">
+                              <a:latin typeface="Cambria Math" panose="02040503050406030204" pitchFamily="18" charset="0"/>
+                            </a:rPr>
+                          </m:ctrlPr>
+                        </m:radPr>
+                        <m:deg/>
+                        <m:e>
+                          <m:f>
+                            <m:fPr>
+                              <m:ctrlPr>
+                                <a:rPr lang="en-US" sz="2400" b="0" i="1" smtClean="0">
+                                  <a:latin typeface="Cambria Math" panose="02040503050406030204" pitchFamily="18" charset="0"/>
+                                </a:rPr>
+                              </m:ctrlPr>
+                            </m:fPr>
+                            <m:num>
+                              <m:r>
+                                <a:rPr lang="en-US" sz="2400" b="0" i="1" smtClean="0">
+                                  <a:latin typeface="Cambria Math" panose="02040503050406030204" pitchFamily="18" charset="0"/>
+                                </a:rPr>
+                                <m:t>3000 </m:t>
+                              </m:r>
+                              <m:r>
+                                <m:rPr>
+                                  <m:nor/>
+                                </m:rPr>
+                                <a:rPr lang="en-US" sz="2400" b="0" i="0" smtClean="0">
+                                  <a:latin typeface="Cambria Math" panose="02040503050406030204" pitchFamily="18" charset="0"/>
+                                </a:rPr>
+                                <m:t>Pa</m:t>
+                              </m:r>
+                            </m:num>
+                            <m:den>
+                              <m:r>
+                                <a:rPr lang="en-US" sz="2400" b="0" i="1" smtClean="0">
+                                  <a:latin typeface="Cambria Math" panose="02040503050406030204" pitchFamily="18" charset="0"/>
+                                </a:rPr>
+                                <m:t>2(1+0.45)(1030</m:t>
+                              </m:r>
+                              <m:f>
+                                <m:fPr>
+                                  <m:ctrlPr>
+                                    <a:rPr lang="en-US" sz="2400" b="0" i="0" smtClean="0">
+                                      <a:latin typeface="Cambria Math" panose="02040503050406030204" pitchFamily="18" charset="0"/>
+                                    </a:rPr>
+                                  </m:ctrlPr>
+                                </m:fPr>
+                                <m:num>
+                                  <m:r>
+                                    <m:rPr>
+                                      <m:nor/>
+                                    </m:rPr>
+                                    <a:rPr lang="en-US" sz="2400" b="0" i="0" smtClean="0">
+                                      <a:latin typeface="Cambria Math" panose="02040503050406030204" pitchFamily="18" charset="0"/>
+                                    </a:rPr>
+                                    <m:t>kg</m:t>
+                                  </m:r>
+                                </m:num>
+                                <m:den>
+                                  <m:sSup>
+                                    <m:sSupPr>
+                                      <m:ctrlPr>
+                                        <a:rPr lang="en-US" sz="2400" b="0" i="0" smtClean="0">
+                                          <a:latin typeface="Cambria Math" panose="02040503050406030204" pitchFamily="18" charset="0"/>
+                                        </a:rPr>
+                                      </m:ctrlPr>
+                                    </m:sSupPr>
+                                    <m:e>
+                                      <m:r>
+                                        <m:rPr>
+                                          <m:nor/>
+                                        </m:rPr>
+                                        <a:rPr lang="en-US" sz="2400" b="0" i="0" smtClean="0">
+                                          <a:latin typeface="Cambria Math" panose="02040503050406030204" pitchFamily="18" charset="0"/>
+                                        </a:rPr>
+                                        <m:t>m</m:t>
+                                      </m:r>
+                                    </m:e>
+                                    <m:sup>
+                                      <m:r>
+                                        <m:rPr>
+                                          <m:nor/>
+                                        </m:rPr>
+                                        <a:rPr lang="en-US" sz="2400" b="0" i="0" smtClean="0">
+                                          <a:latin typeface="Cambria Math" panose="02040503050406030204" pitchFamily="18" charset="0"/>
+                                        </a:rPr>
+                                        <m:t>3</m:t>
+                                      </m:r>
+                                    </m:sup>
+                                  </m:sSup>
+                                </m:den>
+                              </m:f>
+                              <m:r>
+                                <a:rPr lang="en-US" sz="2400" b="0" i="1" smtClean="0">
+                                  <a:latin typeface="Cambria Math" panose="02040503050406030204" pitchFamily="18" charset="0"/>
+                                </a:rPr>
+                                <m:t>)</m:t>
+                              </m:r>
+                            </m:den>
+                          </m:f>
+                        </m:e>
+                      </m:rad>
+                    </m:oMath>
+                  </m:oMathPara>
+                </a14:m>
+                <a:endParaRPr lang="en-US" sz="2400" dirty="0" smtClean="0"/>
+              </a:p>
+              <a:p>
+                <a:pPr marL="0" indent="0">
+                  <a:lnSpc>
+                    <a:spcPct val="100000"/>
+                  </a:lnSpc>
+                  <a:buNone/>
+                </a:pPr>
+                <a14:m>
+                  <m:oMathPara xmlns:m="http://schemas.openxmlformats.org/officeDocument/2006/math">
+                    <m:oMathParaPr>
+                      <m:jc m:val="centerGroup"/>
+                    </m:oMathParaPr>
+                    <m:oMath xmlns:m="http://schemas.openxmlformats.org/officeDocument/2006/math">
+                      <m:r>
+                        <a:rPr lang="en-US" b="0" i="1" smtClean="0">
+                          <a:latin typeface="Cambria Math" panose="02040503050406030204" pitchFamily="18" charset="0"/>
+                        </a:rPr>
+                        <m:t>𝑆𝑊𝑆</m:t>
+                      </m:r>
+                      <m:r>
+                        <a:rPr lang="en-US" b="0" i="1" smtClean="0">
+                          <a:latin typeface="Cambria Math" panose="02040503050406030204" pitchFamily="18" charset="0"/>
+                        </a:rPr>
+                        <m:t>≈1 </m:t>
+                      </m:r>
+                      <m:r>
+                        <m:rPr>
+                          <m:nor/>
+                        </m:rPr>
+                        <a:rPr lang="en-US" b="0" i="0" smtClean="0">
+                          <a:latin typeface="Cambria Math" panose="02040503050406030204" pitchFamily="18" charset="0"/>
+                        </a:rPr>
+                        <m:t>m</m:t>
+                      </m:r>
+                      <m:r>
+                        <m:rPr>
+                          <m:nor/>
+                        </m:rPr>
+                        <a:rPr lang="en-US" b="0" i="0" smtClean="0">
+                          <a:latin typeface="Cambria Math" panose="02040503050406030204" pitchFamily="18" charset="0"/>
+                        </a:rPr>
+                        <m:t>/</m:t>
+                      </m:r>
+                      <m:r>
+                        <m:rPr>
+                          <m:nor/>
+                        </m:rPr>
+                        <a:rPr lang="en-US" b="0" i="0" smtClean="0">
+                          <a:latin typeface="Cambria Math" panose="02040503050406030204" pitchFamily="18" charset="0"/>
+                        </a:rPr>
+                        <m:t>s</m:t>
+                      </m:r>
+                    </m:oMath>
+                  </m:oMathPara>
+                </a14:m>
+                <a:endParaRPr lang="en-US" dirty="0"/>
+              </a:p>
+            </p:txBody>
+          </p:sp>
+        </mc:Choice>
+        <mc:Fallback>
+          <p:sp>
+            <p:nvSpPr>
+              <p:cNvPr id="3" name="Content Placeholder 2"/>
+              <p:cNvSpPr>
+                <a:spLocks noGrp="1" noRot="1" noChangeAspect="1" noMove="1" noResize="1" noEditPoints="1" noAdjustHandles="1" noChangeArrowheads="1" noChangeShapeType="1" noTextEdit="1"/>
+              </p:cNvSpPr>
+              <p:nvPr>
+                <p:ph idx="1"/>
+              </p:nvPr>
+            </p:nvSpPr>
+            <p:spPr>
+              <a:blipFill rotWithShape="0">
+                <a:blip r:embed="rId2"/>
+                <a:stretch>
+                  <a:fillRect/>
+                </a:stretch>
+              </a:blipFill>
+            </p:spPr>
+            <p:txBody>
+              <a:bodyPr/>
+              <a:lstStyle/>
+              <a:p>
+                <a:r>
+                  <a:rPr lang="en-US">
+                    <a:noFill/>
+                  </a:rPr>
+                  <a:t> </a:t>
+                </a:r>
+              </a:p>
+            </p:txBody>
+          </p:sp>
+        </mc:Fallback>
+      </mc:AlternateContent>
+    </p:spTree>
+    <p:extLst>
+      <p:ext uri="{BB962C8B-B14F-4D97-AF65-F5344CB8AC3E}">
+        <p14:creationId xmlns:p14="http://schemas.microsoft.com/office/powerpoint/2010/main" val="1160773570"/>
+      </p:ext>
+    </p:extLst>
+  </p:cSld>
+  <p:clrMapOvr>
+    <a:masterClrMapping/>
+  </p:clrMapOvr>
+  <p:timing>
+    <p:tnLst>
+      <p:par>
+        <p:cTn id="1" dur="indefinite" restart="never" nodeType="tmRoot"/>
+      </p:par>
+    </p:tnLst>
+  </p:timing>
+</p:sld>
+</file>
+
+<file path=ppt/slides/slide15.xml><?xml version="1.0" encoding="utf-8"?>
+<p:sld xmlns:a="http://schemas.openxmlformats.org/drawingml/2006/main" xmlns:r="http://schemas.openxmlformats.org/officeDocument/2006/relationships" xmlns:p="http://schemas.openxmlformats.org/presentationml/2006/main">
+  <p:cSld>
+    <p:spTree>
+      <p:nvGrpSpPr>
+        <p:cNvPr id="1" name=""/>
+        <p:cNvGrpSpPr/>
+        <p:nvPr/>
+      </p:nvGrpSpPr>
+      <p:grpSpPr>
+        <a:xfrm>
+          <a:off x="0" y="0"/>
+          <a:ext cx="0" cy="0"/>
+          <a:chOff x="0" y="0"/>
+          <a:chExt cx="0" cy="0"/>
+        </a:xfrm>
+      </p:grpSpPr>
+      <p:sp>
+        <p:nvSpPr>
+          <p:cNvPr id="2" name="Title 1"/>
+          <p:cNvSpPr>
+            <a:spLocks noGrp="1"/>
+          </p:cNvSpPr>
+          <p:nvPr>
+            <p:ph type="title"/>
+          </p:nvPr>
+        </p:nvSpPr>
+        <p:spPr/>
+        <p:txBody>
+          <a:bodyPr/>
+          <a:lstStyle/>
+          <a:p>
+            <a:r>
+              <a:rPr lang="en-US" dirty="0" smtClean="0"/>
+              <a:t>SWS Measurements at Different Focal Depths</a:t>
+            </a:r>
+            <a:endParaRPr lang="en-US" dirty="0"/>
+          </a:p>
+        </p:txBody>
+      </p:sp>
+      <p:pic>
+        <p:nvPicPr>
+          <p:cNvPr id="5" name="Picture 4"/>
+          <p:cNvPicPr>
+            <a:picLocks noChangeAspect="1"/>
+          </p:cNvPicPr>
+          <p:nvPr/>
+        </p:nvPicPr>
+        <p:blipFill rotWithShape="1">
+          <a:blip r:embed="rId3">
+            <a:extLst>
+              <a:ext uri="{28A0092B-C50C-407E-A947-70E740481C1C}">
+                <a14:useLocalDpi xmlns:a14="http://schemas.microsoft.com/office/drawing/2010/main" val="0"/>
+              </a:ext>
+            </a:extLst>
+          </a:blip>
+          <a:srcRect l="4226" r="6935"/>
+          <a:stretch/>
+        </p:blipFill>
+        <p:spPr>
+          <a:xfrm>
+            <a:off x="368135" y="1690687"/>
+            <a:ext cx="5407231" cy="4564879"/>
+          </a:xfrm>
+          <a:prstGeom prst="rect">
+            <a:avLst/>
+          </a:prstGeom>
+        </p:spPr>
+      </p:pic>
+      <p:pic>
+        <p:nvPicPr>
+          <p:cNvPr id="7" name="Picture 6"/>
+          <p:cNvPicPr>
+            <a:picLocks noChangeAspect="1"/>
+          </p:cNvPicPr>
+          <p:nvPr/>
+        </p:nvPicPr>
+        <p:blipFill rotWithShape="1">
+          <a:blip r:embed="rId4">
+            <a:extLst>
+              <a:ext uri="{28A0092B-C50C-407E-A947-70E740481C1C}">
+                <a14:useLocalDpi xmlns:a14="http://schemas.microsoft.com/office/drawing/2010/main" val="0"/>
+              </a:ext>
+            </a:extLst>
+          </a:blip>
+          <a:srcRect l="3245" r="7833"/>
+          <a:stretch/>
+        </p:blipFill>
+        <p:spPr>
+          <a:xfrm>
+            <a:off x="6245431" y="1690686"/>
+            <a:ext cx="5451764" cy="4564879"/>
+          </a:xfrm>
+          <a:prstGeom prst="rect">
+            <a:avLst/>
+          </a:prstGeom>
+        </p:spPr>
+      </p:pic>
+    </p:spTree>
+    <p:extLst>
+      <p:ext uri="{BB962C8B-B14F-4D97-AF65-F5344CB8AC3E}">
+        <p14:creationId xmlns:p14="http://schemas.microsoft.com/office/powerpoint/2010/main" val="8870133"/>
       </p:ext>
     </p:extLst>
   </p:cSld>

</xml_diff>

<commit_message>
added conclusions + future works section
</commit_message>
<xml_diff>
--- a/presentations/lab_meeting/lab_meeting_2015.04.24_kzk_sws.pptx
+++ b/presentations/lab_meeting/lab_meeting_2015.04.24_kzk_sws.pptx
@@ -5,7 +5,7 @@
     <p:sldMasterId id="2147483648" r:id="rId1"/>
   </p:sldMasterIdLst>
   <p:notesMasterIdLst>
-    <p:notesMasterId r:id="rId17"/>
+    <p:notesMasterId r:id="rId19"/>
   </p:notesMasterIdLst>
   <p:sldIdLst>
     <p:sldId id="256" r:id="rId2"/>
@@ -23,6 +23,8 @@
     <p:sldId id="269" r:id="rId14"/>
     <p:sldId id="271" r:id="rId15"/>
     <p:sldId id="270" r:id="rId16"/>
+    <p:sldId id="272" r:id="rId17"/>
+    <p:sldId id="273" r:id="rId18"/>
   </p:sldIdLst>
   <p:sldSz cx="12192000" cy="6858000"/>
   <p:notesSz cx="6858000" cy="9144000"/>
@@ -525,11 +527,11 @@
           <a:p>
             <a:r>
               <a:rPr lang="en-US" dirty="0" smtClean="0"/>
-              <a:t>Next series of plots are all center</a:t>
+              <a:t>The goal</a:t>
             </a:r>
             <a:r>
               <a:rPr lang="en-US" baseline="0" dirty="0" smtClean="0"/>
-              <a:t> trace plots -&gt; plots of axial intensities down the center of mesh.</a:t>
+              <a:t> of this project is use simulations to investigate whether the effects of nonlinear acoustic propagation explains the depth dependence observed in shear wave speed measurements</a:t>
             </a:r>
             <a:endParaRPr lang="en-US" dirty="0"/>
           </a:p>
@@ -552,7 +554,7 @@
           <a:p>
             <a:fld id="{68208AFF-1C65-4E6A-ACD9-43CDFFA0A9E4}" type="slidenum">
               <a:rPr lang="en-US" smtClean="0"/>
-              <a:t>5</a:t>
+              <a:t>2</a:t>
             </a:fld>
             <a:endParaRPr lang="en-US"/>
           </a:p>
@@ -561,7 +563,359 @@
     </p:spTree>
     <p:extLst>
       <p:ext uri="{BB962C8B-B14F-4D97-AF65-F5344CB8AC3E}">
-        <p14:creationId xmlns:p14="http://schemas.microsoft.com/office/powerpoint/2010/main" val="3498337573"/>
+        <p14:creationId xmlns:p14="http://schemas.microsoft.com/office/powerpoint/2010/main" val="3372401036"/>
+      </p:ext>
+    </p:extLst>
+  </p:cSld>
+  <p:clrMapOvr>
+    <a:masterClrMapping/>
+  </p:clrMapOvr>
+</p:notes>
+</file>
+
+<file path=ppt/notesSlides/notesSlide10.xml><?xml version="1.0" encoding="utf-8"?>
+<p:notes xmlns:a="http://schemas.openxmlformats.org/drawingml/2006/main" xmlns:r="http://schemas.openxmlformats.org/officeDocument/2006/relationships" xmlns:p="http://schemas.openxmlformats.org/presentationml/2006/main">
+  <p:cSld>
+    <p:spTree>
+      <p:nvGrpSpPr>
+        <p:cNvPr id="1" name=""/>
+        <p:cNvGrpSpPr/>
+        <p:nvPr/>
+      </p:nvGrpSpPr>
+      <p:grpSpPr>
+        <a:xfrm>
+          <a:off x="0" y="0"/>
+          <a:ext cx="0" cy="0"/>
+          <a:chOff x="0" y="0"/>
+          <a:chExt cx="0" cy="0"/>
+        </a:xfrm>
+      </p:grpSpPr>
+      <p:sp>
+        <p:nvSpPr>
+          <p:cNvPr id="2" name="Slide Image Placeholder 1"/>
+          <p:cNvSpPr>
+            <a:spLocks noGrp="1" noRot="1" noChangeAspect="1"/>
+          </p:cNvSpPr>
+          <p:nvPr>
+            <p:ph type="sldImg"/>
+          </p:nvPr>
+        </p:nvSpPr>
+        <p:spPr/>
+      </p:sp>
+      <p:sp>
+        <p:nvSpPr>
+          <p:cNvPr id="3" name="Notes Placeholder 2"/>
+          <p:cNvSpPr>
+            <a:spLocks noGrp="1"/>
+          </p:cNvSpPr>
+          <p:nvPr>
+            <p:ph type="body" idx="1"/>
+          </p:nvPr>
+        </p:nvSpPr>
+        <p:spPr/>
+        <p:txBody>
+          <a:bodyPr/>
+          <a:lstStyle/>
+          <a:p>
+            <a:endParaRPr lang="en-US" dirty="0"/>
+          </a:p>
+        </p:txBody>
+      </p:sp>
+      <p:sp>
+        <p:nvSpPr>
+          <p:cNvPr id="4" name="Slide Number Placeholder 3"/>
+          <p:cNvSpPr>
+            <a:spLocks noGrp="1"/>
+          </p:cNvSpPr>
+          <p:nvPr>
+            <p:ph type="sldNum" sz="quarter" idx="10"/>
+          </p:nvPr>
+        </p:nvSpPr>
+        <p:spPr/>
+        <p:txBody>
+          <a:bodyPr/>
+          <a:lstStyle/>
+          <a:p>
+            <a:fld id="{68208AFF-1C65-4E6A-ACD9-43CDFFA0A9E4}" type="slidenum">
+              <a:rPr lang="en-US" smtClean="0"/>
+              <a:t>13</a:t>
+            </a:fld>
+            <a:endParaRPr lang="en-US"/>
+          </a:p>
+        </p:txBody>
+      </p:sp>
+    </p:spTree>
+    <p:extLst>
+      <p:ext uri="{BB962C8B-B14F-4D97-AF65-F5344CB8AC3E}">
+        <p14:creationId xmlns:p14="http://schemas.microsoft.com/office/powerpoint/2010/main" val="3385590677"/>
+      </p:ext>
+    </p:extLst>
+  </p:cSld>
+  <p:clrMapOvr>
+    <a:masterClrMapping/>
+  </p:clrMapOvr>
+</p:notes>
+</file>
+
+<file path=ppt/notesSlides/notesSlide11.xml><?xml version="1.0" encoding="utf-8"?>
+<p:notes xmlns:a="http://schemas.openxmlformats.org/drawingml/2006/main" xmlns:r="http://schemas.openxmlformats.org/officeDocument/2006/relationships" xmlns:p="http://schemas.openxmlformats.org/presentationml/2006/main">
+  <p:cSld>
+    <p:spTree>
+      <p:nvGrpSpPr>
+        <p:cNvPr id="1" name=""/>
+        <p:cNvGrpSpPr/>
+        <p:nvPr/>
+      </p:nvGrpSpPr>
+      <p:grpSpPr>
+        <a:xfrm>
+          <a:off x="0" y="0"/>
+          <a:ext cx="0" cy="0"/>
+          <a:chOff x="0" y="0"/>
+          <a:chExt cx="0" cy="0"/>
+        </a:xfrm>
+      </p:grpSpPr>
+      <p:sp>
+        <p:nvSpPr>
+          <p:cNvPr id="2" name="Slide Image Placeholder 1"/>
+          <p:cNvSpPr>
+            <a:spLocks noGrp="1" noRot="1" noChangeAspect="1"/>
+          </p:cNvSpPr>
+          <p:nvPr>
+            <p:ph type="sldImg"/>
+          </p:nvPr>
+        </p:nvSpPr>
+        <p:spPr/>
+      </p:sp>
+      <p:sp>
+        <p:nvSpPr>
+          <p:cNvPr id="3" name="Notes Placeholder 2"/>
+          <p:cNvSpPr>
+            <a:spLocks noGrp="1"/>
+          </p:cNvSpPr>
+          <p:nvPr>
+            <p:ph type="body" idx="1"/>
+          </p:nvPr>
+        </p:nvSpPr>
+        <p:spPr/>
+        <p:txBody>
+          <a:bodyPr/>
+          <a:lstStyle/>
+          <a:p>
+            <a:endParaRPr lang="en-US" dirty="0"/>
+          </a:p>
+        </p:txBody>
+      </p:sp>
+      <p:sp>
+        <p:nvSpPr>
+          <p:cNvPr id="4" name="Slide Number Placeholder 3"/>
+          <p:cNvSpPr>
+            <a:spLocks noGrp="1"/>
+          </p:cNvSpPr>
+          <p:nvPr>
+            <p:ph type="sldNum" sz="quarter" idx="10"/>
+          </p:nvPr>
+        </p:nvSpPr>
+        <p:spPr/>
+        <p:txBody>
+          <a:bodyPr/>
+          <a:lstStyle/>
+          <a:p>
+            <a:fld id="{68208AFF-1C65-4E6A-ACD9-43CDFFA0A9E4}" type="slidenum">
+              <a:rPr lang="en-US" smtClean="0"/>
+              <a:t>15</a:t>
+            </a:fld>
+            <a:endParaRPr lang="en-US"/>
+          </a:p>
+        </p:txBody>
+      </p:sp>
+    </p:spTree>
+    <p:extLst>
+      <p:ext uri="{BB962C8B-B14F-4D97-AF65-F5344CB8AC3E}">
+        <p14:creationId xmlns:p14="http://schemas.microsoft.com/office/powerpoint/2010/main" val="1769560903"/>
+      </p:ext>
+    </p:extLst>
+  </p:cSld>
+  <p:clrMapOvr>
+    <a:masterClrMapping/>
+  </p:clrMapOvr>
+</p:notes>
+</file>
+
+<file path=ppt/notesSlides/notesSlide12.xml><?xml version="1.0" encoding="utf-8"?>
+<p:notes xmlns:a="http://schemas.openxmlformats.org/drawingml/2006/main" xmlns:r="http://schemas.openxmlformats.org/officeDocument/2006/relationships" xmlns:p="http://schemas.openxmlformats.org/presentationml/2006/main">
+  <p:cSld>
+    <p:spTree>
+      <p:nvGrpSpPr>
+        <p:cNvPr id="1" name=""/>
+        <p:cNvGrpSpPr/>
+        <p:nvPr/>
+      </p:nvGrpSpPr>
+      <p:grpSpPr>
+        <a:xfrm>
+          <a:off x="0" y="0"/>
+          <a:ext cx="0" cy="0"/>
+          <a:chOff x="0" y="0"/>
+          <a:chExt cx="0" cy="0"/>
+        </a:xfrm>
+      </p:grpSpPr>
+      <p:sp>
+        <p:nvSpPr>
+          <p:cNvPr id="2" name="Slide Image Placeholder 1"/>
+          <p:cNvSpPr>
+            <a:spLocks noGrp="1" noRot="1" noChangeAspect="1"/>
+          </p:cNvSpPr>
+          <p:nvPr>
+            <p:ph type="sldImg"/>
+          </p:nvPr>
+        </p:nvSpPr>
+        <p:spPr/>
+      </p:sp>
+      <p:sp>
+        <p:nvSpPr>
+          <p:cNvPr id="3" name="Notes Placeholder 2"/>
+          <p:cNvSpPr>
+            <a:spLocks noGrp="1"/>
+          </p:cNvSpPr>
+          <p:nvPr>
+            <p:ph type="body" idx="1"/>
+          </p:nvPr>
+        </p:nvSpPr>
+        <p:spPr/>
+        <p:txBody>
+          <a:bodyPr/>
+          <a:lstStyle/>
+          <a:p>
+            <a:endParaRPr lang="en-US" dirty="0"/>
+          </a:p>
+        </p:txBody>
+      </p:sp>
+      <p:sp>
+        <p:nvSpPr>
+          <p:cNvPr id="4" name="Slide Number Placeholder 3"/>
+          <p:cNvSpPr>
+            <a:spLocks noGrp="1"/>
+          </p:cNvSpPr>
+          <p:nvPr>
+            <p:ph type="sldNum" sz="quarter" idx="10"/>
+          </p:nvPr>
+        </p:nvSpPr>
+        <p:spPr/>
+        <p:txBody>
+          <a:bodyPr/>
+          <a:lstStyle/>
+          <a:p>
+            <a:fld id="{68208AFF-1C65-4E6A-ACD9-43CDFFA0A9E4}" type="slidenum">
+              <a:rPr lang="en-US" smtClean="0"/>
+              <a:t>16</a:t>
+            </a:fld>
+            <a:endParaRPr lang="en-US"/>
+          </a:p>
+        </p:txBody>
+      </p:sp>
+    </p:spTree>
+    <p:extLst>
+      <p:ext uri="{BB962C8B-B14F-4D97-AF65-F5344CB8AC3E}">
+        <p14:creationId xmlns:p14="http://schemas.microsoft.com/office/powerpoint/2010/main" val="2353675800"/>
+      </p:ext>
+    </p:extLst>
+  </p:cSld>
+  <p:clrMapOvr>
+    <a:masterClrMapping/>
+  </p:clrMapOvr>
+</p:notes>
+</file>
+
+<file path=ppt/notesSlides/notesSlide13.xml><?xml version="1.0" encoding="utf-8"?>
+<p:notes xmlns:a="http://schemas.openxmlformats.org/drawingml/2006/main" xmlns:r="http://schemas.openxmlformats.org/officeDocument/2006/relationships" xmlns:p="http://schemas.openxmlformats.org/presentationml/2006/main">
+  <p:cSld>
+    <p:spTree>
+      <p:nvGrpSpPr>
+        <p:cNvPr id="1" name=""/>
+        <p:cNvGrpSpPr/>
+        <p:nvPr/>
+      </p:nvGrpSpPr>
+      <p:grpSpPr>
+        <a:xfrm>
+          <a:off x="0" y="0"/>
+          <a:ext cx="0" cy="0"/>
+          <a:chOff x="0" y="0"/>
+          <a:chExt cx="0" cy="0"/>
+        </a:xfrm>
+      </p:grpSpPr>
+      <p:sp>
+        <p:nvSpPr>
+          <p:cNvPr id="2" name="Slide Image Placeholder 1"/>
+          <p:cNvSpPr>
+            <a:spLocks noGrp="1" noRot="1" noChangeAspect="1"/>
+          </p:cNvSpPr>
+          <p:nvPr>
+            <p:ph type="sldImg"/>
+          </p:nvPr>
+        </p:nvSpPr>
+        <p:spPr/>
+      </p:sp>
+      <p:sp>
+        <p:nvSpPr>
+          <p:cNvPr id="3" name="Notes Placeholder 2"/>
+          <p:cNvSpPr>
+            <a:spLocks noGrp="1"/>
+          </p:cNvSpPr>
+          <p:nvPr>
+            <p:ph type="body" idx="1"/>
+          </p:nvPr>
+        </p:nvSpPr>
+        <p:spPr/>
+        <p:txBody>
+          <a:bodyPr/>
+          <a:lstStyle/>
+          <a:p>
+            <a:r>
+              <a:rPr lang="en-US" dirty="0" smtClean="0"/>
+              <a:t>Reminder to mention </a:t>
+            </a:r>
+            <a:r>
+              <a:rPr lang="en-US" dirty="0" err="1" smtClean="0"/>
+              <a:t>Gianmarco</a:t>
+            </a:r>
+            <a:r>
+              <a:rPr lang="en-US" dirty="0" smtClean="0"/>
+              <a:t> has updated 3D</a:t>
+            </a:r>
+            <a:r>
+              <a:rPr lang="en-US" baseline="0" dirty="0" smtClean="0"/>
+              <a:t> KZK sim code that has quarter symmetry mode + written in C, so it should have a much quicker runtime. He is also working on a parallel version of the KZK sim code.</a:t>
+            </a:r>
+            <a:endParaRPr lang="en-US" dirty="0"/>
+          </a:p>
+        </p:txBody>
+      </p:sp>
+      <p:sp>
+        <p:nvSpPr>
+          <p:cNvPr id="4" name="Slide Number Placeholder 3"/>
+          <p:cNvSpPr>
+            <a:spLocks noGrp="1"/>
+          </p:cNvSpPr>
+          <p:nvPr>
+            <p:ph type="sldNum" sz="quarter" idx="10"/>
+          </p:nvPr>
+        </p:nvSpPr>
+        <p:spPr/>
+        <p:txBody>
+          <a:bodyPr/>
+          <a:lstStyle/>
+          <a:p>
+            <a:fld id="{68208AFF-1C65-4E6A-ACD9-43CDFFA0A9E4}" type="slidenum">
+              <a:rPr lang="en-US" smtClean="0"/>
+              <a:t>17</a:t>
+            </a:fld>
+            <a:endParaRPr lang="en-US"/>
+          </a:p>
+        </p:txBody>
+      </p:sp>
+    </p:spTree>
+    <p:extLst>
+      <p:ext uri="{BB962C8B-B14F-4D97-AF65-F5344CB8AC3E}">
+        <p14:creationId xmlns:p14="http://schemas.microsoft.com/office/powerpoint/2010/main" val="2315862782"/>
       </p:ext>
     </p:extLst>
   </p:cSld>
@@ -617,11 +971,45 @@
           <a:p>
             <a:r>
               <a:rPr lang="en-US" dirty="0" smtClean="0"/>
-              <a:t>Attenuation</a:t>
+              <a:t>Ran the KZK sim in linear mode (beta = 0)</a:t>
             </a:r>
             <a:r>
               <a:rPr lang="en-US" baseline="0" dirty="0" smtClean="0"/>
-              <a:t> differences between Field II and KZK sim? Match up slightly better for no attenuation cases for identical sim inputs when KZK sim run in linear mode.</a:t>
+              <a:t> to compare w/ Field </a:t>
+            </a:r>
+            <a:r>
+              <a:rPr lang="en-US" baseline="0" smtClean="0"/>
+              <a:t>II intensity field</a:t>
+            </a:r>
+            <a:endParaRPr lang="en-US" smtClean="0"/>
+          </a:p>
+          <a:p>
+            <a:endParaRPr lang="en-US" dirty="0" smtClean="0"/>
+          </a:p>
+          <a:p>
+            <a:r>
+              <a:rPr lang="en-US" dirty="0" smtClean="0"/>
+              <a:t>Next </a:t>
+            </a:r>
+            <a:r>
+              <a:rPr lang="en-US" dirty="0" smtClean="0"/>
+              <a:t>series of plots are all center</a:t>
+            </a:r>
+            <a:r>
+              <a:rPr lang="en-US" baseline="0" dirty="0" smtClean="0"/>
+              <a:t> trace plots -&gt; plots of axial intensities down the center of </a:t>
+            </a:r>
+            <a:r>
+              <a:rPr lang="en-US" baseline="0" dirty="0" smtClean="0"/>
+              <a:t>mesh (intersection of lateral and </a:t>
+            </a:r>
+            <a:r>
+              <a:rPr lang="en-US" baseline="0" dirty="0" err="1" smtClean="0"/>
+              <a:t>elevational</a:t>
+            </a:r>
+            <a:r>
+              <a:rPr lang="en-US" baseline="0" dirty="0" smtClean="0"/>
+              <a:t> axes)</a:t>
             </a:r>
             <a:endParaRPr lang="en-US" dirty="0"/>
           </a:p>
@@ -644,7 +1032,7 @@
           <a:p>
             <a:fld id="{68208AFF-1C65-4E6A-ACD9-43CDFFA0A9E4}" type="slidenum">
               <a:rPr lang="en-US" smtClean="0"/>
-              <a:t>6</a:t>
+              <a:t>5</a:t>
             </a:fld>
             <a:endParaRPr lang="en-US"/>
           </a:p>
@@ -653,7 +1041,7 @@
     </p:spTree>
     <p:extLst>
       <p:ext uri="{BB962C8B-B14F-4D97-AF65-F5344CB8AC3E}">
-        <p14:creationId xmlns:p14="http://schemas.microsoft.com/office/powerpoint/2010/main" val="2302256237"/>
+        <p14:creationId xmlns:p14="http://schemas.microsoft.com/office/powerpoint/2010/main" val="3498337573"/>
       </p:ext>
     </p:extLst>
   </p:cSld>
@@ -708,12 +1096,20 @@
           <a:lstStyle/>
           <a:p>
             <a:r>
-              <a:rPr lang="en-US" dirty="0" smtClean="0"/>
-              <a:t>As nonlinearity</a:t>
-            </a:r>
-            <a:r>
               <a:rPr lang="en-US" baseline="0" dirty="0" smtClean="0"/>
-              <a:t> increases, the peak intensities occur at shallower depths. However, nonlinear affects are mitigated for greater attenuation levels.</a:t>
+              <a:t>Differences in attenuation calculations between </a:t>
+            </a:r>
+            <a:r>
+              <a:rPr lang="en-US" baseline="0" dirty="0" smtClean="0"/>
+              <a:t>Field II and KZK sim? Match </a:t>
+            </a:r>
+            <a:r>
+              <a:rPr lang="en-US" baseline="0" dirty="0" smtClean="0"/>
+              <a:t>up slightly better </a:t>
+            </a:r>
+            <a:r>
+              <a:rPr lang="en-US" baseline="0" dirty="0" smtClean="0"/>
+              <a:t>for no attenuation cases for identical sim inputs when KZK sim run in linear mode.</a:t>
             </a:r>
             <a:endParaRPr lang="en-US" dirty="0"/>
           </a:p>
@@ -736,7 +1132,7 @@
           <a:p>
             <a:fld id="{68208AFF-1C65-4E6A-ACD9-43CDFFA0A9E4}" type="slidenum">
               <a:rPr lang="en-US" smtClean="0"/>
-              <a:t>7</a:t>
+              <a:t>6</a:t>
             </a:fld>
             <a:endParaRPr lang="en-US"/>
           </a:p>
@@ -745,7 +1141,7 @@
     </p:spTree>
     <p:extLst>
       <p:ext uri="{BB962C8B-B14F-4D97-AF65-F5344CB8AC3E}">
-        <p14:creationId xmlns:p14="http://schemas.microsoft.com/office/powerpoint/2010/main" val="3442966043"/>
+        <p14:creationId xmlns:p14="http://schemas.microsoft.com/office/powerpoint/2010/main" val="2302256237"/>
       </p:ext>
     </p:extLst>
   </p:cSld>
@@ -799,6 +1195,14 @@
           <a:bodyPr/>
           <a:lstStyle/>
           <a:p>
+            <a:r>
+              <a:rPr lang="en-US" dirty="0" smtClean="0"/>
+              <a:t>As nonlinearity</a:t>
+            </a:r>
+            <a:r>
+              <a:rPr lang="en-US" baseline="0" dirty="0" smtClean="0"/>
+              <a:t> increases, the peak intensities occur at shallower depths. However, nonlinear affects are mitigated for greater attenuation levels.</a:t>
+            </a:r>
             <a:endParaRPr lang="en-US" dirty="0"/>
           </a:p>
         </p:txBody>
@@ -820,7 +1224,7 @@
           <a:p>
             <a:fld id="{68208AFF-1C65-4E6A-ACD9-43CDFFA0A9E4}" type="slidenum">
               <a:rPr lang="en-US" smtClean="0"/>
-              <a:t>9</a:t>
+              <a:t>7</a:t>
             </a:fld>
             <a:endParaRPr lang="en-US"/>
           </a:p>
@@ -829,7 +1233,7 @@
     </p:spTree>
     <p:extLst>
       <p:ext uri="{BB962C8B-B14F-4D97-AF65-F5344CB8AC3E}">
-        <p14:creationId xmlns:p14="http://schemas.microsoft.com/office/powerpoint/2010/main" val="323917936"/>
+        <p14:creationId xmlns:p14="http://schemas.microsoft.com/office/powerpoint/2010/main" val="3442966043"/>
       </p:ext>
     </p:extLst>
   </p:cSld>
@@ -885,11 +1289,11 @@
           <a:p>
             <a:r>
               <a:rPr lang="en-US" dirty="0" smtClean="0"/>
-              <a:t>Possible out-of-plane</a:t>
+              <a:t>As nonlinearity</a:t>
             </a:r>
             <a:r>
               <a:rPr lang="en-US" baseline="0" dirty="0" smtClean="0"/>
-              <a:t> sources???</a:t>
+              <a:t> increases, the peak intensities occur at shallower and more laterally offset positions.</a:t>
             </a:r>
             <a:endParaRPr lang="en-US" dirty="0"/>
           </a:p>
@@ -912,7 +1316,7 @@
           <a:p>
             <a:fld id="{68208AFF-1C65-4E6A-ACD9-43CDFFA0A9E4}" type="slidenum">
               <a:rPr lang="en-US" smtClean="0"/>
-              <a:t>10</a:t>
+              <a:t>8</a:t>
             </a:fld>
             <a:endParaRPr lang="en-US"/>
           </a:p>
@@ -921,7 +1325,7 @@
     </p:spTree>
     <p:extLst>
       <p:ext uri="{BB962C8B-B14F-4D97-AF65-F5344CB8AC3E}">
-        <p14:creationId xmlns:p14="http://schemas.microsoft.com/office/powerpoint/2010/main" val="1741909592"/>
+        <p14:creationId xmlns:p14="http://schemas.microsoft.com/office/powerpoint/2010/main" val="1151050501"/>
       </p:ext>
     </p:extLst>
   </p:cSld>
@@ -975,6 +1379,14 @@
           <a:bodyPr/>
           <a:lstStyle/>
           <a:p>
+            <a:r>
+              <a:rPr lang="en-US" dirty="0" smtClean="0"/>
+              <a:t>However, if</a:t>
+            </a:r>
+            <a:r>
+              <a:rPr lang="en-US" baseline="0" dirty="0" smtClean="0"/>
+              <a:t> the attenuation is high enough, the amplitude of the sound waves is reduced, and nonlinear effects are no longer as influential.</a:t>
+            </a:r>
             <a:endParaRPr lang="en-US" dirty="0"/>
           </a:p>
         </p:txBody>
@@ -996,7 +1408,7 @@
           <a:p>
             <a:fld id="{68208AFF-1C65-4E6A-ACD9-43CDFFA0A9E4}" type="slidenum">
               <a:rPr lang="en-US" smtClean="0"/>
-              <a:t>13</a:t>
+              <a:t>9</a:t>
             </a:fld>
             <a:endParaRPr lang="en-US"/>
           </a:p>
@@ -1005,7 +1417,7 @@
     </p:spTree>
     <p:extLst>
       <p:ext uri="{BB962C8B-B14F-4D97-AF65-F5344CB8AC3E}">
-        <p14:creationId xmlns:p14="http://schemas.microsoft.com/office/powerpoint/2010/main" val="3385590677"/>
+        <p14:creationId xmlns:p14="http://schemas.microsoft.com/office/powerpoint/2010/main" val="323917936"/>
       </p:ext>
     </p:extLst>
   </p:cSld>
@@ -1059,6 +1471,18 @@
           <a:bodyPr/>
           <a:lstStyle/>
           <a:p>
+            <a:r>
+              <a:rPr lang="en-US" dirty="0" smtClean="0"/>
+              <a:t>Possible out-of-plane</a:t>
+            </a:r>
+            <a:r>
+              <a:rPr lang="en-US" baseline="0" dirty="0" smtClean="0"/>
+              <a:t> sources</a:t>
+            </a:r>
+            <a:r>
+              <a:rPr lang="en-US" baseline="0" dirty="0" smtClean="0"/>
+              <a:t>??? Though changes are very miniscule.</a:t>
+            </a:r>
             <a:endParaRPr lang="en-US" dirty="0"/>
           </a:p>
         </p:txBody>
@@ -1080,7 +1504,7 @@
           <a:p>
             <a:fld id="{68208AFF-1C65-4E6A-ACD9-43CDFFA0A9E4}" type="slidenum">
               <a:rPr lang="en-US" smtClean="0"/>
-              <a:t>15</a:t>
+              <a:t>10</a:t>
             </a:fld>
             <a:endParaRPr lang="en-US"/>
           </a:p>
@@ -1089,7 +1513,175 @@
     </p:spTree>
     <p:extLst>
       <p:ext uri="{BB962C8B-B14F-4D97-AF65-F5344CB8AC3E}">
-        <p14:creationId xmlns:p14="http://schemas.microsoft.com/office/powerpoint/2010/main" val="1769560903"/>
+        <p14:creationId xmlns:p14="http://schemas.microsoft.com/office/powerpoint/2010/main" val="1741909592"/>
+      </p:ext>
+    </p:extLst>
+  </p:cSld>
+  <p:clrMapOvr>
+    <a:masterClrMapping/>
+  </p:clrMapOvr>
+</p:notes>
+</file>
+
+<file path=ppt/notesSlides/notesSlide8.xml><?xml version="1.0" encoding="utf-8"?>
+<p:notes xmlns:a="http://schemas.openxmlformats.org/drawingml/2006/main" xmlns:r="http://schemas.openxmlformats.org/officeDocument/2006/relationships" xmlns:p="http://schemas.openxmlformats.org/presentationml/2006/main">
+  <p:cSld>
+    <p:spTree>
+      <p:nvGrpSpPr>
+        <p:cNvPr id="1" name=""/>
+        <p:cNvGrpSpPr/>
+        <p:nvPr/>
+      </p:nvGrpSpPr>
+      <p:grpSpPr>
+        <a:xfrm>
+          <a:off x="0" y="0"/>
+          <a:ext cx="0" cy="0"/>
+          <a:chOff x="0" y="0"/>
+          <a:chExt cx="0" cy="0"/>
+        </a:xfrm>
+      </p:grpSpPr>
+      <p:sp>
+        <p:nvSpPr>
+          <p:cNvPr id="2" name="Slide Image Placeholder 1"/>
+          <p:cNvSpPr>
+            <a:spLocks noGrp="1" noRot="1" noChangeAspect="1"/>
+          </p:cNvSpPr>
+          <p:nvPr>
+            <p:ph type="sldImg"/>
+          </p:nvPr>
+        </p:nvSpPr>
+        <p:spPr/>
+      </p:sp>
+      <p:sp>
+        <p:nvSpPr>
+          <p:cNvPr id="3" name="Notes Placeholder 2"/>
+          <p:cNvSpPr>
+            <a:spLocks noGrp="1"/>
+          </p:cNvSpPr>
+          <p:nvPr>
+            <p:ph type="body" idx="1"/>
+          </p:nvPr>
+        </p:nvSpPr>
+        <p:spPr/>
+        <p:txBody>
+          <a:bodyPr/>
+          <a:lstStyle/>
+          <a:p>
+            <a:endParaRPr lang="en-US" dirty="0"/>
+          </a:p>
+        </p:txBody>
+      </p:sp>
+      <p:sp>
+        <p:nvSpPr>
+          <p:cNvPr id="4" name="Slide Number Placeholder 3"/>
+          <p:cNvSpPr>
+            <a:spLocks noGrp="1"/>
+          </p:cNvSpPr>
+          <p:nvPr>
+            <p:ph type="sldNum" sz="quarter" idx="10"/>
+          </p:nvPr>
+        </p:nvSpPr>
+        <p:spPr/>
+        <p:txBody>
+          <a:bodyPr/>
+          <a:lstStyle/>
+          <a:p>
+            <a:fld id="{68208AFF-1C65-4E6A-ACD9-43CDFFA0A9E4}" type="slidenum">
+              <a:rPr lang="en-US" smtClean="0"/>
+              <a:t>11</a:t>
+            </a:fld>
+            <a:endParaRPr lang="en-US"/>
+          </a:p>
+        </p:txBody>
+      </p:sp>
+    </p:spTree>
+    <p:extLst>
+      <p:ext uri="{BB962C8B-B14F-4D97-AF65-F5344CB8AC3E}">
+        <p14:creationId xmlns:p14="http://schemas.microsoft.com/office/powerpoint/2010/main" val="2959084058"/>
+      </p:ext>
+    </p:extLst>
+  </p:cSld>
+  <p:clrMapOvr>
+    <a:masterClrMapping/>
+  </p:clrMapOvr>
+</p:notes>
+</file>
+
+<file path=ppt/notesSlides/notesSlide9.xml><?xml version="1.0" encoding="utf-8"?>
+<p:notes xmlns:a="http://schemas.openxmlformats.org/drawingml/2006/main" xmlns:r="http://schemas.openxmlformats.org/officeDocument/2006/relationships" xmlns:p="http://schemas.openxmlformats.org/presentationml/2006/main">
+  <p:cSld>
+    <p:spTree>
+      <p:nvGrpSpPr>
+        <p:cNvPr id="1" name=""/>
+        <p:cNvGrpSpPr/>
+        <p:nvPr/>
+      </p:nvGrpSpPr>
+      <p:grpSpPr>
+        <a:xfrm>
+          <a:off x="0" y="0"/>
+          <a:ext cx="0" cy="0"/>
+          <a:chOff x="0" y="0"/>
+          <a:chExt cx="0" cy="0"/>
+        </a:xfrm>
+      </p:grpSpPr>
+      <p:sp>
+        <p:nvSpPr>
+          <p:cNvPr id="2" name="Slide Image Placeholder 1"/>
+          <p:cNvSpPr>
+            <a:spLocks noGrp="1" noRot="1" noChangeAspect="1"/>
+          </p:cNvSpPr>
+          <p:nvPr>
+            <p:ph type="sldImg"/>
+          </p:nvPr>
+        </p:nvSpPr>
+        <p:spPr/>
+      </p:sp>
+      <p:sp>
+        <p:nvSpPr>
+          <p:cNvPr id="3" name="Notes Placeholder 2"/>
+          <p:cNvSpPr>
+            <a:spLocks noGrp="1"/>
+          </p:cNvSpPr>
+          <p:nvPr>
+            <p:ph type="body" idx="1"/>
+          </p:nvPr>
+        </p:nvSpPr>
+        <p:spPr/>
+        <p:txBody>
+          <a:bodyPr/>
+          <a:lstStyle/>
+          <a:p>
+            <a:endParaRPr lang="en-US" dirty="0"/>
+          </a:p>
+        </p:txBody>
+      </p:sp>
+      <p:sp>
+        <p:nvSpPr>
+          <p:cNvPr id="4" name="Slide Number Placeholder 3"/>
+          <p:cNvSpPr>
+            <a:spLocks noGrp="1"/>
+          </p:cNvSpPr>
+          <p:nvPr>
+            <p:ph type="sldNum" sz="quarter" idx="10"/>
+          </p:nvPr>
+        </p:nvSpPr>
+        <p:spPr/>
+        <p:txBody>
+          <a:bodyPr/>
+          <a:lstStyle/>
+          <a:p>
+            <a:fld id="{68208AFF-1C65-4E6A-ACD9-43CDFFA0A9E4}" type="slidenum">
+              <a:rPr lang="en-US" smtClean="0"/>
+              <a:t>12</a:t>
+            </a:fld>
+            <a:endParaRPr lang="en-US"/>
+          </a:p>
+        </p:txBody>
+      </p:sp>
+    </p:spTree>
+    <p:extLst>
+      <p:ext uri="{BB962C8B-B14F-4D97-AF65-F5344CB8AC3E}">
+        <p14:creationId xmlns:p14="http://schemas.microsoft.com/office/powerpoint/2010/main" val="2927005626"/>
       </p:ext>
     </p:extLst>
   </p:cSld>
@@ -4578,7 +5170,6 @@
               <a:rPr lang="en-US" sz="9600" dirty="0"/>
               <a:t>=</a:t>
             </a:r>
-            <a:endParaRPr lang="en-US" sz="9600" dirty="0"/>
           </a:p>
         </p:txBody>
       </p:sp>
@@ -4868,7 +5459,7 @@
           <p:nvPr/>
         </p:nvPicPr>
         <p:blipFill>
-          <a:blip r:embed="rId2">
+          <a:blip r:embed="rId3">
             <a:extLst>
               <a:ext uri="{28A0092B-C50C-407E-A947-70E740481C1C}">
                 <a14:useLocalDpi xmlns:a14="http://schemas.microsoft.com/office/drawing/2010/main" val="0"/>
@@ -5061,8 +5652,8 @@
           </a:p>
         </p:txBody>
       </p:sp>
-      <mc:AlternateContent xmlns:mc="http://schemas.openxmlformats.org/markup-compatibility/2006">
-        <mc:Choice xmlns:a14="http://schemas.microsoft.com/office/drawing/2010/main" Requires="a14">
+      <mc:AlternateContent xmlns:mc="http://schemas.openxmlformats.org/markup-compatibility/2006" xmlns:a14="http://schemas.microsoft.com/office/drawing/2010/main">
+        <mc:Choice Requires="a14">
           <p:sp>
             <p:nvSpPr>
               <p:cNvPr id="3" name="Content Placeholder 2"/>
@@ -5389,7 +5980,7 @@
                               <m:f>
                                 <m:fPr>
                                   <m:ctrlPr>
-                                    <a:rPr lang="en-US" sz="2400" b="0" i="0" smtClean="0">
+                                    <a:rPr lang="en-US" sz="2400" b="0" i="1" smtClean="0">
                                       <a:latin typeface="Cambria Math" panose="02040503050406030204" pitchFamily="18" charset="0"/>
                                     </a:rPr>
                                   </m:ctrlPr>
@@ -5409,7 +6000,7 @@
                                   <m:sSup>
                                     <m:sSupPr>
                                       <m:ctrlPr>
-                                        <a:rPr lang="en-US" sz="2400" b="0" i="0" smtClean="0">
+                                        <a:rPr lang="en-US" sz="2400" b="0" i="1" smtClean="0">
                                           <a:latin typeface="Cambria Math" panose="02040503050406030204" pitchFamily="18" charset="0"/>
                                         </a:rPr>
                                       </m:ctrlPr>
@@ -5514,7 +6105,7 @@
             </p:txBody>
           </p:sp>
         </mc:Choice>
-        <mc:Fallback>
+        <mc:Fallback xmlns="">
           <p:sp>
             <p:nvSpPr>
               <p:cNvPr id="3" name="Content Placeholder 2"/>
@@ -5686,6 +6277,214 @@
 </p:sld>
 </file>
 
+<file path=ppt/slides/slide16.xml><?xml version="1.0" encoding="utf-8"?>
+<p:sld xmlns:a="http://schemas.openxmlformats.org/drawingml/2006/main" xmlns:r="http://schemas.openxmlformats.org/officeDocument/2006/relationships" xmlns:p="http://schemas.openxmlformats.org/presentationml/2006/main">
+  <p:cSld>
+    <p:spTree>
+      <p:nvGrpSpPr>
+        <p:cNvPr id="1" name=""/>
+        <p:cNvGrpSpPr/>
+        <p:nvPr/>
+      </p:nvGrpSpPr>
+      <p:grpSpPr>
+        <a:xfrm>
+          <a:off x="0" y="0"/>
+          <a:ext cx="0" cy="0"/>
+          <a:chOff x="0" y="0"/>
+          <a:chExt cx="0" cy="0"/>
+        </a:xfrm>
+      </p:grpSpPr>
+      <p:sp>
+        <p:nvSpPr>
+          <p:cNvPr id="2" name="Title 1"/>
+          <p:cNvSpPr>
+            <a:spLocks noGrp="1"/>
+          </p:cNvSpPr>
+          <p:nvPr>
+            <p:ph type="title"/>
+          </p:nvPr>
+        </p:nvSpPr>
+        <p:spPr/>
+        <p:txBody>
+          <a:bodyPr/>
+          <a:lstStyle/>
+          <a:p>
+            <a:r>
+              <a:rPr lang="en-US" dirty="0" smtClean="0"/>
+              <a:t>Conclusions</a:t>
+            </a:r>
+            <a:endParaRPr lang="en-US" dirty="0"/>
+          </a:p>
+        </p:txBody>
+      </p:sp>
+      <p:sp>
+        <p:nvSpPr>
+          <p:cNvPr id="3" name="Content Placeholder 2"/>
+          <p:cNvSpPr>
+            <a:spLocks noGrp="1"/>
+          </p:cNvSpPr>
+          <p:nvPr>
+            <p:ph idx="1"/>
+          </p:nvPr>
+        </p:nvSpPr>
+        <p:spPr/>
+        <p:txBody>
+          <a:bodyPr/>
+          <a:lstStyle/>
+          <a:p>
+            <a:r>
+              <a:rPr lang="en-US" dirty="0" smtClean="0"/>
+              <a:t>Increasing the degree of nonlinearity causes peak intensities to shift to shallower, laterally offset positions.</a:t>
+            </a:r>
+          </a:p>
+          <a:p>
+            <a:endParaRPr lang="en-US" dirty="0"/>
+          </a:p>
+          <a:p>
+            <a:r>
+              <a:rPr lang="en-US" dirty="0" smtClean="0"/>
+              <a:t>The effects of nonlinearity were greatly dampened for attenuations of around 1.0 to 1.5 dB/cm/</a:t>
+            </a:r>
+            <a:r>
+              <a:rPr lang="en-US" dirty="0" err="1" smtClean="0"/>
+              <a:t>MHz.</a:t>
+            </a:r>
+            <a:endParaRPr lang="en-US" dirty="0" smtClean="0"/>
+          </a:p>
+          <a:p>
+            <a:endParaRPr lang="en-US" dirty="0"/>
+          </a:p>
+          <a:p>
+            <a:r>
+              <a:rPr lang="en-US" dirty="0" smtClean="0"/>
+              <a:t>Shear wave speeds vary slightly when measured using different focal depths.</a:t>
+            </a:r>
+          </a:p>
+          <a:p>
+            <a:endParaRPr lang="en-US" dirty="0"/>
+          </a:p>
+          <a:p>
+            <a:endParaRPr lang="en-US" dirty="0"/>
+          </a:p>
+        </p:txBody>
+      </p:sp>
+    </p:spTree>
+    <p:extLst>
+      <p:ext uri="{BB962C8B-B14F-4D97-AF65-F5344CB8AC3E}">
+        <p14:creationId xmlns:p14="http://schemas.microsoft.com/office/powerpoint/2010/main" val="3350761378"/>
+      </p:ext>
+    </p:extLst>
+  </p:cSld>
+  <p:clrMapOvr>
+    <a:masterClrMapping/>
+  </p:clrMapOvr>
+  <p:timing>
+    <p:tnLst>
+      <p:par>
+        <p:cTn id="1" dur="indefinite" restart="never" nodeType="tmRoot"/>
+      </p:par>
+    </p:tnLst>
+  </p:timing>
+</p:sld>
+</file>
+
+<file path=ppt/slides/slide17.xml><?xml version="1.0" encoding="utf-8"?>
+<p:sld xmlns:a="http://schemas.openxmlformats.org/drawingml/2006/main" xmlns:r="http://schemas.openxmlformats.org/officeDocument/2006/relationships" xmlns:p="http://schemas.openxmlformats.org/presentationml/2006/main">
+  <p:cSld>
+    <p:spTree>
+      <p:nvGrpSpPr>
+        <p:cNvPr id="1" name=""/>
+        <p:cNvGrpSpPr/>
+        <p:nvPr/>
+      </p:nvGrpSpPr>
+      <p:grpSpPr>
+        <a:xfrm>
+          <a:off x="0" y="0"/>
+          <a:ext cx="0" cy="0"/>
+          <a:chOff x="0" y="0"/>
+          <a:chExt cx="0" cy="0"/>
+        </a:xfrm>
+      </p:grpSpPr>
+      <p:sp>
+        <p:nvSpPr>
+          <p:cNvPr id="2" name="Title 1"/>
+          <p:cNvSpPr>
+            <a:spLocks noGrp="1"/>
+          </p:cNvSpPr>
+          <p:nvPr>
+            <p:ph type="title"/>
+          </p:nvPr>
+        </p:nvSpPr>
+        <p:spPr/>
+        <p:txBody>
+          <a:bodyPr/>
+          <a:lstStyle/>
+          <a:p>
+            <a:r>
+              <a:rPr lang="en-US" dirty="0" smtClean="0"/>
+              <a:t>Future Work</a:t>
+            </a:r>
+            <a:endParaRPr lang="en-US" dirty="0"/>
+          </a:p>
+        </p:txBody>
+      </p:sp>
+      <p:sp>
+        <p:nvSpPr>
+          <p:cNvPr id="3" name="Content Placeholder 2"/>
+          <p:cNvSpPr>
+            <a:spLocks noGrp="1"/>
+          </p:cNvSpPr>
+          <p:nvPr>
+            <p:ph idx="1"/>
+          </p:nvPr>
+        </p:nvSpPr>
+        <p:spPr/>
+        <p:txBody>
+          <a:bodyPr/>
+          <a:lstStyle/>
+          <a:p>
+            <a:r>
+              <a:rPr lang="en-US" dirty="0" smtClean="0"/>
+              <a:t>Validating 3D KZK simulation results using Field II, k-Wave, and experimental data.</a:t>
+            </a:r>
+          </a:p>
+          <a:p>
+            <a:endParaRPr lang="en-US" dirty="0"/>
+          </a:p>
+          <a:p>
+            <a:r>
+              <a:rPr lang="en-US" dirty="0" smtClean="0"/>
+              <a:t>Simulating intensity fields and corresponding shear waves for a range of focal depths, as well as in media with different material properties.</a:t>
+            </a:r>
+          </a:p>
+          <a:p>
+            <a:endParaRPr lang="en-US" dirty="0" smtClean="0"/>
+          </a:p>
+          <a:p>
+            <a:endParaRPr lang="en-US" dirty="0"/>
+          </a:p>
+        </p:txBody>
+      </p:sp>
+    </p:spTree>
+    <p:extLst>
+      <p:ext uri="{BB962C8B-B14F-4D97-AF65-F5344CB8AC3E}">
+        <p14:creationId xmlns:p14="http://schemas.microsoft.com/office/powerpoint/2010/main" val="2649092200"/>
+      </p:ext>
+    </p:extLst>
+  </p:cSld>
+  <p:clrMapOvr>
+    <a:masterClrMapping/>
+  </p:clrMapOvr>
+  <p:timing>
+    <p:tnLst>
+      <p:par>
+        <p:cTn id="1" dur="indefinite" restart="never" nodeType="tmRoot"/>
+      </p:par>
+    </p:tnLst>
+  </p:timing>
+</p:sld>
+</file>
+
 <file path=ppt/slides/slide2.xml><?xml version="1.0" encoding="utf-8"?>
 <p:sld xmlns:a="http://schemas.openxmlformats.org/drawingml/2006/main" xmlns:r="http://schemas.openxmlformats.org/officeDocument/2006/relationships" xmlns:p="http://schemas.openxmlformats.org/presentationml/2006/main">
   <p:cSld>
@@ -5975,38 +6774,22 @@
                       <a:rPr lang="en-US" sz="2000" b="0" i="1" smtClean="0">
                         <a:latin typeface="Cambria Math" panose="02040503050406030204" pitchFamily="18" charset="0"/>
                       </a:rPr>
-                      <m:t>~4×</m:t>
+                      <m:t>~</m:t>
                     </m:r>
-                    <m:sSup>
-                      <m:sSupPr>
-                        <m:ctrlPr>
-                          <a:rPr lang="en-US" sz="2000" b="0" i="1" smtClean="0">
-                            <a:latin typeface="Cambria Math" panose="02040503050406030204" pitchFamily="18" charset="0"/>
-                          </a:rPr>
-                        </m:ctrlPr>
-                      </m:sSupPr>
-                      <m:e>
-                        <m:r>
-                          <a:rPr lang="en-US" sz="2000" b="0" i="1" smtClean="0">
-                            <a:latin typeface="Cambria Math" panose="02040503050406030204" pitchFamily="18" charset="0"/>
-                          </a:rPr>
-                          <m:t>10</m:t>
-                        </m:r>
-                      </m:e>
-                      <m:sup>
-                        <m:r>
-                          <a:rPr lang="en-US" sz="2000" b="0" i="1" smtClean="0">
-                            <a:latin typeface="Cambria Math" panose="02040503050406030204" pitchFamily="18" charset="0"/>
-                          </a:rPr>
-                          <m:t>5</m:t>
-                        </m:r>
-                      </m:sup>
-                    </m:sSup>
                     <m:r>
                       <a:rPr lang="en-US" sz="2000" b="0" i="1" smtClean="0">
                         <a:latin typeface="Cambria Math" panose="02040503050406030204" pitchFamily="18" charset="0"/>
                       </a:rPr>
-                      <m:t> </m:t>
+                      <m:t>0.4 </m:t>
+                    </m:r>
+                    <m:r>
+                      <m:rPr>
+                        <m:nor/>
+                      </m:rPr>
+                      <a:rPr lang="en-US" sz="2000" b="0" i="0" smtClean="0">
+                        <a:latin typeface="Cambria Math" panose="02040503050406030204" pitchFamily="18" charset="0"/>
+                      </a:rPr>
+                      <m:t>M</m:t>
                     </m:r>
                     <m:r>
                       <m:rPr>
@@ -6305,11 +7088,7 @@
             </a:r>
             <a:r>
               <a:rPr lang="en-US" sz="2400" dirty="0" smtClean="0"/>
-              <a:t> = 0mm</a:t>
-            </a:r>
-            <a:r>
-              <a:rPr lang="en-US" sz="2400" dirty="0" smtClean="0"/>
-              <a:t>)</a:t>
+              <a:t> = 0mm)</a:t>
             </a:r>
           </a:p>
           <a:p>
@@ -6657,15 +7436,7 @@
             </a:r>
             <a:r>
               <a:rPr lang="en-US" dirty="0" smtClean="0"/>
-              <a:t> = </a:t>
-            </a:r>
-            <a:r>
-              <a:rPr lang="en-US" dirty="0" smtClean="0"/>
-              <a:t>0 </a:t>
-            </a:r>
-            <a:r>
-              <a:rPr lang="en-US" dirty="0" smtClean="0"/>
-              <a:t>dB/cm/MHz</a:t>
+              <a:t> = 0 dB/cm/MHz</a:t>
             </a:r>
             <a:endParaRPr lang="en-US" dirty="0"/>
           </a:p>
@@ -7006,7 +7777,7 @@
           <p:nvPr/>
         </p:nvPicPr>
         <p:blipFill rotWithShape="1">
-          <a:blip r:embed="rId2" cstate="print">
+          <a:blip r:embed="rId3" cstate="print">
             <a:extLst>
               <a:ext uri="{28A0092B-C50C-407E-A947-70E740481C1C}">
                 <a14:useLocalDpi xmlns:a14="http://schemas.microsoft.com/office/drawing/2010/main" val="0"/>
@@ -7045,7 +7816,7 @@
           <p:nvPr/>
         </p:nvPicPr>
         <p:blipFill rotWithShape="1">
-          <a:blip r:embed="rId3" cstate="print">
+          <a:blip r:embed="rId4" cstate="print">
             <a:extLst>
               <a:ext uri="{28A0092B-C50C-407E-A947-70E740481C1C}">
                 <a14:useLocalDpi xmlns:a14="http://schemas.microsoft.com/office/drawing/2010/main" val="0"/>
@@ -7084,7 +7855,7 @@
           <p:nvPr/>
         </p:nvPicPr>
         <p:blipFill rotWithShape="1">
-          <a:blip r:embed="rId4" cstate="print">
+          <a:blip r:embed="rId5" cstate="print">
             <a:extLst>
               <a:ext uri="{28A0092B-C50C-407E-A947-70E740481C1C}">
                 <a14:useLocalDpi xmlns:a14="http://schemas.microsoft.com/office/drawing/2010/main" val="0"/>

</xml_diff>